<commit_message>
Added additional slides to "Members of docker universe" to explain the Linux kernel technologies behind containers.
</commit_message>
<xml_diff>
--- a/docker/04_Images.pptx
+++ b/docker/04_Images.pptx
@@ -195,6 +195,10 @@
     </p:ext>
   </p:extLst>
 </p:presentation>
+</file>
+
+<file path=ppt/revisionInfo.xml><?xml version="1.0" encoding="utf-8"?>
+<p1510:revInfo xmlns:a="http://schemas.openxmlformats.org/drawingml/2006/main" xmlns:r="http://schemas.openxmlformats.org/officeDocument/2006/relationships" xmlns:p1510="http://schemas.microsoft.com/office/powerpoint/2015/10/main"/>
 </file>
 
 <file path=ppt/handoutMasters/handoutMaster1.xml><?xml version="1.0" encoding="utf-8"?>
@@ -8741,50 +8745,6 @@
           </a:p>
         </p:txBody>
       </p:sp>
-      <p:pic>
-        <p:nvPicPr>
-          <p:cNvPr id="4" name="Picture 3"/>
-          <p:cNvPicPr>
-            <a:picLocks noChangeAspect="1"/>
-          </p:cNvPicPr>
-          <p:nvPr/>
-        </p:nvPicPr>
-        <p:blipFill>
-          <a:blip r:embed="rId2">
-            <a:extLst>
-              <a:ext uri="{BEBA8EAE-BF5A-486C-A8C5-ECC9F3942E4B}">
-                <a14:imgProps xmlns:a14="http://schemas.microsoft.com/office/drawing/2010/main">
-                  <a14:imgLayer r:embed="rId3">
-                    <a14:imgEffect>
-                      <a14:backgroundRemoval t="1001" b="97768" l="1942" r="96723">
-                        <a14:foregroundMark x1="35073" y1="60354" x2="35073" y2="60354"/>
-                        <a14:foregroundMark x1="34345" y1="86759" x2="34345" y2="86759"/>
-                        <a14:foregroundMark x1="53398" y1="10470" x2="53398" y2="10470"/>
-                        <a14:foregroundMark x1="51699" y1="14165" x2="51699" y2="14165"/>
-                        <a14:foregroundMark x1="39927" y1="5389" x2="39927" y2="5389"/>
-                        <a14:foregroundMark x1="39927" y1="23865" x2="39927" y2="23865"/>
-                        <a14:foregroundMark x1="89806" y1="70670" x2="89806" y2="70670"/>
-                      </a14:backgroundRemoval>
-                    </a14:imgEffect>
-                  </a14:imgLayer>
-                </a14:imgProps>
-              </a:ext>
-            </a:extLst>
-          </a:blip>
-          <a:stretch>
-            <a:fillRect/>
-          </a:stretch>
-        </p:blipFill>
-        <p:spPr>
-          <a:xfrm>
-            <a:off x="1187850" y="1583007"/>
-            <a:ext cx="2511552" cy="3959352"/>
-          </a:xfrm>
-          <a:prstGeom prst="rect">
-            <a:avLst/>
-          </a:prstGeom>
-        </p:spPr>
-      </p:pic>
       <p:grpSp>
         <p:nvGrpSpPr>
           <p:cNvPr id="5" name="Group 4"/>
@@ -9341,6 +9301,36 @@
           </p:txBody>
         </p:sp>
       </p:grpSp>
+      <p:pic>
+        <p:nvPicPr>
+          <p:cNvPr id="13" name="Picture 12">
+            <a:extLst>
+              <a:ext uri="{FF2B5EF4-FFF2-40B4-BE49-F238E27FC236}">
+                <a16:creationId xmlns:a16="http://schemas.microsoft.com/office/drawing/2014/main" id="{A8968184-AC3B-4D2A-B7CF-E7F43CD5D25A}"/>
+              </a:ext>
+            </a:extLst>
+          </p:cNvPr>
+          <p:cNvPicPr>
+            <a:picLocks noChangeAspect="1"/>
+          </p:cNvPicPr>
+          <p:nvPr/>
+        </p:nvPicPr>
+        <p:blipFill>
+          <a:blip r:embed="rId2"/>
+          <a:stretch>
+            <a:fillRect/>
+          </a:stretch>
+        </p:blipFill>
+        <p:spPr>
+          <a:xfrm>
+            <a:off x="1146874" y="1852442"/>
+            <a:ext cx="2767929" cy="3546882"/>
+          </a:xfrm>
+          <a:prstGeom prst="rect">
+            <a:avLst/>
+          </a:prstGeom>
+        </p:spPr>
+      </p:pic>
     </p:spTree>
     <p:extLst>
       <p:ext uri="{BB962C8B-B14F-4D97-AF65-F5344CB8AC3E}">

</xml_diff>

<commit_message>
Removed command slides from images ppt. Changed exercise 0.
</commit_message>
<xml_diff>
--- a/docker/04_Images.pptx
+++ b/docker/04_Images.pptx
@@ -5,10 +5,10 @@
     <p:sldMasterId id="2147483733" r:id="rId1"/>
   </p:sldMasterIdLst>
   <p:notesMasterIdLst>
-    <p:notesMasterId r:id="rId13"/>
+    <p:notesMasterId r:id="rId11"/>
   </p:notesMasterIdLst>
   <p:handoutMasterIdLst>
-    <p:handoutMasterId r:id="rId14"/>
+    <p:handoutMasterId r:id="rId12"/>
   </p:handoutMasterIdLst>
   <p:sldIdLst>
     <p:sldId id="435" r:id="rId2"/>
@@ -19,9 +19,7 @@
     <p:sldId id="442" r:id="rId7"/>
     <p:sldId id="443" r:id="rId8"/>
     <p:sldId id="446" r:id="rId9"/>
-    <p:sldId id="437" r:id="rId10"/>
-    <p:sldId id="438" r:id="rId11"/>
-    <p:sldId id="265" r:id="rId12"/>
+    <p:sldId id="265" r:id="rId10"/>
   </p:sldIdLst>
   <p:sldSz cx="12195175" cy="6858000"/>
   <p:notesSz cx="6858000" cy="9144000"/>
@@ -573,7 +571,16 @@
           <a:bodyPr/>
           <a:lstStyle/>
           <a:p>
-            <a:endParaRPr lang="de-DE" dirty="0"/>
+            <a:r>
+              <a:rPr lang="en-US" dirty="0"/>
+              <a:t>Images consist of different layers, depending on how they were built, which base images they come from and what software components are in it.</a:t>
+            </a:r>
+          </a:p>
+          <a:p>
+            <a:r>
+              <a:rPr lang="en-US" dirty="0"/>
+              <a:t>Every container will use the same set of image layers which are immutable (all containers will refer to the same bytes of data on the disk holding the image). However, every container gets an individual read/write layer that is unique to each container.</a:t>
+            </a:r>
           </a:p>
         </p:txBody>
       </p:sp>
@@ -595,6 +602,221 @@
             <a:fld id="{7D8C2C35-2B8A-446E-BEC0-FD36716C29AC}" type="slidenum">
               <a:rPr lang="de-DE" smtClean="0"/>
               <a:pPr/>
+              <a:t>4</a:t>
+            </a:fld>
+            <a:endParaRPr lang="de-DE" dirty="0"/>
+          </a:p>
+        </p:txBody>
+      </p:sp>
+    </p:spTree>
+    <p:extLst>
+      <p:ext uri="{BB962C8B-B14F-4D97-AF65-F5344CB8AC3E}">
+        <p14:creationId xmlns:p14="http://schemas.microsoft.com/office/powerpoint/2010/main" val="516210625"/>
+      </p:ext>
+    </p:extLst>
+  </p:cSld>
+  <p:clrMapOvr>
+    <a:masterClrMapping/>
+  </p:clrMapOvr>
+</p:notes>
+</file>
+
+<file path=ppt/notesSlides/notesSlide2.xml><?xml version="1.0" encoding="utf-8"?>
+<p:notes xmlns:a="http://schemas.openxmlformats.org/drawingml/2006/main" xmlns:r="http://schemas.openxmlformats.org/officeDocument/2006/relationships" xmlns:p="http://schemas.openxmlformats.org/presentationml/2006/main">
+  <p:cSld>
+    <p:spTree>
+      <p:nvGrpSpPr>
+        <p:cNvPr id="1" name=""/>
+        <p:cNvGrpSpPr/>
+        <p:nvPr/>
+      </p:nvGrpSpPr>
+      <p:grpSpPr>
+        <a:xfrm>
+          <a:off x="0" y="0"/>
+          <a:ext cx="0" cy="0"/>
+          <a:chOff x="0" y="0"/>
+          <a:chExt cx="0" cy="0"/>
+        </a:xfrm>
+      </p:grpSpPr>
+      <p:sp>
+        <p:nvSpPr>
+          <p:cNvPr id="2" name="Slide Image Placeholder 1"/>
+          <p:cNvSpPr>
+            <a:spLocks noGrp="1" noRot="1" noChangeAspect="1"/>
+          </p:cNvSpPr>
+          <p:nvPr>
+            <p:ph type="sldImg"/>
+          </p:nvPr>
+        </p:nvSpPr>
+        <p:spPr/>
+      </p:sp>
+      <p:sp>
+        <p:nvSpPr>
+          <p:cNvPr id="3" name="Notes Placeholder 2"/>
+          <p:cNvSpPr>
+            <a:spLocks noGrp="1"/>
+          </p:cNvSpPr>
+          <p:nvPr>
+            <p:ph type="body" idx="1"/>
+          </p:nvPr>
+        </p:nvSpPr>
+        <p:spPr/>
+        <p:txBody>
+          <a:bodyPr/>
+          <a:lstStyle/>
+          <a:p>
+            <a:r>
+              <a:rPr lang="en-US" dirty="0"/>
+              <a:t>With “docker commit”, the read/write layer can be persisted into an immutable image layer, creating a new image.</a:t>
+            </a:r>
+          </a:p>
+          <a:p>
+            <a:endParaRPr lang="en-US" dirty="0"/>
+          </a:p>
+          <a:p>
+            <a:r>
+              <a:rPr lang="en-US" dirty="0"/>
+              <a:t>Docker commit is good for persisting quick and small changes into an image. It has however two important drawbacks:</a:t>
+            </a:r>
+          </a:p>
+          <a:p>
+            <a:pPr marL="342900" indent="-342900">
+              <a:buAutoNum type="arabicPeriod"/>
+            </a:pPr>
+            <a:r>
+              <a:rPr lang="en-US" dirty="0"/>
+              <a:t>Building images with “docker commit” cannot be easily automated</a:t>
+            </a:r>
+          </a:p>
+          <a:p>
+            <a:pPr marL="342900" indent="-342900">
+              <a:buAutoNum type="arabicPeriod"/>
+            </a:pPr>
+            <a:r>
+              <a:rPr lang="en-US" dirty="0"/>
+              <a:t>All changes introduced to an image with “docker commit” cannot be examined in the images change history</a:t>
+            </a:r>
+          </a:p>
+          <a:p>
+            <a:pPr marL="342900" indent="-342900">
+              <a:buAutoNum type="arabicPeriod"/>
+            </a:pPr>
+            <a:endParaRPr lang="en-US" dirty="0"/>
+          </a:p>
+          <a:p>
+            <a:pPr marL="0" indent="0">
+              <a:buNone/>
+            </a:pPr>
+            <a:r>
+              <a:rPr lang="en-US" dirty="0"/>
+              <a:t>Using “docker commit” to produce image that are intended for distribution is therefore highly discouraged.</a:t>
+            </a:r>
+          </a:p>
+        </p:txBody>
+      </p:sp>
+      <p:sp>
+        <p:nvSpPr>
+          <p:cNvPr id="4" name="Slide Number Placeholder 3"/>
+          <p:cNvSpPr>
+            <a:spLocks noGrp="1"/>
+          </p:cNvSpPr>
+          <p:nvPr>
+            <p:ph type="sldNum" sz="quarter" idx="10"/>
+          </p:nvPr>
+        </p:nvSpPr>
+        <p:spPr/>
+        <p:txBody>
+          <a:bodyPr/>
+          <a:lstStyle/>
+          <a:p>
+            <a:fld id="{7D8C2C35-2B8A-446E-BEC0-FD36716C29AC}" type="slidenum">
+              <a:rPr lang="de-DE" smtClean="0"/>
+              <a:pPr/>
+              <a:t>5</a:t>
+            </a:fld>
+            <a:endParaRPr lang="de-DE" dirty="0"/>
+          </a:p>
+        </p:txBody>
+      </p:sp>
+    </p:spTree>
+    <p:extLst>
+      <p:ext uri="{BB962C8B-B14F-4D97-AF65-F5344CB8AC3E}">
+        <p14:creationId xmlns:p14="http://schemas.microsoft.com/office/powerpoint/2010/main" val="2446976983"/>
+      </p:ext>
+    </p:extLst>
+  </p:cSld>
+  <p:clrMapOvr>
+    <a:masterClrMapping/>
+  </p:clrMapOvr>
+</p:notes>
+</file>
+
+<file path=ppt/notesSlides/notesSlide3.xml><?xml version="1.0" encoding="utf-8"?>
+<p:notes xmlns:a="http://schemas.openxmlformats.org/drawingml/2006/main" xmlns:r="http://schemas.openxmlformats.org/officeDocument/2006/relationships" xmlns:p="http://schemas.openxmlformats.org/presentationml/2006/main">
+  <p:cSld>
+    <p:spTree>
+      <p:nvGrpSpPr>
+        <p:cNvPr id="1" name=""/>
+        <p:cNvGrpSpPr/>
+        <p:nvPr/>
+      </p:nvGrpSpPr>
+      <p:grpSpPr>
+        <a:xfrm>
+          <a:off x="0" y="0"/>
+          <a:ext cx="0" cy="0"/>
+          <a:chOff x="0" y="0"/>
+          <a:chExt cx="0" cy="0"/>
+        </a:xfrm>
+      </p:grpSpPr>
+      <p:sp>
+        <p:nvSpPr>
+          <p:cNvPr id="2" name="Slide Image Placeholder 1"/>
+          <p:cNvSpPr>
+            <a:spLocks noGrp="1" noRot="1" noChangeAspect="1"/>
+          </p:cNvSpPr>
+          <p:nvPr>
+            <p:ph type="sldImg"/>
+          </p:nvPr>
+        </p:nvSpPr>
+        <p:spPr/>
+      </p:sp>
+      <p:sp>
+        <p:nvSpPr>
+          <p:cNvPr id="3" name="Notes Placeholder 2"/>
+          <p:cNvSpPr>
+            <a:spLocks noGrp="1"/>
+          </p:cNvSpPr>
+          <p:nvPr>
+            <p:ph type="body" idx="1"/>
+          </p:nvPr>
+        </p:nvSpPr>
+        <p:spPr/>
+        <p:txBody>
+          <a:bodyPr/>
+          <a:lstStyle/>
+          <a:p>
+            <a:endParaRPr lang="de-DE" dirty="0"/>
+          </a:p>
+        </p:txBody>
+      </p:sp>
+      <p:sp>
+        <p:nvSpPr>
+          <p:cNvPr id="4" name="Slide Number Placeholder 3"/>
+          <p:cNvSpPr>
+            <a:spLocks noGrp="1"/>
+          </p:cNvSpPr>
+          <p:nvPr>
+            <p:ph type="sldNum" sz="quarter" idx="10"/>
+          </p:nvPr>
+        </p:nvSpPr>
+        <p:spPr/>
+        <p:txBody>
+          <a:bodyPr/>
+          <a:lstStyle/>
+          <a:p>
+            <a:fld id="{7D8C2C35-2B8A-446E-BEC0-FD36716C29AC}" type="slidenum">
+              <a:rPr lang="de-DE" smtClean="0"/>
+              <a:pPr/>
               <a:t>8</a:t>
             </a:fld>
             <a:endParaRPr lang="de-DE" dirty="0"/>
@@ -614,7 +836,7 @@
 </p:notes>
 </file>
 
-<file path=ppt/notesSlides/notesSlide2.xml><?xml version="1.0" encoding="utf-8"?>
+<file path=ppt/notesSlides/notesSlide4.xml><?xml version="1.0" encoding="utf-8"?>
 <p:notes xmlns:a="http://schemas.openxmlformats.org/drawingml/2006/main" xmlns:r="http://schemas.openxmlformats.org/officeDocument/2006/relationships" xmlns:p="http://schemas.openxmlformats.org/presentationml/2006/main">
   <p:cSld>
     <p:spTree>
@@ -649,7 +871,7 @@
             <a:fld id="{7D8C2C35-2B8A-446E-BEC0-FD36716C29AC}" type="slidenum">
               <a:rPr lang="de-DE" smtClean="0"/>
               <a:pPr/>
-              <a:t>11</a:t>
+              <a:t>9</a:t>
             </a:fld>
             <a:endParaRPr lang="de-DE" dirty="0"/>
           </a:p>
@@ -8291,342 +8513,6 @@
 </p:sld>
 </file>
 
-<file path=ppt/slides/slide10.xml><?xml version="1.0" encoding="utf-8"?>
-<p:sld xmlns:a="http://schemas.openxmlformats.org/drawingml/2006/main" xmlns:r="http://schemas.openxmlformats.org/officeDocument/2006/relationships" xmlns:p="http://schemas.openxmlformats.org/presentationml/2006/main">
-  <p:cSld>
-    <p:spTree>
-      <p:nvGrpSpPr>
-        <p:cNvPr id="1" name=""/>
-        <p:cNvGrpSpPr/>
-        <p:nvPr/>
-      </p:nvGrpSpPr>
-      <p:grpSpPr>
-        <a:xfrm>
-          <a:off x="0" y="0"/>
-          <a:ext cx="0" cy="0"/>
-          <a:chOff x="0" y="0"/>
-          <a:chExt cx="0" cy="0"/>
-        </a:xfrm>
-      </p:grpSpPr>
-      <p:sp>
-        <p:nvSpPr>
-          <p:cNvPr id="2" name="Text Placeholder 1"/>
-          <p:cNvSpPr>
-            <a:spLocks noGrp="1"/>
-          </p:cNvSpPr>
-          <p:nvPr>
-            <p:ph type="body" sz="quarter" idx="10"/>
-          </p:nvPr>
-        </p:nvSpPr>
-        <p:spPr/>
-        <p:txBody>
-          <a:bodyPr/>
-          <a:lstStyle/>
-          <a:p>
-            <a:pPr lvl="1"/>
-            <a:r>
-              <a:rPr lang="en-US" dirty="0"/>
-              <a:t>Commit changes of a container to an image</a:t>
-            </a:r>
-          </a:p>
-          <a:p>
-            <a:pPr lvl="1"/>
-            <a:endParaRPr lang="en-US" dirty="0"/>
-          </a:p>
-          <a:p>
-            <a:pPr lvl="1"/>
-            <a:r>
-              <a:rPr lang="en-US" dirty="0"/>
-              <a:t>Upload an image to a registry</a:t>
-            </a:r>
-          </a:p>
-          <a:p>
-            <a:pPr lvl="1"/>
-            <a:endParaRPr lang="en-US" dirty="0"/>
-          </a:p>
-          <a:p>
-            <a:pPr lvl="1"/>
-            <a:r>
-              <a:rPr lang="en-US" dirty="0"/>
-              <a:t>Tagging an image</a:t>
-            </a:r>
-          </a:p>
-        </p:txBody>
-      </p:sp>
-      <p:sp>
-        <p:nvSpPr>
-          <p:cNvPr id="3" name="Title 2"/>
-          <p:cNvSpPr>
-            <a:spLocks noGrp="1"/>
-          </p:cNvSpPr>
-          <p:nvPr>
-            <p:ph type="title"/>
-          </p:nvPr>
-        </p:nvSpPr>
-        <p:spPr/>
-        <p:txBody>
-          <a:bodyPr/>
-          <a:lstStyle/>
-          <a:p>
-            <a:r>
-              <a:rPr lang="en-US" dirty="0"/>
-              <a:t>Commands for images</a:t>
-            </a:r>
-          </a:p>
-        </p:txBody>
-      </p:sp>
-      <p:sp>
-        <p:nvSpPr>
-          <p:cNvPr id="12" name="Rectangle: Rounded Corners 11"/>
-          <p:cNvSpPr/>
-          <p:nvPr/>
-        </p:nvSpPr>
-        <p:spPr bwMode="gray">
-          <a:xfrm>
-            <a:off x="981976" y="1936636"/>
-            <a:ext cx="10230522" cy="276513"/>
-          </a:xfrm>
-          <a:prstGeom prst="roundRect">
-            <a:avLst/>
-          </a:prstGeom>
-          <a:solidFill>
-            <a:schemeClr val="accent1">
-              <a:lumMod val="20000"/>
-              <a:lumOff val="80000"/>
-            </a:schemeClr>
-          </a:solidFill>
-          <a:ln w="6350" algn="ctr">
-            <a:noFill/>
-            <a:miter lim="800000"/>
-            <a:headEnd/>
-            <a:tailEnd/>
-          </a:ln>
-        </p:spPr>
-        <p:txBody>
-          <a:bodyPr lIns="90000" tIns="72000" rIns="90000" bIns="72000" rtlCol="0" anchor="ctr"/>
-          <a:lstStyle/>
-          <a:p>
-            <a:pPr marL="179387" lvl="2" indent="0">
-              <a:buNone/>
-            </a:pPr>
-            <a:r>
-              <a:rPr lang="en-US" sz="1400" b="1" dirty="0">
-                <a:latin typeface="Courier New" panose="02070309020205020404" pitchFamily="49" charset="0"/>
-                <a:cs typeface="Courier New" panose="02070309020205020404" pitchFamily="49" charset="0"/>
-              </a:rPr>
-              <a:t>$ </a:t>
-            </a:r>
-            <a:r>
-              <a:rPr lang="en-US" sz="1400" dirty="0">
-                <a:latin typeface="Courier New" panose="02070309020205020404" pitchFamily="49" charset="0"/>
-                <a:cs typeface="Courier New" panose="02070309020205020404" pitchFamily="49" charset="0"/>
-              </a:rPr>
-              <a:t>docker</a:t>
-            </a:r>
-            <a:r>
-              <a:rPr lang="en-US" sz="1400" b="1" dirty="0">
-                <a:latin typeface="Courier New" panose="02070309020205020404" pitchFamily="49" charset="0"/>
-                <a:cs typeface="Courier New" panose="02070309020205020404" pitchFamily="49" charset="0"/>
-              </a:rPr>
-              <a:t> commit </a:t>
-            </a:r>
-            <a:r>
-              <a:rPr lang="en-US" sz="1400" i="1" dirty="0">
-                <a:latin typeface="Courier New" panose="02070309020205020404" pitchFamily="49" charset="0"/>
-                <a:cs typeface="Courier New" panose="02070309020205020404" pitchFamily="49" charset="0"/>
-              </a:rPr>
-              <a:t>&lt;container name&gt; &lt;tag&gt;</a:t>
-            </a:r>
-          </a:p>
-        </p:txBody>
-      </p:sp>
-      <p:sp>
-        <p:nvSpPr>
-          <p:cNvPr id="13" name="Rectangle: Rounded Corners 12"/>
-          <p:cNvSpPr/>
-          <p:nvPr/>
-        </p:nvSpPr>
-        <p:spPr bwMode="gray">
-          <a:xfrm>
-            <a:off x="981976" y="2654007"/>
-            <a:ext cx="10230522" cy="276513"/>
-          </a:xfrm>
-          <a:prstGeom prst="roundRect">
-            <a:avLst/>
-          </a:prstGeom>
-          <a:solidFill>
-            <a:schemeClr val="accent1">
-              <a:lumMod val="20000"/>
-              <a:lumOff val="80000"/>
-            </a:schemeClr>
-          </a:solidFill>
-          <a:ln w="6350" algn="ctr">
-            <a:noFill/>
-            <a:miter lim="800000"/>
-            <a:headEnd/>
-            <a:tailEnd/>
-          </a:ln>
-        </p:spPr>
-        <p:txBody>
-          <a:bodyPr lIns="90000" tIns="72000" rIns="90000" bIns="72000" rtlCol="0" anchor="ctr"/>
-          <a:lstStyle/>
-          <a:p>
-            <a:pPr marL="179387" lvl="2" indent="0">
-              <a:buNone/>
-            </a:pPr>
-            <a:r>
-              <a:rPr lang="en-US" sz="1400" b="1" dirty="0">
-                <a:latin typeface="Courier New" panose="02070309020205020404" pitchFamily="49" charset="0"/>
-                <a:cs typeface="Courier New" panose="02070309020205020404" pitchFamily="49" charset="0"/>
-              </a:rPr>
-              <a:t>$ </a:t>
-            </a:r>
-            <a:r>
-              <a:rPr lang="en-US" sz="1400" dirty="0">
-                <a:latin typeface="Courier New" panose="02070309020205020404" pitchFamily="49" charset="0"/>
-                <a:cs typeface="Courier New" panose="02070309020205020404" pitchFamily="49" charset="0"/>
-              </a:rPr>
-              <a:t>docker</a:t>
-            </a:r>
-            <a:r>
-              <a:rPr lang="en-US" sz="1400" b="1" dirty="0">
-                <a:latin typeface="Courier New" panose="02070309020205020404" pitchFamily="49" charset="0"/>
-                <a:cs typeface="Courier New" panose="02070309020205020404" pitchFamily="49" charset="0"/>
-              </a:rPr>
-              <a:t> push </a:t>
-            </a:r>
-            <a:r>
-              <a:rPr lang="en-US" sz="1400" i="1" dirty="0" err="1">
-                <a:latin typeface="Courier New" panose="02070309020205020404" pitchFamily="49" charset="0"/>
-                <a:cs typeface="Courier New" panose="02070309020205020404" pitchFamily="49" charset="0"/>
-              </a:rPr>
-              <a:t>busybox</a:t>
-            </a:r>
-            <a:endParaRPr lang="en-US" sz="1400" i="1" dirty="0">
-              <a:latin typeface="Courier New" panose="02070309020205020404" pitchFamily="49" charset="0"/>
-              <a:cs typeface="Courier New" panose="02070309020205020404" pitchFamily="49" charset="0"/>
-            </a:endParaRPr>
-          </a:p>
-        </p:txBody>
-      </p:sp>
-      <p:sp>
-        <p:nvSpPr>
-          <p:cNvPr id="6" name="Rectangle: Rounded Corners 5"/>
-          <p:cNvSpPr/>
-          <p:nvPr/>
-        </p:nvSpPr>
-        <p:spPr bwMode="gray">
-          <a:xfrm>
-            <a:off x="981976" y="3371378"/>
-            <a:ext cx="10230522" cy="276513"/>
-          </a:xfrm>
-          <a:prstGeom prst="roundRect">
-            <a:avLst/>
-          </a:prstGeom>
-          <a:solidFill>
-            <a:schemeClr val="accent1">
-              <a:lumMod val="20000"/>
-              <a:lumOff val="80000"/>
-            </a:schemeClr>
-          </a:solidFill>
-          <a:ln w="6350" algn="ctr">
-            <a:noFill/>
-            <a:miter lim="800000"/>
-            <a:headEnd/>
-            <a:tailEnd/>
-          </a:ln>
-        </p:spPr>
-        <p:txBody>
-          <a:bodyPr lIns="90000" tIns="72000" rIns="90000" bIns="72000" rtlCol="0" anchor="ctr"/>
-          <a:lstStyle/>
-          <a:p>
-            <a:pPr marL="179387" lvl="2" indent="0">
-              <a:buNone/>
-            </a:pPr>
-            <a:r>
-              <a:rPr lang="en-US" sz="1400" b="1" dirty="0">
-                <a:latin typeface="Courier New" panose="02070309020205020404" pitchFamily="49" charset="0"/>
-                <a:cs typeface="Courier New" panose="02070309020205020404" pitchFamily="49" charset="0"/>
-              </a:rPr>
-              <a:t>$ </a:t>
-            </a:r>
-            <a:r>
-              <a:rPr lang="en-US" sz="1400" dirty="0" err="1">
-                <a:latin typeface="Courier New" panose="02070309020205020404" pitchFamily="49" charset="0"/>
-                <a:cs typeface="Courier New" panose="02070309020205020404" pitchFamily="49" charset="0"/>
-              </a:rPr>
-              <a:t>docker</a:t>
-            </a:r>
-            <a:r>
-              <a:rPr lang="en-US" sz="1400" b="1" dirty="0">
-                <a:latin typeface="Courier New" panose="02070309020205020404" pitchFamily="49" charset="0"/>
-                <a:cs typeface="Courier New" panose="02070309020205020404" pitchFamily="49" charset="0"/>
-              </a:rPr>
-              <a:t> tag </a:t>
-            </a:r>
-            <a:r>
-              <a:rPr lang="en-US" sz="1400" i="1" dirty="0">
-                <a:latin typeface="Courier New" panose="02070309020205020404" pitchFamily="49" charset="0"/>
-                <a:cs typeface="Courier New" panose="02070309020205020404" pitchFamily="49" charset="0"/>
-              </a:rPr>
-              <a:t>&lt;image ID&gt; &lt;</a:t>
-            </a:r>
-            <a:r>
-              <a:rPr lang="en-US" sz="1400" i="1" dirty="0" err="1">
-                <a:latin typeface="Courier New" panose="02070309020205020404" pitchFamily="49" charset="0"/>
-                <a:cs typeface="Courier New" panose="02070309020205020404" pitchFamily="49" charset="0"/>
-              </a:rPr>
-              <a:t>tag:release</a:t>
-            </a:r>
-            <a:r>
-              <a:rPr lang="en-US" sz="1400" i="1" dirty="0">
-                <a:latin typeface="Courier New" panose="02070309020205020404" pitchFamily="49" charset="0"/>
-                <a:cs typeface="Courier New" panose="02070309020205020404" pitchFamily="49" charset="0"/>
-              </a:rPr>
-              <a:t>&gt;</a:t>
-            </a:r>
-          </a:p>
-        </p:txBody>
-      </p:sp>
-    </p:spTree>
-    <p:extLst>
-      <p:ext uri="{BB962C8B-B14F-4D97-AF65-F5344CB8AC3E}">
-        <p14:creationId xmlns:p14="http://schemas.microsoft.com/office/powerpoint/2010/main" val="4278887794"/>
-      </p:ext>
-    </p:extLst>
-  </p:cSld>
-  <p:clrMapOvr>
-    <a:masterClrMapping/>
-  </p:clrMapOvr>
-</p:sld>
-</file>
-
-<file path=ppt/slides/slide11.xml><?xml version="1.0" encoding="utf-8"?>
-<p:sld xmlns:a="http://schemas.openxmlformats.org/drawingml/2006/main" xmlns:r="http://schemas.openxmlformats.org/officeDocument/2006/relationships" xmlns:p="http://schemas.openxmlformats.org/presentationml/2006/main" show="0">
-  <p:cSld>
-    <p:spTree>
-      <p:nvGrpSpPr>
-        <p:cNvPr id="1" name=""/>
-        <p:cNvGrpSpPr/>
-        <p:nvPr/>
-      </p:nvGrpSpPr>
-      <p:grpSpPr>
-        <a:xfrm>
-          <a:off x="0" y="0"/>
-          <a:ext cx="0" cy="0"/>
-          <a:chOff x="0" y="0"/>
-          <a:chExt cx="0" cy="0"/>
-        </a:xfrm>
-      </p:grpSpPr>
-    </p:spTree>
-  </p:cSld>
-  <p:clrMapOvr>
-    <a:masterClrMapping/>
-  </p:clrMapOvr>
-  <p:transition spd="med"/>
-</p:sld>
-</file>
-
 <file path=ppt/slides/slide2.xml><?xml version="1.0" encoding="utf-8"?>
 <p:sld xmlns:a="http://schemas.openxmlformats.org/drawingml/2006/main" xmlns:r="http://schemas.openxmlformats.org/officeDocument/2006/relationships" xmlns:p="http://schemas.openxmlformats.org/presentationml/2006/main">
   <p:cSld>
@@ -11713,7 +11599,7 @@
           <p:nvPr/>
         </p:nvPicPr>
         <p:blipFill>
-          <a:blip r:embed="rId2"/>
+          <a:blip r:embed="rId3"/>
           <a:stretch>
             <a:fillRect/>
           </a:stretch>
@@ -14393,7 +14279,7 @@
 </file>
 
 <file path=ppt/slides/slide9.xml><?xml version="1.0" encoding="utf-8"?>
-<p:sld xmlns:a="http://schemas.openxmlformats.org/drawingml/2006/main" xmlns:r="http://schemas.openxmlformats.org/officeDocument/2006/relationships" xmlns:p="http://schemas.openxmlformats.org/presentationml/2006/main">
+<p:sld xmlns:a="http://schemas.openxmlformats.org/drawingml/2006/main" xmlns:r="http://schemas.openxmlformats.org/officeDocument/2006/relationships" xmlns:p="http://schemas.openxmlformats.org/presentationml/2006/main" show="0">
   <p:cSld>
     <p:spTree>
       <p:nvGrpSpPr>
@@ -14409,455 +14295,12 @@
           <a:chExt cx="0" cy="0"/>
         </a:xfrm>
       </p:grpSpPr>
-      <p:sp>
-        <p:nvSpPr>
-          <p:cNvPr id="2" name="Text Placeholder 1"/>
-          <p:cNvSpPr>
-            <a:spLocks noGrp="1"/>
-          </p:cNvSpPr>
-          <p:nvPr>
-            <p:ph type="body" sz="quarter" idx="10"/>
-          </p:nvPr>
-        </p:nvSpPr>
-        <p:spPr/>
-        <p:txBody>
-          <a:bodyPr/>
-          <a:lstStyle/>
-          <a:p>
-            <a:pPr lvl="1"/>
-            <a:r>
-              <a:rPr lang="en-US" dirty="0"/>
-              <a:t>Search for an image on all known registries</a:t>
-            </a:r>
-          </a:p>
-          <a:p>
-            <a:pPr lvl="1"/>
-            <a:endParaRPr lang="en-US" dirty="0"/>
-          </a:p>
-          <a:p>
-            <a:pPr lvl="1"/>
-            <a:r>
-              <a:rPr lang="en-US" dirty="0"/>
-              <a:t>Download an image from a registry</a:t>
-            </a:r>
-          </a:p>
-          <a:p>
-            <a:pPr lvl="1"/>
-            <a:endParaRPr lang="en-US" dirty="0"/>
-          </a:p>
-          <a:p>
-            <a:pPr lvl="1"/>
-            <a:r>
-              <a:rPr lang="en-US" dirty="0"/>
-              <a:t>Remove an image from the local disk</a:t>
-            </a:r>
-          </a:p>
-          <a:p>
-            <a:pPr lvl="1"/>
-            <a:endParaRPr lang="en-US" dirty="0"/>
-          </a:p>
-          <a:p>
-            <a:pPr lvl="1"/>
-            <a:r>
-              <a:rPr lang="en-US" dirty="0"/>
-              <a:t>List all locally available images</a:t>
-            </a:r>
-          </a:p>
-          <a:p>
-            <a:pPr lvl="1"/>
-            <a:endParaRPr lang="en-US" dirty="0"/>
-          </a:p>
-          <a:p>
-            <a:pPr lvl="1"/>
-            <a:r>
-              <a:rPr lang="en-US" dirty="0"/>
-              <a:t>View an images history</a:t>
-            </a:r>
-          </a:p>
-          <a:p>
-            <a:pPr marL="0" lvl="1" indent="0">
-              <a:buNone/>
-            </a:pPr>
-            <a:endParaRPr lang="en-US" dirty="0"/>
-          </a:p>
-        </p:txBody>
-      </p:sp>
-      <p:sp>
-        <p:nvSpPr>
-          <p:cNvPr id="3" name="Title 2"/>
-          <p:cNvSpPr>
-            <a:spLocks noGrp="1"/>
-          </p:cNvSpPr>
-          <p:nvPr>
-            <p:ph type="title"/>
-          </p:nvPr>
-        </p:nvSpPr>
-        <p:spPr/>
-        <p:txBody>
-          <a:bodyPr/>
-          <a:lstStyle/>
-          <a:p>
-            <a:r>
-              <a:rPr lang="en-US" dirty="0"/>
-              <a:t>Commands for images</a:t>
-            </a:r>
-          </a:p>
-        </p:txBody>
-      </p:sp>
-      <p:sp>
-        <p:nvSpPr>
-          <p:cNvPr id="6" name="Rectangle: Rounded Corners 5"/>
-          <p:cNvSpPr/>
-          <p:nvPr/>
-        </p:nvSpPr>
-        <p:spPr bwMode="gray">
-          <a:xfrm>
-            <a:off x="981976" y="2620709"/>
-            <a:ext cx="10230522" cy="276513"/>
-          </a:xfrm>
-          <a:prstGeom prst="roundRect">
-            <a:avLst/>
-          </a:prstGeom>
-          <a:solidFill>
-            <a:schemeClr val="accent1">
-              <a:lumMod val="20000"/>
-              <a:lumOff val="80000"/>
-            </a:schemeClr>
-          </a:solidFill>
-          <a:ln w="6350" algn="ctr">
-            <a:noFill/>
-            <a:miter lim="800000"/>
-            <a:headEnd/>
-            <a:tailEnd/>
-          </a:ln>
-        </p:spPr>
-        <p:txBody>
-          <a:bodyPr lIns="90000" tIns="72000" rIns="90000" bIns="72000" rtlCol="0" anchor="ctr"/>
-          <a:lstStyle/>
-          <a:p>
-            <a:pPr marL="179387" lvl="2" indent="0">
-              <a:buNone/>
-            </a:pPr>
-            <a:r>
-              <a:rPr lang="en-US" sz="1400" b="1" dirty="0">
-                <a:latin typeface="Courier New" panose="02070309020205020404" pitchFamily="49" charset="0"/>
-                <a:cs typeface="Courier New" panose="02070309020205020404" pitchFamily="49" charset="0"/>
-              </a:rPr>
-              <a:t>$ </a:t>
-            </a:r>
-            <a:r>
-              <a:rPr lang="en-US" sz="1400" dirty="0">
-                <a:latin typeface="Courier New" panose="02070309020205020404" pitchFamily="49" charset="0"/>
-                <a:cs typeface="Courier New" panose="02070309020205020404" pitchFamily="49" charset="0"/>
-              </a:rPr>
-              <a:t>docker</a:t>
-            </a:r>
-            <a:r>
-              <a:rPr lang="en-US" sz="1400" b="1" dirty="0">
-                <a:latin typeface="Courier New" panose="02070309020205020404" pitchFamily="49" charset="0"/>
-                <a:cs typeface="Courier New" panose="02070309020205020404" pitchFamily="49" charset="0"/>
-              </a:rPr>
-              <a:t> pull </a:t>
-            </a:r>
-            <a:r>
-              <a:rPr lang="en-US" sz="1400" i="1" dirty="0" err="1">
-                <a:latin typeface="Courier New" panose="02070309020205020404" pitchFamily="49" charset="0"/>
-                <a:cs typeface="Courier New" panose="02070309020205020404" pitchFamily="49" charset="0"/>
-              </a:rPr>
-              <a:t>busybox</a:t>
-            </a:r>
-            <a:endParaRPr lang="en-US" sz="1400" i="1" dirty="0">
-              <a:latin typeface="Courier New" panose="02070309020205020404" pitchFamily="49" charset="0"/>
-              <a:cs typeface="Courier New" panose="02070309020205020404" pitchFamily="49" charset="0"/>
-            </a:endParaRPr>
-          </a:p>
-        </p:txBody>
-      </p:sp>
-      <p:sp>
-        <p:nvSpPr>
-          <p:cNvPr id="7" name="Rectangle: Rounded Corners 6"/>
-          <p:cNvSpPr/>
-          <p:nvPr/>
-        </p:nvSpPr>
-        <p:spPr bwMode="gray">
-          <a:xfrm>
-            <a:off x="981976" y="3314833"/>
-            <a:ext cx="10230522" cy="276513"/>
-          </a:xfrm>
-          <a:prstGeom prst="roundRect">
-            <a:avLst/>
-          </a:prstGeom>
-          <a:solidFill>
-            <a:schemeClr val="accent1">
-              <a:lumMod val="20000"/>
-              <a:lumOff val="80000"/>
-            </a:schemeClr>
-          </a:solidFill>
-          <a:ln w="6350" algn="ctr">
-            <a:noFill/>
-            <a:miter lim="800000"/>
-            <a:headEnd/>
-            <a:tailEnd/>
-          </a:ln>
-        </p:spPr>
-        <p:txBody>
-          <a:bodyPr lIns="90000" tIns="72000" rIns="90000" bIns="72000" rtlCol="0" anchor="ctr"/>
-          <a:lstStyle/>
-          <a:p>
-            <a:pPr marL="179387" lvl="2" indent="0">
-              <a:buNone/>
-            </a:pPr>
-            <a:r>
-              <a:rPr lang="en-US" sz="1400" b="1" dirty="0">
-                <a:latin typeface="Courier New" panose="02070309020205020404" pitchFamily="49" charset="0"/>
-                <a:cs typeface="Courier New" panose="02070309020205020404" pitchFamily="49" charset="0"/>
-              </a:rPr>
-              <a:t>$ </a:t>
-            </a:r>
-            <a:r>
-              <a:rPr lang="en-US" sz="1400" dirty="0">
-                <a:latin typeface="Courier New" panose="02070309020205020404" pitchFamily="49" charset="0"/>
-                <a:cs typeface="Courier New" panose="02070309020205020404" pitchFamily="49" charset="0"/>
-              </a:rPr>
-              <a:t>docker</a:t>
-            </a:r>
-            <a:r>
-              <a:rPr lang="en-US" sz="1400" b="1" dirty="0">
-                <a:latin typeface="Courier New" panose="02070309020205020404" pitchFamily="49" charset="0"/>
-                <a:cs typeface="Courier New" panose="02070309020205020404" pitchFamily="49" charset="0"/>
-              </a:rPr>
-              <a:t> </a:t>
-            </a:r>
-            <a:r>
-              <a:rPr lang="en-US" sz="1400" b="1" dirty="0" err="1">
-                <a:latin typeface="Courier New" panose="02070309020205020404" pitchFamily="49" charset="0"/>
-                <a:cs typeface="Courier New" panose="02070309020205020404" pitchFamily="49" charset="0"/>
-              </a:rPr>
-              <a:t>rmi</a:t>
-            </a:r>
-            <a:r>
-              <a:rPr lang="en-US" sz="1400" b="1" dirty="0">
-                <a:latin typeface="Courier New" panose="02070309020205020404" pitchFamily="49" charset="0"/>
-                <a:cs typeface="Courier New" panose="02070309020205020404" pitchFamily="49" charset="0"/>
-              </a:rPr>
-              <a:t> </a:t>
-            </a:r>
-            <a:r>
-              <a:rPr lang="en-US" sz="1400" i="1" dirty="0" err="1">
-                <a:latin typeface="Courier New" panose="02070309020205020404" pitchFamily="49" charset="0"/>
-                <a:cs typeface="Courier New" panose="02070309020205020404" pitchFamily="49" charset="0"/>
-              </a:rPr>
-              <a:t>busybox</a:t>
-            </a:r>
-            <a:endParaRPr lang="en-US" sz="1400" i="1" dirty="0">
-              <a:latin typeface="Courier New" panose="02070309020205020404" pitchFamily="49" charset="0"/>
-              <a:cs typeface="Courier New" panose="02070309020205020404" pitchFamily="49" charset="0"/>
-            </a:endParaRPr>
-          </a:p>
-        </p:txBody>
-      </p:sp>
-      <p:sp>
-        <p:nvSpPr>
-          <p:cNvPr id="9" name="Rectangle: Rounded Corners 8"/>
-          <p:cNvSpPr/>
-          <p:nvPr/>
-        </p:nvSpPr>
-        <p:spPr bwMode="gray">
-          <a:xfrm>
-            <a:off x="981976" y="4032204"/>
-            <a:ext cx="10230522" cy="276513"/>
-          </a:xfrm>
-          <a:prstGeom prst="roundRect">
-            <a:avLst/>
-          </a:prstGeom>
-          <a:solidFill>
-            <a:schemeClr val="accent1">
-              <a:lumMod val="20000"/>
-              <a:lumOff val="80000"/>
-            </a:schemeClr>
-          </a:solidFill>
-          <a:ln w="6350" algn="ctr">
-            <a:noFill/>
-            <a:miter lim="800000"/>
-            <a:headEnd/>
-            <a:tailEnd/>
-          </a:ln>
-        </p:spPr>
-        <p:txBody>
-          <a:bodyPr lIns="90000" tIns="72000" rIns="90000" bIns="72000" rtlCol="0" anchor="ctr"/>
-          <a:lstStyle/>
-          <a:p>
-            <a:pPr marL="179387" lvl="2" indent="0">
-              <a:buNone/>
-            </a:pPr>
-            <a:r>
-              <a:rPr lang="en-US" sz="1400" b="1" dirty="0">
-                <a:latin typeface="Courier New" panose="02070309020205020404" pitchFamily="49" charset="0"/>
-                <a:cs typeface="Courier New" panose="02070309020205020404" pitchFamily="49" charset="0"/>
-              </a:rPr>
-              <a:t>$ </a:t>
-            </a:r>
-            <a:r>
-              <a:rPr lang="en-US" sz="1400" dirty="0">
-                <a:latin typeface="Courier New" panose="02070309020205020404" pitchFamily="49" charset="0"/>
-                <a:cs typeface="Courier New" panose="02070309020205020404" pitchFamily="49" charset="0"/>
-              </a:rPr>
-              <a:t>docker</a:t>
-            </a:r>
-            <a:r>
-              <a:rPr lang="en-US" sz="1400" b="1" dirty="0">
-                <a:latin typeface="Courier New" panose="02070309020205020404" pitchFamily="49" charset="0"/>
-                <a:cs typeface="Courier New" panose="02070309020205020404" pitchFamily="49" charset="0"/>
-              </a:rPr>
-              <a:t> images</a:t>
-            </a:r>
-            <a:endParaRPr lang="en-US" sz="1400" i="1" dirty="0">
-              <a:latin typeface="Courier New" panose="02070309020205020404" pitchFamily="49" charset="0"/>
-              <a:cs typeface="Courier New" panose="02070309020205020404" pitchFamily="49" charset="0"/>
-            </a:endParaRPr>
-          </a:p>
-        </p:txBody>
-      </p:sp>
-      <p:sp>
-        <p:nvSpPr>
-          <p:cNvPr id="11" name="Rectangle: Rounded Corners 10"/>
-          <p:cNvSpPr/>
-          <p:nvPr/>
-        </p:nvSpPr>
-        <p:spPr bwMode="gray">
-          <a:xfrm>
-            <a:off x="981976" y="4750731"/>
-            <a:ext cx="10230522" cy="276513"/>
-          </a:xfrm>
-          <a:prstGeom prst="roundRect">
-            <a:avLst/>
-          </a:prstGeom>
-          <a:solidFill>
-            <a:schemeClr val="accent1">
-              <a:lumMod val="20000"/>
-              <a:lumOff val="80000"/>
-            </a:schemeClr>
-          </a:solidFill>
-          <a:ln w="6350" algn="ctr">
-            <a:noFill/>
-            <a:miter lim="800000"/>
-            <a:headEnd/>
-            <a:tailEnd/>
-          </a:ln>
-        </p:spPr>
-        <p:txBody>
-          <a:bodyPr lIns="90000" tIns="72000" rIns="90000" bIns="72000" rtlCol="0" anchor="ctr"/>
-          <a:lstStyle/>
-          <a:p>
-            <a:pPr marL="179387" lvl="2" indent="0">
-              <a:buNone/>
-            </a:pPr>
-            <a:r>
-              <a:rPr lang="en-US" sz="1400" b="1" dirty="0">
-                <a:latin typeface="Courier New" panose="02070309020205020404" pitchFamily="49" charset="0"/>
-                <a:cs typeface="Courier New" panose="02070309020205020404" pitchFamily="49" charset="0"/>
-              </a:rPr>
-              <a:t>$ </a:t>
-            </a:r>
-            <a:r>
-              <a:rPr lang="en-US" sz="1400" dirty="0">
-                <a:latin typeface="Courier New" panose="02070309020205020404" pitchFamily="49" charset="0"/>
-                <a:cs typeface="Courier New" panose="02070309020205020404" pitchFamily="49" charset="0"/>
-              </a:rPr>
-              <a:t>docker</a:t>
-            </a:r>
-            <a:r>
-              <a:rPr lang="en-US" sz="1400" b="1" dirty="0">
-                <a:latin typeface="Courier New" panose="02070309020205020404" pitchFamily="49" charset="0"/>
-                <a:cs typeface="Courier New" panose="02070309020205020404" pitchFamily="49" charset="0"/>
-              </a:rPr>
-              <a:t> history </a:t>
-            </a:r>
-            <a:r>
-              <a:rPr lang="en-US" sz="1400" i="1" dirty="0">
-                <a:latin typeface="Courier New" panose="02070309020205020404" pitchFamily="49" charset="0"/>
-                <a:cs typeface="Courier New" panose="02070309020205020404" pitchFamily="49" charset="0"/>
-              </a:rPr>
-              <a:t>&lt;image-ID&gt;</a:t>
-            </a:r>
-          </a:p>
-        </p:txBody>
-      </p:sp>
-      <p:sp>
-        <p:nvSpPr>
-          <p:cNvPr id="12" name="Rectangle: Rounded Corners 11"/>
-          <p:cNvSpPr/>
-          <p:nvPr/>
-        </p:nvSpPr>
-        <p:spPr bwMode="gray">
-          <a:xfrm>
-            <a:off x="981976" y="1931035"/>
-            <a:ext cx="10230522" cy="276513"/>
-          </a:xfrm>
-          <a:prstGeom prst="roundRect">
-            <a:avLst/>
-          </a:prstGeom>
-          <a:solidFill>
-            <a:schemeClr val="accent1">
-              <a:lumMod val="20000"/>
-              <a:lumOff val="80000"/>
-            </a:schemeClr>
-          </a:solidFill>
-          <a:ln w="6350" algn="ctr">
-            <a:noFill/>
-            <a:miter lim="800000"/>
-            <a:headEnd/>
-            <a:tailEnd/>
-          </a:ln>
-        </p:spPr>
-        <p:txBody>
-          <a:bodyPr lIns="90000" tIns="72000" rIns="90000" bIns="72000" rtlCol="0" anchor="ctr"/>
-          <a:lstStyle/>
-          <a:p>
-            <a:pPr marL="179387" lvl="2" indent="0">
-              <a:buNone/>
-            </a:pPr>
-            <a:r>
-              <a:rPr lang="en-US" sz="1400" b="1" dirty="0">
-                <a:latin typeface="Courier New" panose="02070309020205020404" pitchFamily="49" charset="0"/>
-                <a:cs typeface="Courier New" panose="02070309020205020404" pitchFamily="49" charset="0"/>
-              </a:rPr>
-              <a:t>$ </a:t>
-            </a:r>
-            <a:r>
-              <a:rPr lang="en-US" sz="1400" dirty="0" err="1">
-                <a:latin typeface="Courier New" panose="02070309020205020404" pitchFamily="49" charset="0"/>
-                <a:cs typeface="Courier New" panose="02070309020205020404" pitchFamily="49" charset="0"/>
-              </a:rPr>
-              <a:t>docker</a:t>
-            </a:r>
-            <a:r>
-              <a:rPr lang="en-US" sz="1400" b="1" dirty="0">
-                <a:latin typeface="Courier New" panose="02070309020205020404" pitchFamily="49" charset="0"/>
-                <a:cs typeface="Courier New" panose="02070309020205020404" pitchFamily="49" charset="0"/>
-              </a:rPr>
-              <a:t> search </a:t>
-            </a:r>
-            <a:r>
-              <a:rPr lang="en-US" sz="1400" i="1" dirty="0">
-                <a:latin typeface="Courier New" panose="02070309020205020404" pitchFamily="49" charset="0"/>
-                <a:cs typeface="Courier New" panose="02070309020205020404" pitchFamily="49" charset="0"/>
-              </a:rPr>
-              <a:t>&lt;search term&gt;</a:t>
-            </a:r>
-          </a:p>
-        </p:txBody>
-      </p:sp>
     </p:spTree>
-    <p:extLst>
-      <p:ext uri="{BB962C8B-B14F-4D97-AF65-F5344CB8AC3E}">
-        <p14:creationId xmlns:p14="http://schemas.microsoft.com/office/powerpoint/2010/main" val="2183621885"/>
-      </p:ext>
-    </p:extLst>
   </p:cSld>
   <p:clrMapOvr>
     <a:masterClrMapping/>
   </p:clrMapOvr>
+  <p:transition spd="med"/>
 </p:sld>
 </file>
 

</xml_diff>

<commit_message>
added demo & exercise marker for docker part
</commit_message>
<xml_diff>
--- a/docker/04_Images.pptx
+++ b/docker/04_Images.pptx
@@ -5,20 +5,24 @@
     <p:sldMasterId id="2147483733" r:id="rId1"/>
   </p:sldMasterIdLst>
   <p:notesMasterIdLst>
-    <p:notesMasterId r:id="rId10"/>
+    <p:notesMasterId r:id="rId14"/>
   </p:notesMasterIdLst>
   <p:handoutMasterIdLst>
-    <p:handoutMasterId r:id="rId11"/>
+    <p:handoutMasterId r:id="rId15"/>
   </p:handoutMasterIdLst>
   <p:sldIdLst>
     <p:sldId id="434" r:id="rId2"/>
     <p:sldId id="439" r:id="rId3"/>
     <p:sldId id="440" r:id="rId4"/>
     <p:sldId id="441" r:id="rId5"/>
-    <p:sldId id="442" r:id="rId6"/>
-    <p:sldId id="447" r:id="rId7"/>
-    <p:sldId id="446" r:id="rId8"/>
-    <p:sldId id="265" r:id="rId9"/>
+    <p:sldId id="446" r:id="rId6"/>
+    <p:sldId id="467" r:id="rId7"/>
+    <p:sldId id="442" r:id="rId8"/>
+    <p:sldId id="447" r:id="rId9"/>
+    <p:sldId id="468" r:id="rId10"/>
+    <p:sldId id="466" r:id="rId11"/>
+    <p:sldId id="464" r:id="rId12"/>
+    <p:sldId id="265" r:id="rId13"/>
   </p:sldIdLst>
   <p:sldSz cx="12195175" cy="6858000"/>
   <p:notesSz cx="6858000" cy="9144000"/>
@@ -194,10 +198,6 @@
 </p:presentation>
 </file>
 
-<file path=ppt/revisionInfo.xml><?xml version="1.0" encoding="utf-8"?>
-<p1510:revInfo xmlns:a="http://schemas.openxmlformats.org/drawingml/2006/main" xmlns:r="http://schemas.openxmlformats.org/officeDocument/2006/relationships" xmlns:p1510="http://schemas.microsoft.com/office/powerpoint/2015/10/main"/>
-</file>
-
 <file path=ppt/handoutMasters/handoutMaster1.xml><?xml version="1.0" encoding="utf-8"?>
 <p:handoutMaster xmlns:a="http://schemas.openxmlformats.org/drawingml/2006/main" xmlns:r="http://schemas.openxmlformats.org/officeDocument/2006/relationships" xmlns:p="http://schemas.openxmlformats.org/presentationml/2006/main">
   <p:cSld>
@@ -626,6 +626,98 @@
 </p:notes>
 </file>
 
+<file path=ppt/notesSlides/notesSlide10.xml><?xml version="1.0" encoding="utf-8"?>
+<p:notes xmlns:a="http://schemas.openxmlformats.org/drawingml/2006/main" xmlns:r="http://schemas.openxmlformats.org/officeDocument/2006/relationships" xmlns:p="http://schemas.openxmlformats.org/presentationml/2006/main">
+  <p:cSld>
+    <p:spTree>
+      <p:nvGrpSpPr>
+        <p:cNvPr id="1" name=""/>
+        <p:cNvGrpSpPr/>
+        <p:nvPr/>
+      </p:nvGrpSpPr>
+      <p:grpSpPr>
+        <a:xfrm>
+          <a:off x="0" y="0"/>
+          <a:ext cx="0" cy="0"/>
+          <a:chOff x="0" y="0"/>
+          <a:chExt cx="0" cy="0"/>
+        </a:xfrm>
+      </p:grpSpPr>
+      <p:sp>
+        <p:nvSpPr>
+          <p:cNvPr id="4" name="Slide Number Placeholder 3"/>
+          <p:cNvSpPr>
+            <a:spLocks noGrp="1"/>
+          </p:cNvSpPr>
+          <p:nvPr>
+            <p:ph type="sldNum" sz="quarter" idx="10"/>
+          </p:nvPr>
+        </p:nvSpPr>
+        <p:spPr/>
+        <p:txBody>
+          <a:bodyPr/>
+          <a:lstStyle/>
+          <a:p>
+            <a:fld id="{7D8C2C35-2B8A-446E-BEC0-FD36716C29AC}" type="slidenum">
+              <a:rPr lang="de-DE" smtClean="0"/>
+              <a:pPr/>
+              <a:t>12</a:t>
+            </a:fld>
+            <a:endParaRPr lang="de-DE" dirty="0"/>
+          </a:p>
+        </p:txBody>
+      </p:sp>
+      <p:sp>
+        <p:nvSpPr>
+          <p:cNvPr id="6" name="Slide Image Placeholder 5"/>
+          <p:cNvSpPr>
+            <a:spLocks noGrp="1" noRot="1" noChangeAspect="1"/>
+          </p:cNvSpPr>
+          <p:nvPr>
+            <p:ph type="sldImg"/>
+          </p:nvPr>
+        </p:nvSpPr>
+        <p:spPr>
+          <a:xfrm>
+            <a:off x="547688" y="612775"/>
+            <a:ext cx="5762625" cy="3241675"/>
+          </a:xfrm>
+        </p:spPr>
+      </p:sp>
+      <p:sp>
+        <p:nvSpPr>
+          <p:cNvPr id="7" name="Notes Placeholder 6"/>
+          <p:cNvSpPr>
+            <a:spLocks noGrp="1"/>
+          </p:cNvSpPr>
+          <p:nvPr>
+            <p:ph type="body" idx="1"/>
+          </p:nvPr>
+        </p:nvSpPr>
+        <p:spPr/>
+        <p:txBody>
+          <a:bodyPr>
+            <a:normAutofit/>
+          </a:bodyPr>
+          <a:lstStyle/>
+          <a:p>
+            <a:endParaRPr lang="en-US"/>
+          </a:p>
+        </p:txBody>
+      </p:sp>
+    </p:spTree>
+    <p:extLst>
+      <p:ext uri="{BB962C8B-B14F-4D97-AF65-F5344CB8AC3E}">
+        <p14:creationId xmlns:p14="http://schemas.microsoft.com/office/powerpoint/2010/main" val="2544264309"/>
+      </p:ext>
+    </p:extLst>
+  </p:cSld>
+  <p:clrMapOvr>
+    <a:masterClrMapping/>
+  </p:clrMapOvr>
+</p:notes>
+</file>
+
 <file path=ppt/notesSlides/notesSlide2.xml><?xml version="1.0" encoding="utf-8"?>
 <p:notes xmlns:a="http://schemas.openxmlformats.org/drawingml/2006/main" xmlns:r="http://schemas.openxmlformats.org/officeDocument/2006/relationships" xmlns:p="http://schemas.openxmlformats.org/presentationml/2006/main">
   <p:cSld>
@@ -800,19 +892,7 @@
           <a:bodyPr/>
           <a:lstStyle/>
           <a:p>
-            <a:r>
-              <a:rPr lang="en-US" dirty="0"/>
-              <a:t>Images are kept in 'docker registries'. The docker runtime will look in the configured registry when it needs to load an image (e.g. for a 'docker run'). When it doesn't have the image already in its local cache, it will load it from the registry. </a:t>
-            </a:r>
-          </a:p>
-          <a:p>
-            <a:endParaRPr lang="en-US" dirty="0"/>
-          </a:p>
-          <a:p>
-            <a:r>
-              <a:rPr lang="en-US" dirty="0"/>
-              <a:t>The default registry is the docker hub: hub.docker.com. You can also have local registries, e.g. to have tight control of what goes in. </a:t>
-            </a:r>
+            <a:endParaRPr lang="de-DE" dirty="0"/>
           </a:p>
         </p:txBody>
       </p:sp>
@@ -843,7 +923,7 @@
     </p:spTree>
     <p:extLst>
       <p:ext uri="{BB962C8B-B14F-4D97-AF65-F5344CB8AC3E}">
-        <p14:creationId xmlns:p14="http://schemas.microsoft.com/office/powerpoint/2010/main" val="3472124184"/>
+        <p14:creationId xmlns:p14="http://schemas.microsoft.com/office/powerpoint/2010/main" val="1555985175"/>
       </p:ext>
     </p:extLst>
   </p:cSld>
@@ -894,34 +974,236 @@
         </p:nvSpPr>
         <p:spPr/>
         <p:txBody>
-          <a:bodyPr/>
+          <a:bodyPr>
+            <a:normAutofit/>
+          </a:bodyPr>
           <a:lstStyle/>
           <a:p>
-            <a:r>
-              <a:rPr lang="en-US" dirty="0"/>
-              <a:t>The docker hub offers (provides storage and the push/pull protocol for) docker images. </a:t>
-            </a:r>
-          </a:p>
-          <a:p>
-            <a:r>
-              <a:rPr lang="en-US" dirty="0"/>
-              <a:t>Each docker image has a clearly specified version. There can be multiple version tags. </a:t>
-            </a:r>
-          </a:p>
-          <a:p>
-            <a:r>
-              <a:rPr lang="en-US" dirty="0"/>
-              <a:t>The 'Dockerfile' defines the automated build instructions and show what is in the image. (see Dockerfile chapter). Dockerfiles are also included in images and document the contents.</a:t>
-            </a:r>
-          </a:p>
-          <a:p>
-            <a:endParaRPr lang="en-US" dirty="0"/>
-          </a:p>
-          <a:p>
-            <a:r>
-              <a:rPr lang="en-US" dirty="0"/>
-              <a:t>At SAP, Artifactory is the preferred solution to host and distribute your Docker images.</a:t>
-            </a:r>
+            <a:pPr marL="0" indent="0">
+              <a:buFontTx/>
+              <a:buNone/>
+            </a:pPr>
+            <a:r>
+              <a:rPr lang="en-US" b="0" dirty="0"/>
+              <a:t>Let’s take a closer look at the images.</a:t>
+            </a:r>
+          </a:p>
+          <a:p>
+            <a:pPr marL="0" indent="0">
+              <a:buFontTx/>
+              <a:buNone/>
+            </a:pPr>
+            <a:endParaRPr lang="en-US" b="0" dirty="0"/>
+          </a:p>
+          <a:p>
+            <a:pPr marL="0" indent="0">
+              <a:buFontTx/>
+              <a:buNone/>
+            </a:pPr>
+            <a:r>
+              <a:rPr lang="en-US" b="0" dirty="0"/>
+              <a:t>From the docker cli, you have several ways of accessing them:</a:t>
+            </a:r>
+          </a:p>
+          <a:p>
+            <a:pPr marL="285750" indent="-285750">
+              <a:buFontTx/>
+              <a:buChar char="-"/>
+            </a:pPr>
+            <a:r>
+              <a:rPr lang="en-US" b="0" dirty="0"/>
+              <a:t>docker image list </a:t>
+            </a:r>
+            <a:r>
+              <a:rPr lang="en-US" b="0" dirty="0">
+                <a:sym typeface="Wingdings" panose="05000000000000000000" pitchFamily="2" charset="2"/>
+              </a:rPr>
+              <a:t> gives you all downloaded images</a:t>
+            </a:r>
+          </a:p>
+          <a:p>
+            <a:pPr marL="285750" indent="-285750">
+              <a:buFontTx/>
+              <a:buChar char="-"/>
+            </a:pPr>
+            <a:r>
+              <a:rPr lang="en-US" b="0" dirty="0">
+                <a:sym typeface="Wingdings" panose="05000000000000000000" pitchFamily="2" charset="2"/>
+              </a:rPr>
+              <a:t>docker inspect &lt;image&gt;:&lt;tag&gt;  gives you meta info on the image incl. CMD/</a:t>
+            </a:r>
+            <a:r>
+              <a:rPr lang="en-US" b="0" dirty="0" err="1">
+                <a:sym typeface="Wingdings" panose="05000000000000000000" pitchFamily="2" charset="2"/>
+              </a:rPr>
+              <a:t>Entrypoint</a:t>
+            </a:r>
+            <a:r>
+              <a:rPr lang="en-US" b="0" dirty="0">
+                <a:sym typeface="Wingdings" panose="05000000000000000000" pitchFamily="2" charset="2"/>
+              </a:rPr>
+              <a:t>, ports </a:t>
+            </a:r>
+            <a:r>
+              <a:rPr lang="en-US" b="0" dirty="0" err="1">
+                <a:sym typeface="Wingdings" panose="05000000000000000000" pitchFamily="2" charset="2"/>
+              </a:rPr>
+              <a:t>etc</a:t>
+            </a:r>
+            <a:endParaRPr lang="en-US" b="0" dirty="0">
+              <a:sym typeface="Wingdings" panose="05000000000000000000" pitchFamily="2" charset="2"/>
+            </a:endParaRPr>
+          </a:p>
+          <a:p>
+            <a:pPr marL="285750" indent="-285750">
+              <a:buFontTx/>
+              <a:buChar char="-"/>
+            </a:pPr>
+            <a:r>
+              <a:rPr lang="en-US" b="0" dirty="0">
+                <a:sym typeface="Wingdings" panose="05000000000000000000" pitchFamily="2" charset="2"/>
+              </a:rPr>
+              <a:t>docker history &lt;image&gt;:&lt;tag&gt;  gives you the image’s history</a:t>
+            </a:r>
+          </a:p>
+          <a:p>
+            <a:pPr marL="285750" indent="-285750">
+              <a:buFontTx/>
+              <a:buChar char="-"/>
+            </a:pPr>
+            <a:endParaRPr lang="en-US" b="0" dirty="0">
+              <a:sym typeface="Wingdings" panose="05000000000000000000" pitchFamily="2" charset="2"/>
+            </a:endParaRPr>
+          </a:p>
+          <a:p>
+            <a:pPr marL="0" indent="0">
+              <a:buFontTx/>
+              <a:buNone/>
+            </a:pPr>
+            <a:r>
+              <a:rPr lang="en-US" b="0" dirty="0">
+                <a:sym typeface="Wingdings" panose="05000000000000000000" pitchFamily="2" charset="2"/>
+              </a:rPr>
+              <a:t>Show these commands for any available image like </a:t>
+            </a:r>
+            <a:r>
+              <a:rPr lang="en-US" b="0" dirty="0" err="1">
+                <a:sym typeface="Wingdings" panose="05000000000000000000" pitchFamily="2" charset="2"/>
+              </a:rPr>
+              <a:t>nginx</a:t>
+            </a:r>
+            <a:endParaRPr lang="en-US" b="0" dirty="0">
+              <a:sym typeface="Wingdings" panose="05000000000000000000" pitchFamily="2" charset="2"/>
+            </a:endParaRPr>
+          </a:p>
+          <a:p>
+            <a:pPr marL="0" indent="0">
+              <a:buFontTx/>
+              <a:buNone/>
+            </a:pPr>
+            <a:endParaRPr lang="en-US" b="0" dirty="0">
+              <a:sym typeface="Wingdings" panose="05000000000000000000" pitchFamily="2" charset="2"/>
+            </a:endParaRPr>
+          </a:p>
+          <a:p>
+            <a:pPr marL="0" indent="0">
+              <a:buFontTx/>
+              <a:buNone/>
+            </a:pPr>
+            <a:r>
+              <a:rPr lang="en-US" b="0" dirty="0">
+                <a:sym typeface="Wingdings" panose="05000000000000000000" pitchFamily="2" charset="2"/>
+              </a:rPr>
+              <a:t>Next, demo the commit command:</a:t>
+            </a:r>
+          </a:p>
+          <a:p>
+            <a:pPr marL="285750" indent="-285750">
+              <a:buFontTx/>
+              <a:buChar char="-"/>
+            </a:pPr>
+            <a:r>
+              <a:rPr lang="en-US" b="0" dirty="0">
+                <a:sym typeface="Wingdings" panose="05000000000000000000" pitchFamily="2" charset="2"/>
+              </a:rPr>
+              <a:t>docker run -it </a:t>
+            </a:r>
+            <a:r>
+              <a:rPr lang="en-US" b="0" dirty="0" err="1">
+                <a:sym typeface="Wingdings" panose="05000000000000000000" pitchFamily="2" charset="2"/>
+              </a:rPr>
+              <a:t>nginx:mainline</a:t>
+            </a:r>
+            <a:r>
+              <a:rPr lang="en-US" b="0" dirty="0">
+                <a:sym typeface="Wingdings" panose="05000000000000000000" pitchFamily="2" charset="2"/>
+              </a:rPr>
+              <a:t> /bin/bash</a:t>
+            </a:r>
+          </a:p>
+          <a:p>
+            <a:pPr marL="285750" indent="-285750">
+              <a:buFontTx/>
+              <a:buChar char="-"/>
+            </a:pPr>
+            <a:r>
+              <a:rPr lang="en-US" b="0" dirty="0">
+                <a:sym typeface="Wingdings" panose="05000000000000000000" pitchFamily="2" charset="2"/>
+              </a:rPr>
+              <a:t>Create a file &amp; exit</a:t>
+            </a:r>
+          </a:p>
+          <a:p>
+            <a:pPr marL="285750" indent="-285750">
+              <a:buFontTx/>
+              <a:buChar char="-"/>
+            </a:pPr>
+            <a:r>
+              <a:rPr lang="en-US" b="0" dirty="0">
+                <a:sym typeface="Wingdings" panose="05000000000000000000" pitchFamily="2" charset="2"/>
+              </a:rPr>
+              <a:t>run “docker commit &lt;container&gt; &lt;repo-name&gt;:&lt;tag&gt;</a:t>
+            </a:r>
+          </a:p>
+          <a:p>
+            <a:pPr marL="285750" indent="-285750">
+              <a:buFontTx/>
+              <a:buChar char="-"/>
+            </a:pPr>
+            <a:endParaRPr lang="en-US" b="0" dirty="0">
+              <a:sym typeface="Wingdings" panose="05000000000000000000" pitchFamily="2" charset="2"/>
+            </a:endParaRPr>
+          </a:p>
+          <a:p>
+            <a:pPr marL="0" indent="0">
+              <a:buFontTx/>
+              <a:buNone/>
+            </a:pPr>
+            <a:r>
+              <a:rPr lang="en-US" b="0" dirty="0">
+                <a:sym typeface="Wingdings" panose="05000000000000000000" pitchFamily="2" charset="2"/>
+              </a:rPr>
+              <a:t>Now re-run the history </a:t>
+            </a:r>
+            <a:r>
+              <a:rPr lang="en-US" b="0" dirty="0" err="1">
+                <a:sym typeface="Wingdings" panose="05000000000000000000" pitchFamily="2" charset="2"/>
+              </a:rPr>
+              <a:t>cmd</a:t>
+            </a:r>
+            <a:r>
+              <a:rPr lang="en-US" b="0" dirty="0">
+                <a:sym typeface="Wingdings" panose="05000000000000000000" pitchFamily="2" charset="2"/>
+              </a:rPr>
+              <a:t> on your newly created image. Discuss the added layer and the visible information vs. what you did.</a:t>
+            </a:r>
+          </a:p>
+          <a:p>
+            <a:pPr marL="285750" indent="-285750">
+              <a:buFontTx/>
+              <a:buChar char="-"/>
+            </a:pPr>
+            <a:endParaRPr lang="en-US" b="0" dirty="0"/>
           </a:p>
         </p:txBody>
       </p:sp>
@@ -952,7 +1234,7 @@
     </p:spTree>
     <p:extLst>
       <p:ext uri="{BB962C8B-B14F-4D97-AF65-F5344CB8AC3E}">
-        <p14:creationId xmlns:p14="http://schemas.microsoft.com/office/powerpoint/2010/main" val="2563895036"/>
+        <p14:creationId xmlns:p14="http://schemas.microsoft.com/office/powerpoint/2010/main" val="2468237856"/>
       </p:ext>
     </p:extLst>
   </p:cSld>
@@ -1006,7 +1288,36 @@
           <a:bodyPr/>
           <a:lstStyle/>
           <a:p>
-            <a:endParaRPr lang="de-DE" dirty="0"/>
+            <a:r>
+              <a:rPr lang="en-US" dirty="0"/>
+              <a:t>Images are kept in 'docker registries'. The docker runtime will look in the configured registry when it needs to load an image (e.g. for a 'docker run'). When it doesn't have the image already in its local cache, it will load it from the registry. </a:t>
+            </a:r>
+          </a:p>
+          <a:p>
+            <a:endParaRPr lang="en-US" dirty="0"/>
+          </a:p>
+          <a:p>
+            <a:r>
+              <a:rPr lang="en-US" dirty="0"/>
+              <a:t>The default registry is the docker hub: hub.docker.com. You can also have local registries, e.g. to have tight control of what goes in. </a:t>
+            </a:r>
+          </a:p>
+          <a:p>
+            <a:endParaRPr lang="en-US" dirty="0"/>
+          </a:p>
+          <a:p>
+            <a:r>
+              <a:rPr lang="en-US" dirty="0"/>
+              <a:t>Registries can have a private section which requires a login. With “docker login” you can store your credentials locally (~/.docker/</a:t>
+            </a:r>
+            <a:r>
+              <a:rPr lang="en-US" dirty="0" err="1"/>
+              <a:t>config.json</a:t>
+            </a:r>
+            <a:r>
+              <a:rPr lang="en-US" dirty="0"/>
+              <a:t>) and authorize your requests.</a:t>
+            </a:r>
           </a:p>
         </p:txBody>
       </p:sp>
@@ -1037,7 +1348,7 @@
     </p:spTree>
     <p:extLst>
       <p:ext uri="{BB962C8B-B14F-4D97-AF65-F5344CB8AC3E}">
-        <p14:creationId xmlns:p14="http://schemas.microsoft.com/office/powerpoint/2010/main" val="1555985175"/>
+        <p14:creationId xmlns:p14="http://schemas.microsoft.com/office/powerpoint/2010/main" val="3472124184"/>
       </p:ext>
     </p:extLst>
   </p:cSld>
@@ -1066,6 +1377,61 @@
       </p:grpSpPr>
       <p:sp>
         <p:nvSpPr>
+          <p:cNvPr id="2" name="Slide Image Placeholder 1"/>
+          <p:cNvSpPr>
+            <a:spLocks noGrp="1" noRot="1" noChangeAspect="1"/>
+          </p:cNvSpPr>
+          <p:nvPr>
+            <p:ph type="sldImg"/>
+          </p:nvPr>
+        </p:nvSpPr>
+        <p:spPr/>
+      </p:sp>
+      <p:sp>
+        <p:nvSpPr>
+          <p:cNvPr id="3" name="Notes Placeholder 2"/>
+          <p:cNvSpPr>
+            <a:spLocks noGrp="1"/>
+          </p:cNvSpPr>
+          <p:nvPr>
+            <p:ph type="body" idx="1"/>
+          </p:nvPr>
+        </p:nvSpPr>
+        <p:spPr/>
+        <p:txBody>
+          <a:bodyPr/>
+          <a:lstStyle/>
+          <a:p>
+            <a:r>
+              <a:rPr lang="en-US" dirty="0"/>
+              <a:t>The docker hub offers (provides storage and the push/pull protocol for) docker images. </a:t>
+            </a:r>
+          </a:p>
+          <a:p>
+            <a:r>
+              <a:rPr lang="en-US" dirty="0"/>
+              <a:t>Each docker image has a clearly specified version. There can be multiple version tags. </a:t>
+            </a:r>
+          </a:p>
+          <a:p>
+            <a:r>
+              <a:rPr lang="en-US" dirty="0"/>
+              <a:t>The 'Dockerfile' defines the automated build instructions and show what is in the image. (see Dockerfile chapter). Dockerfiles are also included in images and document the contents.</a:t>
+            </a:r>
+          </a:p>
+          <a:p>
+            <a:endParaRPr lang="en-US" dirty="0"/>
+          </a:p>
+          <a:p>
+            <a:r>
+              <a:rPr lang="en-US" dirty="0"/>
+              <a:t>At SAP, Artifactory is the preferred solution to host and distribute your Docker images.</a:t>
+            </a:r>
+          </a:p>
+        </p:txBody>
+      </p:sp>
+      <p:sp>
+        <p:nvSpPr>
           <p:cNvPr id="4" name="Slide Number Placeholder 3"/>
           <p:cNvSpPr>
             <a:spLocks noGrp="1"/>
@@ -1088,9 +1454,39 @@
           </a:p>
         </p:txBody>
       </p:sp>
+    </p:spTree>
+    <p:extLst>
+      <p:ext uri="{BB962C8B-B14F-4D97-AF65-F5344CB8AC3E}">
+        <p14:creationId xmlns:p14="http://schemas.microsoft.com/office/powerpoint/2010/main" val="2563895036"/>
+      </p:ext>
+    </p:extLst>
+  </p:cSld>
+  <p:clrMapOvr>
+    <a:masterClrMapping/>
+  </p:clrMapOvr>
+</p:notes>
+</file>
+
+<file path=ppt/notesSlides/notesSlide7.xml><?xml version="1.0" encoding="utf-8"?>
+<p:notes xmlns:a="http://schemas.openxmlformats.org/drawingml/2006/main" xmlns:r="http://schemas.openxmlformats.org/officeDocument/2006/relationships" xmlns:p="http://schemas.openxmlformats.org/presentationml/2006/main">
+  <p:cSld>
+    <p:spTree>
+      <p:nvGrpSpPr>
+        <p:cNvPr id="1" name=""/>
+        <p:cNvGrpSpPr/>
+        <p:nvPr/>
+      </p:nvGrpSpPr>
+      <p:grpSpPr>
+        <a:xfrm>
+          <a:off x="0" y="0"/>
+          <a:ext cx="0" cy="0"/>
+          <a:chOff x="0" y="0"/>
+          <a:chExt cx="0" cy="0"/>
+        </a:xfrm>
+      </p:grpSpPr>
       <p:sp>
         <p:nvSpPr>
-          <p:cNvPr id="6" name="Slide Image Placeholder 5"/>
+          <p:cNvPr id="2" name="Slide Image Placeholder 1"/>
           <p:cNvSpPr>
             <a:spLocks noGrp="1" noRot="1" noChangeAspect="1"/>
           </p:cNvSpPr>
@@ -1098,16 +1494,11 @@
             <p:ph type="sldImg"/>
           </p:nvPr>
         </p:nvSpPr>
-        <p:spPr>
-          <a:xfrm>
-            <a:off x="547688" y="612775"/>
-            <a:ext cx="5762625" cy="3241675"/>
-          </a:xfrm>
-        </p:spPr>
+        <p:spPr/>
       </p:sp>
       <p:sp>
         <p:nvSpPr>
-          <p:cNvPr id="7" name="Notes Placeholder 6"/>
+          <p:cNvPr id="3" name="Notes Placeholder 2"/>
           <p:cNvSpPr>
             <a:spLocks noGrp="1"/>
           </p:cNvSpPr>
@@ -1118,18 +1509,482 @@
         <p:spPr/>
         <p:txBody>
           <a:bodyPr>
-            <a:normAutofit/>
+            <a:normAutofit lnSpcReduction="10000"/>
           </a:bodyPr>
           <a:lstStyle/>
           <a:p>
-            <a:endParaRPr lang="en-US"/>
+            <a:r>
+              <a:rPr lang="en-US" dirty="0"/>
+              <a:t>Let’s talk about image names and tags. Docker has a system of creating URIs for any image, where the URI includes the registry as well as the image name &amp; tag.</a:t>
+            </a:r>
+          </a:p>
+          <a:p>
+            <a:endParaRPr lang="en-US" dirty="0"/>
+          </a:p>
+          <a:p>
+            <a:pPr marL="285750" indent="-285750">
+              <a:buFontTx/>
+              <a:buChar char="-"/>
+            </a:pPr>
+            <a:r>
+              <a:rPr lang="en-US" dirty="0"/>
+              <a:t>Registry URL: the registry this image has been downloaded from or where it should be uploaded to. Docker is also configured with a default registry (run “docker info” to get the info). For most installations this will be hub.docker.com (translates to https://index.docker.io/v1/). So or any image related to the docker hub, the registry URL string is omitted. </a:t>
+            </a:r>
+          </a:p>
+          <a:p>
+            <a:pPr marL="285750" indent="-285750">
+              <a:buFontTx/>
+              <a:buChar char="-"/>
+            </a:pPr>
+            <a:r>
+              <a:rPr lang="en-US" dirty="0"/>
+              <a:t>Repository: you could also call it the image’s name. Can contain subfolders. When you download images from docker hub you will only see the repo name here, no registry URL.</a:t>
+            </a:r>
+          </a:p>
+          <a:p>
+            <a:pPr marL="285750" indent="-285750">
+              <a:buFontTx/>
+              <a:buChar char="-"/>
+            </a:pPr>
+            <a:r>
+              <a:rPr lang="en-US" dirty="0"/>
+              <a:t>Tag: alpha-numeric string, free text. Anybody with write permissions on the repo can re-upload a different image with the same tag. Last write wins ;) however usually version tags are quite stable. The tag “latest” however is a moving target and you can never be sure about it’s content. If “latest” is not updated, there might be even a newer version available without noticing. But be careful, when downloading an image without specifying a tag, “latest” will be used implicitly. </a:t>
+            </a:r>
+          </a:p>
+          <a:p>
+            <a:pPr marL="285750" indent="-285750">
+              <a:buFontTx/>
+              <a:buChar char="-"/>
+            </a:pPr>
+            <a:endParaRPr lang="en-US" dirty="0"/>
+          </a:p>
+          <a:p>
+            <a:pPr marL="0" indent="0">
+              <a:buFontTx/>
+              <a:buNone/>
+            </a:pPr>
+            <a:r>
+              <a:rPr lang="en-US" dirty="0"/>
+              <a:t>How to use tagging? Docker knows a “tag” command, so let’s have look:</a:t>
+            </a:r>
+          </a:p>
+          <a:p>
+            <a:pPr marL="285750" indent="-285750">
+              <a:buFontTx/>
+              <a:buChar char="-"/>
+            </a:pPr>
+            <a:r>
+              <a:rPr lang="en-US" dirty="0"/>
+              <a:t>Tagging works like creating a </a:t>
+            </a:r>
+            <a:r>
+              <a:rPr lang="en-US" dirty="0" err="1"/>
+              <a:t>sym</a:t>
+            </a:r>
+            <a:r>
+              <a:rPr lang="en-US" dirty="0"/>
+              <a:t>-link on Linux. You can have as many different references to an images as you want.</a:t>
+            </a:r>
+          </a:p>
+          <a:p>
+            <a:pPr marL="285750" indent="-285750">
+              <a:buFontTx/>
+              <a:buChar char="-"/>
+            </a:pPr>
+            <a:r>
+              <a:rPr lang="en-US" dirty="0"/>
+              <a:t>To tag an image, you can reference it either by its ID or its </a:t>
+            </a:r>
+            <a:r>
+              <a:rPr lang="en-US" dirty="0" err="1"/>
+              <a:t>repository:tag</a:t>
+            </a:r>
+            <a:r>
+              <a:rPr lang="en-US" dirty="0"/>
+              <a:t> link.</a:t>
+            </a:r>
+          </a:p>
+          <a:p>
+            <a:pPr marL="285750" indent="-285750">
+              <a:buFontTx/>
+              <a:buChar char="-"/>
+            </a:pPr>
+            <a:r>
+              <a:rPr lang="en-US" dirty="0"/>
+              <a:t>Docker tag: assign the full string of registry URL + repo + version tag to an image</a:t>
+            </a:r>
+          </a:p>
+          <a:p>
+            <a:pPr marL="285750" indent="-285750">
+              <a:buFontTx/>
+              <a:buChar char="-"/>
+            </a:pPr>
+            <a:r>
+              <a:rPr lang="en-US" dirty="0"/>
+              <a:t>Docker push: send the image to the remote location, that is encoded in the image name</a:t>
+            </a:r>
+          </a:p>
+          <a:p>
+            <a:pPr marL="0" indent="0">
+              <a:buFontTx/>
+              <a:buNone/>
+            </a:pPr>
+            <a:endParaRPr lang="en-US" dirty="0"/>
+          </a:p>
+        </p:txBody>
+      </p:sp>
+      <p:sp>
+        <p:nvSpPr>
+          <p:cNvPr id="4" name="Slide Number Placeholder 3"/>
+          <p:cNvSpPr>
+            <a:spLocks noGrp="1"/>
+          </p:cNvSpPr>
+          <p:nvPr>
+            <p:ph type="sldNum" sz="quarter" idx="10"/>
+          </p:nvPr>
+        </p:nvSpPr>
+        <p:spPr/>
+        <p:txBody>
+          <a:bodyPr/>
+          <a:lstStyle/>
+          <a:p>
+            <a:fld id="{7D8C2C35-2B8A-446E-BEC0-FD36716C29AC}" type="slidenum">
+              <a:rPr lang="de-DE" smtClean="0"/>
+              <a:pPr/>
+              <a:t>9</a:t>
+            </a:fld>
+            <a:endParaRPr lang="de-DE" dirty="0"/>
           </a:p>
         </p:txBody>
       </p:sp>
     </p:spTree>
     <p:extLst>
       <p:ext uri="{BB962C8B-B14F-4D97-AF65-F5344CB8AC3E}">
-        <p14:creationId xmlns:p14="http://schemas.microsoft.com/office/powerpoint/2010/main" val="2544264309"/>
+        <p14:creationId xmlns:p14="http://schemas.microsoft.com/office/powerpoint/2010/main" val="1328423813"/>
+      </p:ext>
+    </p:extLst>
+  </p:cSld>
+  <p:clrMapOvr>
+    <a:masterClrMapping/>
+  </p:clrMapOvr>
+</p:notes>
+</file>
+
+<file path=ppt/notesSlides/notesSlide8.xml><?xml version="1.0" encoding="utf-8"?>
+<p:notes xmlns:a="http://schemas.openxmlformats.org/drawingml/2006/main" xmlns:r="http://schemas.openxmlformats.org/officeDocument/2006/relationships" xmlns:p="http://schemas.openxmlformats.org/presentationml/2006/main">
+  <p:cSld>
+    <p:spTree>
+      <p:nvGrpSpPr>
+        <p:cNvPr id="1" name=""/>
+        <p:cNvGrpSpPr/>
+        <p:nvPr/>
+      </p:nvGrpSpPr>
+      <p:grpSpPr>
+        <a:xfrm>
+          <a:off x="0" y="0"/>
+          <a:ext cx="0" cy="0"/>
+          <a:chOff x="0" y="0"/>
+          <a:chExt cx="0" cy="0"/>
+        </a:xfrm>
+      </p:grpSpPr>
+      <p:sp>
+        <p:nvSpPr>
+          <p:cNvPr id="2" name="Slide Image Placeholder 1"/>
+          <p:cNvSpPr>
+            <a:spLocks noGrp="1" noRot="1" noChangeAspect="1"/>
+          </p:cNvSpPr>
+          <p:nvPr>
+            <p:ph type="sldImg"/>
+          </p:nvPr>
+        </p:nvSpPr>
+        <p:spPr/>
+      </p:sp>
+      <p:sp>
+        <p:nvSpPr>
+          <p:cNvPr id="3" name="Notes Placeholder 2"/>
+          <p:cNvSpPr>
+            <a:spLocks noGrp="1"/>
+          </p:cNvSpPr>
+          <p:nvPr>
+            <p:ph type="body" idx="1"/>
+          </p:nvPr>
+        </p:nvSpPr>
+        <p:spPr/>
+        <p:txBody>
+          <a:bodyPr>
+            <a:normAutofit fontScale="62500" lnSpcReduction="20000"/>
+          </a:bodyPr>
+          <a:lstStyle/>
+          <a:p>
+            <a:pPr marL="0" indent="0">
+              <a:buFontTx/>
+              <a:buNone/>
+            </a:pPr>
+            <a:r>
+              <a:rPr lang="en-US" b="0" dirty="0"/>
+              <a:t>Prerequisites: you have trusted the certificate of the registry for this training (the one deployed into the cluster)</a:t>
+            </a:r>
+          </a:p>
+          <a:p>
+            <a:pPr marL="0" indent="0">
+              <a:buFontTx/>
+              <a:buNone/>
+            </a:pPr>
+            <a:endParaRPr lang="en-US" b="0" dirty="0"/>
+          </a:p>
+          <a:p>
+            <a:pPr marL="0" indent="0">
+              <a:buFontTx/>
+              <a:buNone/>
+            </a:pPr>
+            <a:r>
+              <a:rPr lang="en-US" b="0" dirty="0"/>
+              <a:t>Explain how to work with (remote) registries:</a:t>
+            </a:r>
+          </a:p>
+          <a:p>
+            <a:pPr marL="0" indent="0">
+              <a:buFontTx/>
+              <a:buNone/>
+            </a:pPr>
+            <a:endParaRPr lang="en-US" b="0" dirty="0"/>
+          </a:p>
+          <a:p>
+            <a:pPr marL="285750" indent="-285750">
+              <a:buFontTx/>
+              <a:buChar char="-"/>
+            </a:pPr>
+            <a:r>
+              <a:rPr lang="en-US" b="0" dirty="0"/>
+              <a:t>Docker image list</a:t>
+            </a:r>
+          </a:p>
+          <a:p>
+            <a:pPr marL="285750" indent="-285750">
+              <a:buFontTx/>
+              <a:buChar char="-"/>
+            </a:pPr>
+            <a:r>
+              <a:rPr lang="en-US" b="0" dirty="0"/>
+              <a:t>Next, tag one of the existing images with a different repo/tag combination like “docker tag </a:t>
+            </a:r>
+            <a:r>
+              <a:rPr lang="en-US" b="0" dirty="0" err="1"/>
+              <a:t>nginx:mainline</a:t>
+            </a:r>
+            <a:r>
+              <a:rPr lang="en-US" b="0" dirty="0"/>
+              <a:t> my-nginx:v0.1”</a:t>
+            </a:r>
+          </a:p>
+          <a:p>
+            <a:pPr marL="285750" indent="-285750">
+              <a:buFontTx/>
+              <a:buChar char="-"/>
+            </a:pPr>
+            <a:r>
+              <a:rPr lang="en-US" b="0" dirty="0"/>
+              <a:t>List the images again and outline that both </a:t>
+            </a:r>
+            <a:r>
+              <a:rPr lang="en-US" b="0" dirty="0" err="1"/>
+              <a:t>nginx:mainline</a:t>
+            </a:r>
+            <a:r>
+              <a:rPr lang="en-US" b="0" dirty="0"/>
+              <a:t> as well as my-nginx:v0.1 have the same image ID. The image is not stored twice but simply referenced by different names</a:t>
+            </a:r>
+          </a:p>
+          <a:p>
+            <a:pPr marL="285750" indent="-285750">
+              <a:buFontTx/>
+              <a:buChar char="-"/>
+            </a:pPr>
+            <a:r>
+              <a:rPr lang="en-US" b="0" dirty="0"/>
+              <a:t>Now you can tag the </a:t>
+            </a:r>
+            <a:r>
+              <a:rPr lang="en-US" b="0" dirty="0" err="1"/>
+              <a:t>niginx</a:t>
+            </a:r>
+            <a:r>
+              <a:rPr lang="en-US" b="0" dirty="0"/>
+              <a:t> with the URL of your remote registry as well </a:t>
+            </a:r>
+            <a:r>
+              <a:rPr lang="en-US" b="0" dirty="0" err="1"/>
+              <a:t>registry.ingress</a:t>
+            </a:r>
+            <a:r>
+              <a:rPr lang="en-US" b="0" dirty="0"/>
+              <a:t>.&lt;</a:t>
+            </a:r>
+            <a:r>
+              <a:rPr lang="en-US" b="0" dirty="0" err="1"/>
+              <a:t>clustername</a:t>
+            </a:r>
+            <a:r>
+              <a:rPr lang="en-US" b="0" dirty="0"/>
+              <a:t>&gt;.k8s-train.shoot.canary.k8s-hana.ondemand.com/nginx:v0.1</a:t>
+            </a:r>
+          </a:p>
+          <a:p>
+            <a:pPr marL="285750" indent="-285750">
+              <a:buFontTx/>
+              <a:buChar char="-"/>
+            </a:pPr>
+            <a:r>
+              <a:rPr lang="en-US" b="0" dirty="0"/>
+              <a:t>Push the image to the remote location (use the full string again): docker push </a:t>
+            </a:r>
+            <a:r>
+              <a:rPr lang="en-US" b="0" dirty="0" err="1"/>
+              <a:t>registry.ingress</a:t>
+            </a:r>
+            <a:r>
+              <a:rPr lang="en-US" b="0" dirty="0"/>
+              <a:t>.&lt;</a:t>
+            </a:r>
+            <a:r>
+              <a:rPr lang="en-US" b="0" dirty="0" err="1"/>
+              <a:t>clustername</a:t>
+            </a:r>
+            <a:r>
+              <a:rPr lang="en-US" b="0" dirty="0"/>
+              <a:t>&gt;.k8s-train.shoot.canary.k8s-hana.ondemand.com/nginx:v0.1</a:t>
+            </a:r>
+          </a:p>
+          <a:p>
+            <a:pPr marL="285750" indent="-285750">
+              <a:buFontTx/>
+              <a:buChar char="-"/>
+            </a:pPr>
+            <a:r>
+              <a:rPr lang="en-US" b="0" dirty="0"/>
+              <a:t>If you get a certificate error, you haven’t trusted the CA that signed the registries certificates. If anyone of the participants face this issue, they should re-run the get_kube_config.sh script and restart their docker </a:t>
+            </a:r>
+            <a:r>
+              <a:rPr lang="en-US" b="0"/>
+              <a:t>daemon.</a:t>
+            </a:r>
+            <a:endParaRPr lang="en-US" b="0" dirty="0"/>
+          </a:p>
+        </p:txBody>
+      </p:sp>
+      <p:sp>
+        <p:nvSpPr>
+          <p:cNvPr id="4" name="Slide Number Placeholder 3"/>
+          <p:cNvSpPr>
+            <a:spLocks noGrp="1"/>
+          </p:cNvSpPr>
+          <p:nvPr>
+            <p:ph type="sldNum" sz="quarter" idx="10"/>
+          </p:nvPr>
+        </p:nvSpPr>
+        <p:spPr/>
+        <p:txBody>
+          <a:bodyPr/>
+          <a:lstStyle/>
+          <a:p>
+            <a:fld id="{7D8C2C35-2B8A-446E-BEC0-FD36716C29AC}" type="slidenum">
+              <a:rPr lang="de-DE" smtClean="0"/>
+              <a:pPr/>
+              <a:t>10</a:t>
+            </a:fld>
+            <a:endParaRPr lang="de-DE" dirty="0"/>
+          </a:p>
+        </p:txBody>
+      </p:sp>
+    </p:spTree>
+    <p:extLst>
+      <p:ext uri="{BB962C8B-B14F-4D97-AF65-F5344CB8AC3E}">
+        <p14:creationId xmlns:p14="http://schemas.microsoft.com/office/powerpoint/2010/main" val="15345096"/>
+      </p:ext>
+    </p:extLst>
+  </p:cSld>
+  <p:clrMapOvr>
+    <a:masterClrMapping/>
+  </p:clrMapOvr>
+</p:notes>
+</file>
+
+<file path=ppt/notesSlides/notesSlide9.xml><?xml version="1.0" encoding="utf-8"?>
+<p:notes xmlns:a="http://schemas.openxmlformats.org/drawingml/2006/main" xmlns:r="http://schemas.openxmlformats.org/officeDocument/2006/relationships" xmlns:p="http://schemas.openxmlformats.org/presentationml/2006/main">
+  <p:cSld>
+    <p:spTree>
+      <p:nvGrpSpPr>
+        <p:cNvPr id="1" name=""/>
+        <p:cNvGrpSpPr/>
+        <p:nvPr/>
+      </p:nvGrpSpPr>
+      <p:grpSpPr>
+        <a:xfrm>
+          <a:off x="0" y="0"/>
+          <a:ext cx="0" cy="0"/>
+          <a:chOff x="0" y="0"/>
+          <a:chExt cx="0" cy="0"/>
+        </a:xfrm>
+      </p:grpSpPr>
+      <p:sp>
+        <p:nvSpPr>
+          <p:cNvPr id="2" name="Slide Image Placeholder 1"/>
+          <p:cNvSpPr>
+            <a:spLocks noGrp="1" noRot="1" noChangeAspect="1"/>
+          </p:cNvSpPr>
+          <p:nvPr>
+            <p:ph type="sldImg"/>
+          </p:nvPr>
+        </p:nvSpPr>
+        <p:spPr/>
+      </p:sp>
+      <p:sp>
+        <p:nvSpPr>
+          <p:cNvPr id="3" name="Notes Placeholder 2"/>
+          <p:cNvSpPr>
+            <a:spLocks noGrp="1"/>
+          </p:cNvSpPr>
+          <p:nvPr>
+            <p:ph type="body" idx="1"/>
+          </p:nvPr>
+        </p:nvSpPr>
+        <p:spPr/>
+        <p:txBody>
+          <a:bodyPr/>
+          <a:lstStyle/>
+          <a:p>
+            <a:endParaRPr lang="en-US" dirty="0"/>
+          </a:p>
+        </p:txBody>
+      </p:sp>
+      <p:sp>
+        <p:nvSpPr>
+          <p:cNvPr id="4" name="Slide Number Placeholder 3"/>
+          <p:cNvSpPr>
+            <a:spLocks noGrp="1"/>
+          </p:cNvSpPr>
+          <p:nvPr>
+            <p:ph type="sldNum" sz="quarter" idx="10"/>
+          </p:nvPr>
+        </p:nvSpPr>
+        <p:spPr/>
+        <p:txBody>
+          <a:bodyPr/>
+          <a:lstStyle/>
+          <a:p>
+            <a:fld id="{7D8C2C35-2B8A-446E-BEC0-FD36716C29AC}" type="slidenum">
+              <a:rPr lang="de-DE" smtClean="0"/>
+              <a:pPr/>
+              <a:t>11</a:t>
+            </a:fld>
+            <a:endParaRPr lang="de-DE" dirty="0"/>
+          </a:p>
+        </p:txBody>
+      </p:sp>
+    </p:spTree>
+    <p:extLst>
+      <p:ext uri="{BB962C8B-B14F-4D97-AF65-F5344CB8AC3E}">
+        <p14:creationId xmlns:p14="http://schemas.microsoft.com/office/powerpoint/2010/main" val="80764537"/>
       </p:ext>
     </p:extLst>
   </p:cSld>
@@ -8680,6 +9535,208 @@
 </p:sld>
 </file>
 
+<file path=ppt/slides/slide10.xml><?xml version="1.0" encoding="utf-8"?>
+<p:sld xmlns:a="http://schemas.openxmlformats.org/drawingml/2006/main" xmlns:r="http://schemas.openxmlformats.org/officeDocument/2006/relationships" xmlns:p="http://schemas.openxmlformats.org/presentationml/2006/main">
+  <p:cSld>
+    <p:spTree>
+      <p:nvGrpSpPr>
+        <p:cNvPr id="1" name=""/>
+        <p:cNvGrpSpPr/>
+        <p:nvPr/>
+      </p:nvGrpSpPr>
+      <p:grpSpPr>
+        <a:xfrm>
+          <a:off x="0" y="0"/>
+          <a:ext cx="0" cy="0"/>
+          <a:chOff x="0" y="0"/>
+          <a:chExt cx="0" cy="0"/>
+        </a:xfrm>
+      </p:grpSpPr>
+      <p:sp>
+        <p:nvSpPr>
+          <p:cNvPr id="4" name="Title 3">
+            <a:extLst>
+              <a:ext uri="{FF2B5EF4-FFF2-40B4-BE49-F238E27FC236}">
+                <a16:creationId xmlns:a16="http://schemas.microsoft.com/office/drawing/2014/main" id="{96BEB1A8-C9D3-4723-A64F-42E02E22325A}"/>
+              </a:ext>
+            </a:extLst>
+          </p:cNvPr>
+          <p:cNvSpPr>
+            <a:spLocks noGrp="1"/>
+          </p:cNvSpPr>
+          <p:nvPr>
+            <p:ph type="title"/>
+          </p:nvPr>
+        </p:nvSpPr>
+        <p:spPr/>
+        <p:txBody>
+          <a:bodyPr/>
+          <a:lstStyle/>
+          <a:p>
+            <a:r>
+              <a:rPr lang="en-US" dirty="0"/>
+              <a:t>Demo</a:t>
+            </a:r>
+          </a:p>
+        </p:txBody>
+      </p:sp>
+      <p:pic>
+        <p:nvPicPr>
+          <p:cNvPr id="6" name="Picture 5">
+            <a:extLst>
+              <a:ext uri="{FF2B5EF4-FFF2-40B4-BE49-F238E27FC236}">
+                <a16:creationId xmlns:a16="http://schemas.microsoft.com/office/drawing/2014/main" id="{8D1ACC5F-52FE-4C32-9E61-49F09FCEB59D}"/>
+              </a:ext>
+            </a:extLst>
+          </p:cNvPr>
+          <p:cNvPicPr>
+            <a:picLocks noChangeAspect="1"/>
+          </p:cNvPicPr>
+          <p:nvPr/>
+        </p:nvPicPr>
+        <p:blipFill>
+          <a:blip r:embed="rId3"/>
+          <a:stretch>
+            <a:fillRect/>
+          </a:stretch>
+        </p:blipFill>
+        <p:spPr>
+          <a:xfrm>
+            <a:off x="4521420" y="1853181"/>
+            <a:ext cx="3151638" cy="3151638"/>
+          </a:xfrm>
+          <a:prstGeom prst="rect">
+            <a:avLst/>
+          </a:prstGeom>
+        </p:spPr>
+      </p:pic>
+    </p:spTree>
+    <p:extLst>
+      <p:ext uri="{BB962C8B-B14F-4D97-AF65-F5344CB8AC3E}">
+        <p14:creationId xmlns:p14="http://schemas.microsoft.com/office/powerpoint/2010/main" val="1806006951"/>
+      </p:ext>
+    </p:extLst>
+  </p:cSld>
+  <p:clrMapOvr>
+    <a:masterClrMapping/>
+  </p:clrMapOvr>
+</p:sld>
+</file>
+
+<file path=ppt/slides/slide11.xml><?xml version="1.0" encoding="utf-8"?>
+<p:sld xmlns:a="http://schemas.openxmlformats.org/drawingml/2006/main" xmlns:r="http://schemas.openxmlformats.org/officeDocument/2006/relationships" xmlns:p="http://schemas.openxmlformats.org/presentationml/2006/main">
+  <p:cSld>
+    <p:spTree>
+      <p:nvGrpSpPr>
+        <p:cNvPr id="1" name=""/>
+        <p:cNvGrpSpPr/>
+        <p:nvPr/>
+      </p:nvGrpSpPr>
+      <p:grpSpPr>
+        <a:xfrm>
+          <a:off x="0" y="0"/>
+          <a:ext cx="0" cy="0"/>
+          <a:chOff x="0" y="0"/>
+          <a:chExt cx="0" cy="0"/>
+        </a:xfrm>
+      </p:grpSpPr>
+      <p:sp>
+        <p:nvSpPr>
+          <p:cNvPr id="4" name="Title 3">
+            <a:extLst>
+              <a:ext uri="{FF2B5EF4-FFF2-40B4-BE49-F238E27FC236}">
+                <a16:creationId xmlns:a16="http://schemas.microsoft.com/office/drawing/2014/main" id="{96BEB1A8-C9D3-4723-A64F-42E02E22325A}"/>
+              </a:ext>
+            </a:extLst>
+          </p:cNvPr>
+          <p:cNvSpPr>
+            <a:spLocks noGrp="1"/>
+          </p:cNvSpPr>
+          <p:nvPr>
+            <p:ph type="title"/>
+          </p:nvPr>
+        </p:nvSpPr>
+        <p:spPr/>
+        <p:txBody>
+          <a:bodyPr/>
+          <a:lstStyle/>
+          <a:p>
+            <a:r>
+              <a:rPr lang="en-US" dirty="0"/>
+              <a:t>Exercise #4 – Images</a:t>
+            </a:r>
+          </a:p>
+        </p:txBody>
+      </p:sp>
+      <p:pic>
+        <p:nvPicPr>
+          <p:cNvPr id="8" name="Picture 7">
+            <a:extLst>
+              <a:ext uri="{FF2B5EF4-FFF2-40B4-BE49-F238E27FC236}">
+                <a16:creationId xmlns:a16="http://schemas.microsoft.com/office/drawing/2014/main" id="{D6B8C527-073F-471B-A282-22B63876CA6B}"/>
+              </a:ext>
+            </a:extLst>
+          </p:cNvPr>
+          <p:cNvPicPr>
+            <a:picLocks noChangeAspect="1"/>
+          </p:cNvPicPr>
+          <p:nvPr/>
+        </p:nvPicPr>
+        <p:blipFill>
+          <a:blip r:embed="rId3"/>
+          <a:stretch>
+            <a:fillRect/>
+          </a:stretch>
+        </p:blipFill>
+        <p:spPr>
+          <a:xfrm>
+            <a:off x="4571712" y="1903473"/>
+            <a:ext cx="3051054" cy="3051054"/>
+          </a:xfrm>
+          <a:prstGeom prst="rect">
+            <a:avLst/>
+          </a:prstGeom>
+        </p:spPr>
+      </p:pic>
+    </p:spTree>
+    <p:extLst>
+      <p:ext uri="{BB962C8B-B14F-4D97-AF65-F5344CB8AC3E}">
+        <p14:creationId xmlns:p14="http://schemas.microsoft.com/office/powerpoint/2010/main" val="2452954820"/>
+      </p:ext>
+    </p:extLst>
+  </p:cSld>
+  <p:clrMapOvr>
+    <a:masterClrMapping/>
+  </p:clrMapOvr>
+</p:sld>
+</file>
+
+<file path=ppt/slides/slide12.xml><?xml version="1.0" encoding="utf-8"?>
+<p:sld xmlns:a="http://schemas.openxmlformats.org/drawingml/2006/main" xmlns:r="http://schemas.openxmlformats.org/officeDocument/2006/relationships" xmlns:p="http://schemas.openxmlformats.org/presentationml/2006/main" show="0">
+  <p:cSld>
+    <p:spTree>
+      <p:nvGrpSpPr>
+        <p:cNvPr id="1" name=""/>
+        <p:cNvGrpSpPr/>
+        <p:nvPr/>
+      </p:nvGrpSpPr>
+      <p:grpSpPr>
+        <a:xfrm>
+          <a:off x="0" y="0"/>
+          <a:ext cx="0" cy="0"/>
+          <a:chOff x="0" y="0"/>
+          <a:chExt cx="0" cy="0"/>
+        </a:xfrm>
+      </p:grpSpPr>
+    </p:spTree>
+  </p:cSld>
+  <p:clrMapOvr>
+    <a:masterClrMapping/>
+  </p:clrMapOvr>
+  <p:transition spd="med"/>
+</p:sld>
+</file>
+
 <file path=ppt/slides/slide2.xml><?xml version="1.0" encoding="utf-8"?>
 <p:sld xmlns:a="http://schemas.openxmlformats.org/drawingml/2006/main" xmlns:r="http://schemas.openxmlformats.org/officeDocument/2006/relationships" xmlns:p="http://schemas.openxmlformats.org/presentationml/2006/main">
   <p:cSld>
@@ -12118,6 +13175,1202 @@
 </file>
 
 <file path=ppt/slides/slide5.xml><?xml version="1.0" encoding="utf-8"?>
+<p:sld xmlns:a="http://schemas.openxmlformats.org/drawingml/2006/main" xmlns:r="http://schemas.openxmlformats.org/officeDocument/2006/relationships" xmlns:p="http://schemas.openxmlformats.org/presentationml/2006/main">
+  <p:cSld>
+    <p:spTree>
+      <p:nvGrpSpPr>
+        <p:cNvPr id="1" name=""/>
+        <p:cNvGrpSpPr/>
+        <p:nvPr/>
+      </p:nvGrpSpPr>
+      <p:grpSpPr>
+        <a:xfrm>
+          <a:off x="0" y="0"/>
+          <a:ext cx="0" cy="0"/>
+          <a:chOff x="0" y="0"/>
+          <a:chExt cx="0" cy="0"/>
+        </a:xfrm>
+      </p:grpSpPr>
+      <p:sp>
+        <p:nvSpPr>
+          <p:cNvPr id="3" name="Title 2"/>
+          <p:cNvSpPr>
+            <a:spLocks noGrp="1"/>
+          </p:cNvSpPr>
+          <p:nvPr>
+            <p:ph type="title"/>
+          </p:nvPr>
+        </p:nvSpPr>
+        <p:spPr/>
+        <p:txBody>
+          <a:bodyPr/>
+          <a:lstStyle/>
+          <a:p>
+            <a:r>
+              <a:rPr lang="en-US" dirty="0"/>
+              <a:t>Information about containers</a:t>
+            </a:r>
+          </a:p>
+        </p:txBody>
+      </p:sp>
+      <p:sp>
+        <p:nvSpPr>
+          <p:cNvPr id="6" name="Text Placeholder 10"/>
+          <p:cNvSpPr>
+            <a:spLocks noGrp="1"/>
+          </p:cNvSpPr>
+          <p:nvPr>
+            <p:ph type="body" sz="quarter" idx="10"/>
+          </p:nvPr>
+        </p:nvSpPr>
+        <p:spPr>
+          <a:xfrm>
+            <a:off x="503999" y="1620000"/>
+            <a:ext cx="11186477" cy="4230000"/>
+          </a:xfrm>
+        </p:spPr>
+        <p:txBody>
+          <a:bodyPr/>
+          <a:lstStyle/>
+          <a:p>
+            <a:pPr lvl="0"/>
+            <a:r>
+              <a:rPr lang="en-US" sz="1800" dirty="0"/>
+              <a:t>Available images</a:t>
+            </a:r>
+          </a:p>
+          <a:p>
+            <a:pPr lvl="1"/>
+            <a:r>
+              <a:rPr lang="en-US" sz="1600" dirty="0"/>
+              <a:t>the command </a:t>
+            </a:r>
+            <a:r>
+              <a:rPr lang="en-US" sz="1600" b="1" dirty="0">
+                <a:latin typeface="Courier New" panose="02070309020205020404" pitchFamily="49" charset="0"/>
+                <a:cs typeface="Courier New" panose="02070309020205020404" pitchFamily="49" charset="0"/>
+              </a:rPr>
+              <a:t>docker image list</a:t>
+            </a:r>
+            <a:r>
+              <a:rPr lang="en-US" sz="1600" dirty="0"/>
+              <a:t> gives a list of all available images on a host</a:t>
+            </a:r>
+          </a:p>
+        </p:txBody>
+      </p:sp>
+      <p:cxnSp>
+        <p:nvCxnSpPr>
+          <p:cNvPr id="5" name="Straight Arrow Connector 4"/>
+          <p:cNvCxnSpPr>
+            <a:endCxn id="10" idx="0"/>
+          </p:cNvCxnSpPr>
+          <p:nvPr/>
+        </p:nvCxnSpPr>
+        <p:spPr>
+          <a:xfrm flipH="1">
+            <a:off x="1299337" y="3466006"/>
+            <a:ext cx="15658" cy="1512575"/>
+          </a:xfrm>
+          <a:prstGeom prst="straightConnector1">
+            <a:avLst/>
+          </a:prstGeom>
+          <a:ln w="19050">
+            <a:solidFill>
+              <a:srgbClr val="FF0000"/>
+            </a:solidFill>
+            <a:headEnd type="none" w="med" len="med"/>
+            <a:tailEnd type="triangle" w="lg" len="lg"/>
+          </a:ln>
+        </p:spPr>
+        <p:style>
+          <a:lnRef idx="1">
+            <a:schemeClr val="accent1"/>
+          </a:lnRef>
+          <a:fillRef idx="0">
+            <a:schemeClr val="accent1"/>
+          </a:fillRef>
+          <a:effectRef idx="0">
+            <a:schemeClr val="accent1"/>
+          </a:effectRef>
+          <a:fontRef idx="minor">
+            <a:schemeClr val="tx1"/>
+          </a:fontRef>
+        </p:style>
+      </p:cxnSp>
+      <p:sp>
+        <p:nvSpPr>
+          <p:cNvPr id="10" name="Rectangle 9"/>
+          <p:cNvSpPr/>
+          <p:nvPr/>
+        </p:nvSpPr>
+        <p:spPr bwMode="gray">
+          <a:xfrm>
+            <a:off x="503999" y="4978581"/>
+            <a:ext cx="1590675" cy="457200"/>
+          </a:xfrm>
+          <a:prstGeom prst="rect">
+            <a:avLst/>
+          </a:prstGeom>
+          <a:solidFill>
+            <a:schemeClr val="accent1"/>
+          </a:solidFill>
+          <a:ln w="6350" algn="ctr">
+            <a:solidFill>
+              <a:schemeClr val="tx1"/>
+            </a:solidFill>
+            <a:miter lim="800000"/>
+            <a:headEnd/>
+            <a:tailEnd/>
+          </a:ln>
+        </p:spPr>
+        <p:txBody>
+          <a:bodyPr lIns="90000" tIns="72000" rIns="90000" bIns="72000" rtlCol="0" anchor="ctr"/>
+          <a:lstStyle/>
+          <a:p>
+            <a:pPr marR="0" algn="ctr" defTabSz="914400" eaLnBrk="1" fontAlgn="base" latinLnBrk="0" hangingPunct="1">
+              <a:lnSpc>
+                <a:spcPct val="100000"/>
+              </a:lnSpc>
+              <a:spcBef>
+                <a:spcPct val="50000"/>
+              </a:spcBef>
+              <a:spcAft>
+                <a:spcPct val="0"/>
+              </a:spcAft>
+              <a:buClr>
+                <a:srgbClr val="F0AB00"/>
+              </a:buClr>
+              <a:buSzPct val="80000"/>
+              <a:tabLst/>
+            </a:pPr>
+            <a:r>
+              <a:rPr lang="en-US" sz="1400" kern="0" dirty="0">
+                <a:ea typeface="Arial Unicode MS" pitchFamily="34" charset="-128"/>
+                <a:cs typeface="Arial Unicode MS" pitchFamily="34" charset="-128"/>
+              </a:rPr>
+              <a:t>image name</a:t>
+            </a:r>
+            <a:endParaRPr kumimoji="0" lang="en-US" sz="1400" b="0" i="0" u="none" strike="noStrike" kern="0" cap="none" spc="0" normalizeH="0" baseline="0" dirty="0">
+              <a:ln>
+                <a:noFill/>
+              </a:ln>
+              <a:effectLst/>
+              <a:uLnTx/>
+              <a:uFillTx/>
+              <a:ea typeface="Arial Unicode MS" pitchFamily="34" charset="-128"/>
+              <a:cs typeface="Arial Unicode MS" pitchFamily="34" charset="-128"/>
+            </a:endParaRPr>
+          </a:p>
+        </p:txBody>
+      </p:sp>
+      <p:sp>
+        <p:nvSpPr>
+          <p:cNvPr id="18" name="Rectangle 17"/>
+          <p:cNvSpPr/>
+          <p:nvPr/>
+        </p:nvSpPr>
+        <p:spPr bwMode="gray">
+          <a:xfrm>
+            <a:off x="2743200" y="4816657"/>
+            <a:ext cx="1590675" cy="410396"/>
+          </a:xfrm>
+          <a:prstGeom prst="rect">
+            <a:avLst/>
+          </a:prstGeom>
+          <a:solidFill>
+            <a:schemeClr val="accent1"/>
+          </a:solidFill>
+          <a:ln w="6350" algn="ctr">
+            <a:solidFill>
+              <a:schemeClr val="tx1"/>
+            </a:solidFill>
+            <a:miter lim="800000"/>
+            <a:headEnd/>
+            <a:tailEnd/>
+          </a:ln>
+        </p:spPr>
+        <p:txBody>
+          <a:bodyPr lIns="90000" tIns="72000" rIns="90000" bIns="72000" rtlCol="0" anchor="ctr"/>
+          <a:lstStyle/>
+          <a:p>
+            <a:pPr marR="0" algn="ctr" defTabSz="914400" eaLnBrk="1" fontAlgn="base" latinLnBrk="0" hangingPunct="1">
+              <a:lnSpc>
+                <a:spcPct val="100000"/>
+              </a:lnSpc>
+              <a:spcBef>
+                <a:spcPct val="50000"/>
+              </a:spcBef>
+              <a:spcAft>
+                <a:spcPct val="0"/>
+              </a:spcAft>
+              <a:buClr>
+                <a:srgbClr val="F0AB00"/>
+              </a:buClr>
+              <a:buSzPct val="80000"/>
+              <a:tabLst/>
+            </a:pPr>
+            <a:r>
+              <a:rPr lang="en-US" sz="1400" kern="0" dirty="0">
+                <a:ea typeface="Arial Unicode MS" pitchFamily="34" charset="-128"/>
+                <a:cs typeface="Arial Unicode MS" pitchFamily="34" charset="-128"/>
+              </a:rPr>
+              <a:t>useful description</a:t>
+            </a:r>
+            <a:endParaRPr kumimoji="0" lang="en-US" sz="1400" b="0" i="0" u="none" strike="noStrike" kern="0" cap="none" spc="0" normalizeH="0" baseline="0" dirty="0">
+              <a:ln>
+                <a:noFill/>
+              </a:ln>
+              <a:effectLst/>
+              <a:uLnTx/>
+              <a:uFillTx/>
+              <a:ea typeface="Arial Unicode MS" pitchFamily="34" charset="-128"/>
+              <a:cs typeface="Arial Unicode MS" pitchFamily="34" charset="-128"/>
+            </a:endParaRPr>
+          </a:p>
+        </p:txBody>
+      </p:sp>
+      <p:cxnSp>
+        <p:nvCxnSpPr>
+          <p:cNvPr id="19" name="Straight Arrow Connector 18"/>
+          <p:cNvCxnSpPr>
+            <a:endCxn id="18" idx="0"/>
+          </p:cNvCxnSpPr>
+          <p:nvPr/>
+        </p:nvCxnSpPr>
+        <p:spPr>
+          <a:xfrm flipH="1">
+            <a:off x="3538538" y="3605886"/>
+            <a:ext cx="10350" cy="1210771"/>
+          </a:xfrm>
+          <a:prstGeom prst="straightConnector1">
+            <a:avLst/>
+          </a:prstGeom>
+          <a:ln w="19050">
+            <a:solidFill>
+              <a:srgbClr val="FF0000"/>
+            </a:solidFill>
+            <a:headEnd type="none" w="med" len="med"/>
+            <a:tailEnd type="triangle" w="lg" len="lg"/>
+          </a:ln>
+        </p:spPr>
+        <p:style>
+          <a:lnRef idx="1">
+            <a:schemeClr val="accent1"/>
+          </a:lnRef>
+          <a:fillRef idx="0">
+            <a:schemeClr val="accent1"/>
+          </a:fillRef>
+          <a:effectRef idx="0">
+            <a:schemeClr val="accent1"/>
+          </a:effectRef>
+          <a:fontRef idx="minor">
+            <a:schemeClr val="tx1"/>
+          </a:fontRef>
+        </p:style>
+      </p:cxnSp>
+      <p:cxnSp>
+        <p:nvCxnSpPr>
+          <p:cNvPr id="25" name="Straight Arrow Connector 24"/>
+          <p:cNvCxnSpPr>
+            <a:endCxn id="26" idx="0"/>
+          </p:cNvCxnSpPr>
+          <p:nvPr/>
+        </p:nvCxnSpPr>
+        <p:spPr>
+          <a:xfrm flipH="1">
+            <a:off x="5423602" y="3814898"/>
+            <a:ext cx="402104" cy="1399453"/>
+          </a:xfrm>
+          <a:prstGeom prst="straightConnector1">
+            <a:avLst/>
+          </a:prstGeom>
+          <a:ln w="19050">
+            <a:solidFill>
+              <a:srgbClr val="FF0000"/>
+            </a:solidFill>
+            <a:headEnd type="none" w="med" len="med"/>
+            <a:tailEnd type="triangle" w="lg" len="lg"/>
+          </a:ln>
+        </p:spPr>
+        <p:style>
+          <a:lnRef idx="1">
+            <a:schemeClr val="accent1"/>
+          </a:lnRef>
+          <a:fillRef idx="0">
+            <a:schemeClr val="accent1"/>
+          </a:fillRef>
+          <a:effectRef idx="0">
+            <a:schemeClr val="accent1"/>
+          </a:effectRef>
+          <a:fontRef idx="minor">
+            <a:schemeClr val="tx1"/>
+          </a:fontRef>
+        </p:style>
+      </p:cxnSp>
+      <p:sp>
+        <p:nvSpPr>
+          <p:cNvPr id="26" name="Rectangle 25"/>
+          <p:cNvSpPr/>
+          <p:nvPr/>
+        </p:nvSpPr>
+        <p:spPr bwMode="gray">
+          <a:xfrm>
+            <a:off x="4628264" y="5214351"/>
+            <a:ext cx="1590675" cy="442859"/>
+          </a:xfrm>
+          <a:prstGeom prst="rect">
+            <a:avLst/>
+          </a:prstGeom>
+          <a:solidFill>
+            <a:schemeClr val="accent1"/>
+          </a:solidFill>
+          <a:ln w="6350" algn="ctr">
+            <a:solidFill>
+              <a:schemeClr val="tx1"/>
+            </a:solidFill>
+            <a:miter lim="800000"/>
+            <a:headEnd/>
+            <a:tailEnd/>
+          </a:ln>
+        </p:spPr>
+        <p:txBody>
+          <a:bodyPr lIns="90000" tIns="72000" rIns="90000" bIns="72000" rtlCol="0" anchor="ctr"/>
+          <a:lstStyle/>
+          <a:p>
+            <a:pPr marR="0" algn="ctr" defTabSz="914400" eaLnBrk="1" fontAlgn="base" latinLnBrk="0" hangingPunct="1">
+              <a:lnSpc>
+                <a:spcPct val="100000"/>
+              </a:lnSpc>
+              <a:spcBef>
+                <a:spcPct val="50000"/>
+              </a:spcBef>
+              <a:spcAft>
+                <a:spcPct val="0"/>
+              </a:spcAft>
+              <a:buClr>
+                <a:srgbClr val="F0AB00"/>
+              </a:buClr>
+              <a:buSzPct val="80000"/>
+              <a:tabLst/>
+            </a:pPr>
+            <a:r>
+              <a:rPr lang="en-US" sz="1400" kern="0" dirty="0">
+                <a:ea typeface="Arial Unicode MS" pitchFamily="34" charset="-128"/>
+                <a:cs typeface="Arial Unicode MS" pitchFamily="34" charset="-128"/>
+              </a:rPr>
+              <a:t>LIKES!</a:t>
+            </a:r>
+            <a:endParaRPr kumimoji="0" lang="en-US" sz="1400" b="0" i="0" u="none" strike="noStrike" kern="0" cap="none" spc="0" normalizeH="0" baseline="0" dirty="0">
+              <a:ln>
+                <a:noFill/>
+              </a:ln>
+              <a:effectLst/>
+              <a:uLnTx/>
+              <a:uFillTx/>
+              <a:ea typeface="Arial Unicode MS" pitchFamily="34" charset="-128"/>
+              <a:cs typeface="Arial Unicode MS" pitchFamily="34" charset="-128"/>
+            </a:endParaRPr>
+          </a:p>
+        </p:txBody>
+      </p:sp>
+      <p:sp>
+        <p:nvSpPr>
+          <p:cNvPr id="28" name="Rectangle 27"/>
+          <p:cNvSpPr/>
+          <p:nvPr/>
+        </p:nvSpPr>
+        <p:spPr bwMode="gray">
+          <a:xfrm>
+            <a:off x="6513185" y="4476144"/>
+            <a:ext cx="1495014" cy="518290"/>
+          </a:xfrm>
+          <a:prstGeom prst="rect">
+            <a:avLst/>
+          </a:prstGeom>
+          <a:solidFill>
+            <a:schemeClr val="accent1"/>
+          </a:solidFill>
+          <a:ln w="6350" algn="ctr">
+            <a:solidFill>
+              <a:schemeClr val="tx1"/>
+            </a:solidFill>
+            <a:miter lim="800000"/>
+            <a:headEnd/>
+            <a:tailEnd/>
+          </a:ln>
+        </p:spPr>
+        <p:txBody>
+          <a:bodyPr lIns="90000" tIns="72000" rIns="90000" bIns="72000" rtlCol="0" anchor="ctr"/>
+          <a:lstStyle/>
+          <a:p>
+            <a:pPr marR="0" algn="ctr" defTabSz="914400" eaLnBrk="1" fontAlgn="base" latinLnBrk="0" hangingPunct="1">
+              <a:lnSpc>
+                <a:spcPct val="100000"/>
+              </a:lnSpc>
+              <a:spcBef>
+                <a:spcPct val="50000"/>
+              </a:spcBef>
+              <a:spcAft>
+                <a:spcPct val="0"/>
+              </a:spcAft>
+              <a:buClr>
+                <a:srgbClr val="F0AB00"/>
+              </a:buClr>
+              <a:buSzPct val="80000"/>
+              <a:tabLst/>
+            </a:pPr>
+            <a:r>
+              <a:rPr lang="en-US" sz="1400" kern="0" dirty="0">
+                <a:ea typeface="Arial Unicode MS" pitchFamily="34" charset="-128"/>
+                <a:cs typeface="Arial Unicode MS" pitchFamily="34" charset="-128"/>
+              </a:rPr>
+              <a:t>official project maintainer</a:t>
+            </a:r>
+            <a:endParaRPr kumimoji="0" lang="en-US" sz="1400" b="0" i="0" u="none" strike="noStrike" kern="0" cap="none" spc="0" normalizeH="0" baseline="0" dirty="0">
+              <a:ln>
+                <a:noFill/>
+              </a:ln>
+              <a:effectLst/>
+              <a:uLnTx/>
+              <a:uFillTx/>
+              <a:ea typeface="Arial Unicode MS" pitchFamily="34" charset="-128"/>
+              <a:cs typeface="Arial Unicode MS" pitchFamily="34" charset="-128"/>
+            </a:endParaRPr>
+          </a:p>
+        </p:txBody>
+      </p:sp>
+      <p:cxnSp>
+        <p:nvCxnSpPr>
+          <p:cNvPr id="30" name="Straight Arrow Connector 29"/>
+          <p:cNvCxnSpPr>
+            <a:endCxn id="28" idx="0"/>
+          </p:cNvCxnSpPr>
+          <p:nvPr/>
+        </p:nvCxnSpPr>
+        <p:spPr>
+          <a:xfrm>
+            <a:off x="6792686" y="3814898"/>
+            <a:ext cx="468006" cy="661246"/>
+          </a:xfrm>
+          <a:prstGeom prst="straightConnector1">
+            <a:avLst/>
+          </a:prstGeom>
+          <a:ln w="19050">
+            <a:solidFill>
+              <a:srgbClr val="FF0000"/>
+            </a:solidFill>
+            <a:headEnd type="none" w="med" len="med"/>
+            <a:tailEnd type="triangle" w="lg" len="lg"/>
+          </a:ln>
+        </p:spPr>
+        <p:style>
+          <a:lnRef idx="1">
+            <a:schemeClr val="accent1"/>
+          </a:lnRef>
+          <a:fillRef idx="0">
+            <a:schemeClr val="accent1"/>
+          </a:fillRef>
+          <a:effectRef idx="0">
+            <a:schemeClr val="accent1"/>
+          </a:effectRef>
+          <a:fontRef idx="minor">
+            <a:schemeClr val="tx1"/>
+          </a:fontRef>
+        </p:style>
+      </p:cxnSp>
+      <p:sp>
+        <p:nvSpPr>
+          <p:cNvPr id="33" name="Rectangle 32"/>
+          <p:cNvSpPr/>
+          <p:nvPr/>
+        </p:nvSpPr>
+        <p:spPr bwMode="gray">
+          <a:xfrm>
+            <a:off x="8866216" y="5092928"/>
+            <a:ext cx="1891166" cy="600095"/>
+          </a:xfrm>
+          <a:prstGeom prst="rect">
+            <a:avLst/>
+          </a:prstGeom>
+          <a:solidFill>
+            <a:schemeClr val="accent1"/>
+          </a:solidFill>
+          <a:ln w="6350" algn="ctr">
+            <a:solidFill>
+              <a:schemeClr val="tx1"/>
+            </a:solidFill>
+            <a:miter lim="800000"/>
+            <a:headEnd/>
+            <a:tailEnd/>
+          </a:ln>
+        </p:spPr>
+        <p:txBody>
+          <a:bodyPr lIns="90000" tIns="72000" rIns="90000" bIns="72000" rtlCol="0" anchor="ctr"/>
+          <a:lstStyle/>
+          <a:p>
+            <a:pPr marR="0" algn="ctr" defTabSz="914400" eaLnBrk="1" fontAlgn="base" latinLnBrk="0" hangingPunct="1">
+              <a:lnSpc>
+                <a:spcPct val="100000"/>
+              </a:lnSpc>
+              <a:spcBef>
+                <a:spcPct val="50000"/>
+              </a:spcBef>
+              <a:spcAft>
+                <a:spcPct val="0"/>
+              </a:spcAft>
+              <a:buClr>
+                <a:srgbClr val="F0AB00"/>
+              </a:buClr>
+              <a:buSzPct val="80000"/>
+              <a:tabLst/>
+            </a:pPr>
+            <a:r>
+              <a:rPr lang="en-US" sz="1400" kern="0" dirty="0">
+                <a:ea typeface="Arial Unicode MS" pitchFamily="34" charset="-128"/>
+                <a:cs typeface="Arial Unicode MS" pitchFamily="34" charset="-128"/>
+              </a:rPr>
+              <a:t>automatically built on Docker Hub</a:t>
+            </a:r>
+            <a:endParaRPr kumimoji="0" lang="en-US" sz="1400" b="0" i="0" u="none" strike="noStrike" kern="0" cap="none" spc="0" normalizeH="0" baseline="0" dirty="0">
+              <a:ln>
+                <a:noFill/>
+              </a:ln>
+              <a:effectLst/>
+              <a:uLnTx/>
+              <a:uFillTx/>
+              <a:ea typeface="Arial Unicode MS" pitchFamily="34" charset="-128"/>
+              <a:cs typeface="Arial Unicode MS" pitchFamily="34" charset="-128"/>
+            </a:endParaRPr>
+          </a:p>
+        </p:txBody>
+      </p:sp>
+      <p:cxnSp>
+        <p:nvCxnSpPr>
+          <p:cNvPr id="34" name="Straight Arrow Connector 33"/>
+          <p:cNvCxnSpPr>
+            <a:endCxn id="33" idx="0"/>
+          </p:cNvCxnSpPr>
+          <p:nvPr/>
+        </p:nvCxnSpPr>
+        <p:spPr>
+          <a:xfrm>
+            <a:off x="7576457" y="3814898"/>
+            <a:ext cx="2235342" cy="1278030"/>
+          </a:xfrm>
+          <a:prstGeom prst="straightConnector1">
+            <a:avLst/>
+          </a:prstGeom>
+          <a:ln w="19050">
+            <a:solidFill>
+              <a:srgbClr val="FF0000"/>
+            </a:solidFill>
+            <a:headEnd type="none" w="med" len="med"/>
+            <a:tailEnd type="triangle" w="lg" len="lg"/>
+          </a:ln>
+        </p:spPr>
+        <p:style>
+          <a:lnRef idx="1">
+            <a:schemeClr val="accent1"/>
+          </a:lnRef>
+          <a:fillRef idx="0">
+            <a:schemeClr val="accent1"/>
+          </a:fillRef>
+          <a:effectRef idx="0">
+            <a:schemeClr val="accent1"/>
+          </a:effectRef>
+          <a:fontRef idx="minor">
+            <a:schemeClr val="tx1"/>
+          </a:fontRef>
+        </p:style>
+      </p:cxnSp>
+      <p:sp>
+        <p:nvSpPr>
+          <p:cNvPr id="9" name="Rectangle: Rounded Corners 8"/>
+          <p:cNvSpPr/>
+          <p:nvPr/>
+        </p:nvSpPr>
+        <p:spPr bwMode="gray">
+          <a:xfrm>
+            <a:off x="503999" y="2495550"/>
+            <a:ext cx="11186477" cy="1319348"/>
+          </a:xfrm>
+          <a:prstGeom prst="roundRect">
+            <a:avLst>
+              <a:gd name="adj" fmla="val 8296"/>
+            </a:avLst>
+          </a:prstGeom>
+          <a:pattFill prst="narHorz">
+            <a:fgClr>
+              <a:schemeClr val="tx1"/>
+            </a:fgClr>
+            <a:bgClr>
+              <a:srgbClr val="112806"/>
+            </a:bgClr>
+          </a:pattFill>
+          <a:ln w="6350" algn="ctr">
+            <a:noFill/>
+            <a:miter lim="800000"/>
+            <a:headEnd/>
+            <a:tailEnd/>
+          </a:ln>
+        </p:spPr>
+        <p:txBody>
+          <a:bodyPr lIns="90000" tIns="72000" rIns="90000" bIns="72000" rtlCol="0" anchor="t"/>
+          <a:lstStyle/>
+          <a:p>
+            <a:pPr defTabSz="914400" fontAlgn="base">
+              <a:spcAft>
+                <a:spcPct val="0"/>
+              </a:spcAft>
+              <a:buClr>
+                <a:srgbClr val="F0AB00"/>
+              </a:buClr>
+              <a:buSzPct val="80000"/>
+            </a:pPr>
+            <a:r>
+              <a:rPr lang="en-US" sz="900" b="1" kern="0" dirty="0">
+                <a:solidFill>
+                  <a:schemeClr val="bg1"/>
+                </a:solidFill>
+                <a:latin typeface="Courier New" panose="02070309020205020404" pitchFamily="49" charset="0"/>
+                <a:ea typeface="Arial Unicode MS" pitchFamily="34" charset="-128"/>
+                <a:cs typeface="Courier New" panose="02070309020205020404" pitchFamily="49" charset="0"/>
+              </a:rPr>
+              <a:t>$ </a:t>
+            </a:r>
+            <a:r>
+              <a:rPr lang="en-US" sz="900" b="1" kern="0" dirty="0" err="1">
+                <a:solidFill>
+                  <a:schemeClr val="bg1"/>
+                </a:solidFill>
+                <a:latin typeface="Courier New" panose="02070309020205020404" pitchFamily="49" charset="0"/>
+                <a:ea typeface="Arial Unicode MS" pitchFamily="34" charset="-128"/>
+                <a:cs typeface="Courier New" panose="02070309020205020404" pitchFamily="49" charset="0"/>
+              </a:rPr>
+              <a:t>docker</a:t>
+            </a:r>
+            <a:r>
+              <a:rPr lang="en-US" sz="900" b="1" kern="0" dirty="0">
+                <a:solidFill>
+                  <a:schemeClr val="bg1"/>
+                </a:solidFill>
+                <a:latin typeface="Courier New" panose="02070309020205020404" pitchFamily="49" charset="0"/>
+                <a:ea typeface="Arial Unicode MS" pitchFamily="34" charset="-128"/>
+                <a:cs typeface="Courier New" panose="02070309020205020404" pitchFamily="49" charset="0"/>
+              </a:rPr>
+              <a:t> search </a:t>
+            </a:r>
+            <a:r>
+              <a:rPr lang="en-US" sz="900" b="1" kern="0" dirty="0" err="1">
+                <a:solidFill>
+                  <a:schemeClr val="bg1"/>
+                </a:solidFill>
+                <a:latin typeface="Courier New" panose="02070309020205020404" pitchFamily="49" charset="0"/>
+                <a:ea typeface="Arial Unicode MS" pitchFamily="34" charset="-128"/>
+                <a:cs typeface="Courier New" panose="02070309020205020404" pitchFamily="49" charset="0"/>
+              </a:rPr>
+              <a:t>busybox</a:t>
+            </a:r>
+            <a:endParaRPr lang="en-US" sz="900" b="1" kern="0" dirty="0">
+              <a:solidFill>
+                <a:schemeClr val="bg1"/>
+              </a:solidFill>
+              <a:latin typeface="Courier New" panose="02070309020205020404" pitchFamily="49" charset="0"/>
+              <a:ea typeface="Arial Unicode MS" pitchFamily="34" charset="-128"/>
+              <a:cs typeface="Courier New" panose="02070309020205020404" pitchFamily="49" charset="0"/>
+            </a:endParaRPr>
+          </a:p>
+          <a:p>
+            <a:pPr defTabSz="914400" fontAlgn="base">
+              <a:spcAft>
+                <a:spcPct val="0"/>
+              </a:spcAft>
+              <a:buClr>
+                <a:srgbClr val="F0AB00"/>
+              </a:buClr>
+              <a:buSzPct val="80000"/>
+            </a:pPr>
+            <a:r>
+              <a:rPr lang="en-US" sz="900" kern="0" dirty="0">
+                <a:solidFill>
+                  <a:schemeClr val="bg1"/>
+                </a:solidFill>
+                <a:latin typeface="Arial monospaced for SAP" panose="020B0609020202030204" pitchFamily="49" charset="0"/>
+                <a:ea typeface="Arial Unicode MS" pitchFamily="34" charset="-128"/>
+                <a:cs typeface="Courier New" panose="02070309020205020404" pitchFamily="49" charset="0"/>
+              </a:rPr>
+              <a:t>NAME                        DESCRIPTION                                     STARS     OFFICIAL   AUTOMATED</a:t>
+            </a:r>
+          </a:p>
+          <a:p>
+            <a:pPr defTabSz="914400" fontAlgn="base">
+              <a:spcAft>
+                <a:spcPct val="0"/>
+              </a:spcAft>
+              <a:buClr>
+                <a:srgbClr val="F0AB00"/>
+              </a:buClr>
+              <a:buSzPct val="80000"/>
+            </a:pPr>
+            <a:r>
+              <a:rPr lang="en-US" sz="900" kern="0" dirty="0" err="1">
+                <a:solidFill>
+                  <a:schemeClr val="bg1"/>
+                </a:solidFill>
+                <a:latin typeface="Arial monospaced for SAP" panose="020B0609020202030204" pitchFamily="49" charset="0"/>
+                <a:ea typeface="Arial Unicode MS" pitchFamily="34" charset="-128"/>
+                <a:cs typeface="Courier New" panose="02070309020205020404" pitchFamily="49" charset="0"/>
+              </a:rPr>
+              <a:t>busybox</a:t>
+            </a:r>
+            <a:r>
+              <a:rPr lang="en-US" sz="900" kern="0" dirty="0">
+                <a:solidFill>
+                  <a:schemeClr val="bg1"/>
+                </a:solidFill>
+                <a:latin typeface="Arial monospaced for SAP" panose="020B0609020202030204" pitchFamily="49" charset="0"/>
+                <a:ea typeface="Arial Unicode MS" pitchFamily="34" charset="-128"/>
+                <a:cs typeface="Courier New" panose="02070309020205020404" pitchFamily="49" charset="0"/>
+              </a:rPr>
+              <a:t>                     </a:t>
+            </a:r>
+            <a:r>
+              <a:rPr lang="en-US" sz="900" kern="0" dirty="0" err="1">
+                <a:solidFill>
+                  <a:schemeClr val="bg1"/>
+                </a:solidFill>
+                <a:latin typeface="Arial monospaced for SAP" panose="020B0609020202030204" pitchFamily="49" charset="0"/>
+                <a:ea typeface="Arial Unicode MS" pitchFamily="34" charset="-128"/>
+                <a:cs typeface="Courier New" panose="02070309020205020404" pitchFamily="49" charset="0"/>
+              </a:rPr>
+              <a:t>Busybox</a:t>
+            </a:r>
+            <a:r>
+              <a:rPr lang="en-US" sz="900" kern="0" dirty="0">
+                <a:solidFill>
+                  <a:schemeClr val="bg1"/>
+                </a:solidFill>
+                <a:latin typeface="Arial monospaced for SAP" panose="020B0609020202030204" pitchFamily="49" charset="0"/>
+                <a:ea typeface="Arial Unicode MS" pitchFamily="34" charset="-128"/>
+                <a:cs typeface="Courier New" panose="02070309020205020404" pitchFamily="49" charset="0"/>
+              </a:rPr>
+              <a:t> base image.                             1160      [OK]       </a:t>
+            </a:r>
+          </a:p>
+          <a:p>
+            <a:pPr defTabSz="914400" fontAlgn="base">
+              <a:spcAft>
+                <a:spcPct val="0"/>
+              </a:spcAft>
+              <a:buClr>
+                <a:srgbClr val="F0AB00"/>
+              </a:buClr>
+              <a:buSzPct val="80000"/>
+            </a:pPr>
+            <a:r>
+              <a:rPr lang="en-US" sz="900" kern="0" dirty="0" err="1">
+                <a:solidFill>
+                  <a:schemeClr val="bg1"/>
+                </a:solidFill>
+                <a:latin typeface="Arial monospaced for SAP" panose="020B0609020202030204" pitchFamily="49" charset="0"/>
+                <a:ea typeface="Arial Unicode MS" pitchFamily="34" charset="-128"/>
+                <a:cs typeface="Courier New" panose="02070309020205020404" pitchFamily="49" charset="0"/>
+              </a:rPr>
+              <a:t>progrium</a:t>
+            </a:r>
+            <a:r>
+              <a:rPr lang="en-US" sz="900" kern="0" dirty="0">
+                <a:solidFill>
+                  <a:schemeClr val="bg1"/>
+                </a:solidFill>
+                <a:latin typeface="Arial monospaced for SAP" panose="020B0609020202030204" pitchFamily="49" charset="0"/>
+                <a:ea typeface="Arial Unicode MS" pitchFamily="34" charset="-128"/>
+                <a:cs typeface="Courier New" panose="02070309020205020404" pitchFamily="49" charset="0"/>
+              </a:rPr>
+              <a:t>/</a:t>
+            </a:r>
+            <a:r>
+              <a:rPr lang="en-US" sz="900" kern="0" dirty="0" err="1">
+                <a:solidFill>
+                  <a:schemeClr val="bg1"/>
+                </a:solidFill>
+                <a:latin typeface="Arial monospaced for SAP" panose="020B0609020202030204" pitchFamily="49" charset="0"/>
+                <a:ea typeface="Arial Unicode MS" pitchFamily="34" charset="-128"/>
+                <a:cs typeface="Courier New" panose="02070309020205020404" pitchFamily="49" charset="0"/>
+              </a:rPr>
+              <a:t>busybox</a:t>
+            </a:r>
+            <a:r>
+              <a:rPr lang="en-US" sz="900" kern="0" dirty="0">
+                <a:solidFill>
+                  <a:schemeClr val="bg1"/>
+                </a:solidFill>
+                <a:latin typeface="Arial monospaced for SAP" panose="020B0609020202030204" pitchFamily="49" charset="0"/>
+                <a:ea typeface="Arial Unicode MS" pitchFamily="34" charset="-128"/>
+                <a:cs typeface="Courier New" panose="02070309020205020404" pitchFamily="49" charset="0"/>
+              </a:rPr>
+              <a:t>                                                            66                   [OK]</a:t>
+            </a:r>
+          </a:p>
+          <a:p>
+            <a:pPr defTabSz="914400" fontAlgn="base">
+              <a:spcAft>
+                <a:spcPct val="0"/>
+              </a:spcAft>
+              <a:buClr>
+                <a:srgbClr val="F0AB00"/>
+              </a:buClr>
+              <a:buSzPct val="80000"/>
+            </a:pPr>
+            <a:r>
+              <a:rPr lang="en-US" sz="900" kern="0" dirty="0" err="1">
+                <a:solidFill>
+                  <a:schemeClr val="bg1"/>
+                </a:solidFill>
+                <a:latin typeface="Arial monospaced for SAP" panose="020B0609020202030204" pitchFamily="49" charset="0"/>
+                <a:ea typeface="Arial Unicode MS" pitchFamily="34" charset="-128"/>
+                <a:cs typeface="Courier New" panose="02070309020205020404" pitchFamily="49" charset="0"/>
+              </a:rPr>
+              <a:t>hypriot</a:t>
+            </a:r>
+            <a:r>
+              <a:rPr lang="en-US" sz="900" kern="0" dirty="0">
+                <a:solidFill>
+                  <a:schemeClr val="bg1"/>
+                </a:solidFill>
+                <a:latin typeface="Arial monospaced for SAP" panose="020B0609020202030204" pitchFamily="49" charset="0"/>
+                <a:ea typeface="Arial Unicode MS" pitchFamily="34" charset="-128"/>
+                <a:cs typeface="Courier New" panose="02070309020205020404" pitchFamily="49" charset="0"/>
+              </a:rPr>
+              <a:t>/</a:t>
+            </a:r>
+            <a:r>
+              <a:rPr lang="en-US" sz="900" kern="0" dirty="0" err="1">
+                <a:solidFill>
+                  <a:schemeClr val="bg1"/>
+                </a:solidFill>
+                <a:latin typeface="Arial monospaced for SAP" panose="020B0609020202030204" pitchFamily="49" charset="0"/>
+                <a:ea typeface="Arial Unicode MS" pitchFamily="34" charset="-128"/>
+                <a:cs typeface="Courier New" panose="02070309020205020404" pitchFamily="49" charset="0"/>
+              </a:rPr>
+              <a:t>rpi-busybox-httpd</a:t>
+            </a:r>
+            <a:r>
+              <a:rPr lang="en-US" sz="900" kern="0" dirty="0">
+                <a:solidFill>
+                  <a:schemeClr val="bg1"/>
+                </a:solidFill>
+                <a:latin typeface="Arial monospaced for SAP" panose="020B0609020202030204" pitchFamily="49" charset="0"/>
+                <a:ea typeface="Arial Unicode MS" pitchFamily="34" charset="-128"/>
+                <a:cs typeface="Courier New" panose="02070309020205020404" pitchFamily="49" charset="0"/>
+              </a:rPr>
+              <a:t>   Raspberry Pi compatible Docker Image with ...   39                   </a:t>
+            </a:r>
+          </a:p>
+          <a:p>
+            <a:pPr defTabSz="914400" fontAlgn="base">
+              <a:spcAft>
+                <a:spcPct val="0"/>
+              </a:spcAft>
+              <a:buClr>
+                <a:srgbClr val="F0AB00"/>
+              </a:buClr>
+              <a:buSzPct val="80000"/>
+            </a:pPr>
+            <a:r>
+              <a:rPr lang="en-US" sz="900" kern="0" dirty="0">
+                <a:solidFill>
+                  <a:schemeClr val="bg1"/>
+                </a:solidFill>
+                <a:latin typeface="Arial monospaced for SAP" panose="020B0609020202030204" pitchFamily="49" charset="0"/>
+                <a:ea typeface="Arial Unicode MS" pitchFamily="34" charset="-128"/>
+                <a:cs typeface="Courier New" panose="02070309020205020404" pitchFamily="49" charset="0"/>
+              </a:rPr>
+              <a:t>radial/</a:t>
+            </a:r>
+            <a:r>
+              <a:rPr lang="en-US" sz="900" kern="0" dirty="0" err="1">
+                <a:solidFill>
+                  <a:schemeClr val="bg1"/>
+                </a:solidFill>
+                <a:latin typeface="Arial monospaced for SAP" panose="020B0609020202030204" pitchFamily="49" charset="0"/>
+                <a:ea typeface="Arial Unicode MS" pitchFamily="34" charset="-128"/>
+                <a:cs typeface="Courier New" panose="02070309020205020404" pitchFamily="49" charset="0"/>
+              </a:rPr>
+              <a:t>busyboxplus</a:t>
+            </a:r>
+            <a:r>
+              <a:rPr lang="en-US" sz="900" kern="0" dirty="0">
+                <a:solidFill>
+                  <a:schemeClr val="bg1"/>
+                </a:solidFill>
+                <a:latin typeface="Arial monospaced for SAP" panose="020B0609020202030204" pitchFamily="49" charset="0"/>
+                <a:ea typeface="Arial Unicode MS" pitchFamily="34" charset="-128"/>
+                <a:cs typeface="Courier New" panose="02070309020205020404" pitchFamily="49" charset="0"/>
+              </a:rPr>
+              <a:t>          Full-chain, Internet enabled, </a:t>
+            </a:r>
+            <a:r>
+              <a:rPr lang="en-US" sz="900" kern="0" dirty="0" err="1">
+                <a:solidFill>
+                  <a:schemeClr val="bg1"/>
+                </a:solidFill>
+                <a:latin typeface="Arial monospaced for SAP" panose="020B0609020202030204" pitchFamily="49" charset="0"/>
+                <a:ea typeface="Arial Unicode MS" pitchFamily="34" charset="-128"/>
+                <a:cs typeface="Courier New" panose="02070309020205020404" pitchFamily="49" charset="0"/>
+              </a:rPr>
+              <a:t>busybox</a:t>
+            </a:r>
+            <a:r>
+              <a:rPr lang="en-US" sz="900" kern="0" dirty="0">
+                <a:solidFill>
+                  <a:schemeClr val="bg1"/>
+                </a:solidFill>
+                <a:latin typeface="Arial monospaced for SAP" panose="020B0609020202030204" pitchFamily="49" charset="0"/>
+                <a:ea typeface="Arial Unicode MS" pitchFamily="34" charset="-128"/>
+                <a:cs typeface="Courier New" panose="02070309020205020404" pitchFamily="49" charset="0"/>
+              </a:rPr>
+              <a:t> made...   17                   [OK]</a:t>
+            </a:r>
+          </a:p>
+          <a:p>
+            <a:pPr defTabSz="914400" fontAlgn="base">
+              <a:spcAft>
+                <a:spcPct val="0"/>
+              </a:spcAft>
+              <a:buClr>
+                <a:srgbClr val="F0AB00"/>
+              </a:buClr>
+              <a:buSzPct val="80000"/>
+            </a:pPr>
+            <a:r>
+              <a:rPr lang="en-US" sz="900" kern="0" dirty="0" err="1">
+                <a:solidFill>
+                  <a:schemeClr val="bg1"/>
+                </a:solidFill>
+                <a:latin typeface="Arial monospaced for SAP" panose="020B0609020202030204" pitchFamily="49" charset="0"/>
+                <a:ea typeface="Arial Unicode MS" pitchFamily="34" charset="-128"/>
+                <a:cs typeface="Courier New" panose="02070309020205020404" pitchFamily="49" charset="0"/>
+              </a:rPr>
+              <a:t>hypriot</a:t>
+            </a:r>
+            <a:r>
+              <a:rPr lang="en-US" sz="900" kern="0" dirty="0">
+                <a:solidFill>
+                  <a:schemeClr val="bg1"/>
+                </a:solidFill>
+                <a:latin typeface="Arial monospaced for SAP" panose="020B0609020202030204" pitchFamily="49" charset="0"/>
+                <a:ea typeface="Arial Unicode MS" pitchFamily="34" charset="-128"/>
+                <a:cs typeface="Courier New" panose="02070309020205020404" pitchFamily="49" charset="0"/>
+              </a:rPr>
+              <a:t>/</a:t>
+            </a:r>
+            <a:r>
+              <a:rPr lang="en-US" sz="900" kern="0" dirty="0" err="1">
+                <a:solidFill>
+                  <a:schemeClr val="bg1"/>
+                </a:solidFill>
+                <a:latin typeface="Arial monospaced for SAP" panose="020B0609020202030204" pitchFamily="49" charset="0"/>
+                <a:ea typeface="Arial Unicode MS" pitchFamily="34" charset="-128"/>
+                <a:cs typeface="Courier New" panose="02070309020205020404" pitchFamily="49" charset="0"/>
+              </a:rPr>
+              <a:t>armhf-busybox</a:t>
+            </a:r>
+            <a:r>
+              <a:rPr lang="en-US" sz="900" kern="0" dirty="0">
+                <a:solidFill>
+                  <a:schemeClr val="bg1"/>
+                </a:solidFill>
+                <a:latin typeface="Arial monospaced for SAP" panose="020B0609020202030204" pitchFamily="49" charset="0"/>
+                <a:ea typeface="Arial Unicode MS" pitchFamily="34" charset="-128"/>
+                <a:cs typeface="Courier New" panose="02070309020205020404" pitchFamily="49" charset="0"/>
+              </a:rPr>
+              <a:t>       </a:t>
+            </a:r>
+            <a:r>
+              <a:rPr lang="en-US" sz="900" kern="0" dirty="0" err="1">
+                <a:solidFill>
+                  <a:schemeClr val="bg1"/>
+                </a:solidFill>
+                <a:latin typeface="Arial monospaced for SAP" panose="020B0609020202030204" pitchFamily="49" charset="0"/>
+                <a:ea typeface="Arial Unicode MS" pitchFamily="34" charset="-128"/>
+                <a:cs typeface="Courier New" panose="02070309020205020404" pitchFamily="49" charset="0"/>
+              </a:rPr>
+              <a:t>Busybox</a:t>
+            </a:r>
+            <a:r>
+              <a:rPr lang="en-US" sz="900" kern="0" dirty="0">
+                <a:solidFill>
+                  <a:schemeClr val="bg1"/>
+                </a:solidFill>
+                <a:latin typeface="Arial monospaced for SAP" panose="020B0609020202030204" pitchFamily="49" charset="0"/>
+                <a:ea typeface="Arial Unicode MS" pitchFamily="34" charset="-128"/>
+                <a:cs typeface="Courier New" panose="02070309020205020404" pitchFamily="49" charset="0"/>
+              </a:rPr>
+              <a:t> base image for ARM.                     8                    </a:t>
+            </a:r>
+          </a:p>
+          <a:p>
+            <a:pPr defTabSz="914400" fontAlgn="base">
+              <a:spcAft>
+                <a:spcPct val="0"/>
+              </a:spcAft>
+              <a:buClr>
+                <a:srgbClr val="F0AB00"/>
+              </a:buClr>
+              <a:buSzPct val="80000"/>
+            </a:pPr>
+            <a:r>
+              <a:rPr lang="en-US" sz="900" kern="0" dirty="0">
+                <a:solidFill>
+                  <a:schemeClr val="bg1"/>
+                </a:solidFill>
+                <a:latin typeface="Arial monospaced for SAP" panose="020B0609020202030204" pitchFamily="49" charset="0"/>
+                <a:ea typeface="Arial Unicode MS" pitchFamily="34" charset="-128"/>
+                <a:cs typeface="Courier New" panose="02070309020205020404" pitchFamily="49" charset="0"/>
+              </a:rPr>
+              <a:t>...</a:t>
+            </a:r>
+          </a:p>
+        </p:txBody>
+      </p:sp>
+      <p:sp>
+        <p:nvSpPr>
+          <p:cNvPr id="2" name="Rectangle 1">
+            <a:extLst>
+              <a:ext uri="{FF2B5EF4-FFF2-40B4-BE49-F238E27FC236}">
+                <a16:creationId xmlns:a16="http://schemas.microsoft.com/office/drawing/2014/main" id="{AE5DF3FF-9C48-4E71-B3A2-F3988FAA9716}"/>
+              </a:ext>
+            </a:extLst>
+          </p:cNvPr>
+          <p:cNvSpPr/>
+          <p:nvPr/>
+        </p:nvSpPr>
+        <p:spPr>
+          <a:xfrm>
+            <a:off x="5702451" y="5211263"/>
+            <a:ext cx="516488" cy="415498"/>
+          </a:xfrm>
+          <a:prstGeom prst="rect">
+            <a:avLst/>
+          </a:prstGeom>
+        </p:spPr>
+        <p:txBody>
+          <a:bodyPr wrap="none">
+            <a:spAutoFit/>
+          </a:bodyPr>
+          <a:lstStyle/>
+          <a:p>
+            <a:r>
+              <a:rPr lang="en-US" dirty="0"/>
+              <a:t>👍</a:t>
+            </a:r>
+          </a:p>
+        </p:txBody>
+      </p:sp>
+    </p:spTree>
+    <p:extLst>
+      <p:ext uri="{BB962C8B-B14F-4D97-AF65-F5344CB8AC3E}">
+        <p14:creationId xmlns:p14="http://schemas.microsoft.com/office/powerpoint/2010/main" val="2960905310"/>
+      </p:ext>
+    </p:extLst>
+  </p:cSld>
+  <p:clrMapOvr>
+    <a:masterClrMapping/>
+  </p:clrMapOvr>
+</p:sld>
+</file>
+
+<file path=ppt/slides/slide6.xml><?xml version="1.0" encoding="utf-8"?>
+<p:sld xmlns:a="http://schemas.openxmlformats.org/drawingml/2006/main" xmlns:r="http://schemas.openxmlformats.org/officeDocument/2006/relationships" xmlns:p="http://schemas.openxmlformats.org/presentationml/2006/main">
+  <p:cSld>
+    <p:spTree>
+      <p:nvGrpSpPr>
+        <p:cNvPr id="1" name=""/>
+        <p:cNvGrpSpPr/>
+        <p:nvPr/>
+      </p:nvGrpSpPr>
+      <p:grpSpPr>
+        <a:xfrm>
+          <a:off x="0" y="0"/>
+          <a:ext cx="0" cy="0"/>
+          <a:chOff x="0" y="0"/>
+          <a:chExt cx="0" cy="0"/>
+        </a:xfrm>
+      </p:grpSpPr>
+      <p:sp>
+        <p:nvSpPr>
+          <p:cNvPr id="4" name="Title 3">
+            <a:extLst>
+              <a:ext uri="{FF2B5EF4-FFF2-40B4-BE49-F238E27FC236}">
+                <a16:creationId xmlns:a16="http://schemas.microsoft.com/office/drawing/2014/main" id="{96BEB1A8-C9D3-4723-A64F-42E02E22325A}"/>
+              </a:ext>
+            </a:extLst>
+          </p:cNvPr>
+          <p:cNvSpPr>
+            <a:spLocks noGrp="1"/>
+          </p:cNvSpPr>
+          <p:nvPr>
+            <p:ph type="title"/>
+          </p:nvPr>
+        </p:nvSpPr>
+        <p:spPr/>
+        <p:txBody>
+          <a:bodyPr/>
+          <a:lstStyle/>
+          <a:p>
+            <a:r>
+              <a:rPr lang="en-US" dirty="0"/>
+              <a:t>Demo</a:t>
+            </a:r>
+          </a:p>
+        </p:txBody>
+      </p:sp>
+      <p:pic>
+        <p:nvPicPr>
+          <p:cNvPr id="6" name="Picture 5">
+            <a:extLst>
+              <a:ext uri="{FF2B5EF4-FFF2-40B4-BE49-F238E27FC236}">
+                <a16:creationId xmlns:a16="http://schemas.microsoft.com/office/drawing/2014/main" id="{8D1ACC5F-52FE-4C32-9E61-49F09FCEB59D}"/>
+              </a:ext>
+            </a:extLst>
+          </p:cNvPr>
+          <p:cNvPicPr>
+            <a:picLocks noChangeAspect="1"/>
+          </p:cNvPicPr>
+          <p:nvPr/>
+        </p:nvPicPr>
+        <p:blipFill>
+          <a:blip r:embed="rId3"/>
+          <a:stretch>
+            <a:fillRect/>
+          </a:stretch>
+        </p:blipFill>
+        <p:spPr>
+          <a:xfrm>
+            <a:off x="4521420" y="1853181"/>
+            <a:ext cx="3151638" cy="3151638"/>
+          </a:xfrm>
+          <a:prstGeom prst="rect">
+            <a:avLst/>
+          </a:prstGeom>
+        </p:spPr>
+      </p:pic>
+    </p:spTree>
+    <p:extLst>
+      <p:ext uri="{BB962C8B-B14F-4D97-AF65-F5344CB8AC3E}">
+        <p14:creationId xmlns:p14="http://schemas.microsoft.com/office/powerpoint/2010/main" val="2320775727"/>
+      </p:ext>
+    </p:extLst>
+  </p:cSld>
+  <p:clrMapOvr>
+    <a:masterClrMapping/>
+  </p:clrMapOvr>
+</p:sld>
+</file>
+
+<file path=ppt/slides/slide7.xml><?xml version="1.0" encoding="utf-8"?>
 <p:sld xmlns:a="http://schemas.openxmlformats.org/drawingml/2006/main" xmlns:r="http://schemas.openxmlformats.org/officeDocument/2006/relationships" xmlns:p="http://schemas.openxmlformats.org/presentationml/2006/main">
   <p:cSld>
     <p:spTree>
@@ -13512,7 +15765,7 @@
 </p:sld>
 </file>
 
-<file path=ppt/slides/slide6.xml><?xml version="1.0" encoding="utf-8"?>
+<file path=ppt/slides/slide8.xml><?xml version="1.0" encoding="utf-8"?>
 <p:sld xmlns:a="http://schemas.openxmlformats.org/drawingml/2006/main" xmlns:r="http://schemas.openxmlformats.org/officeDocument/2006/relationships" xmlns:p="http://schemas.openxmlformats.org/presentationml/2006/main">
   <p:cSld>
     <p:spTree>
@@ -13695,7 +15948,7 @@
 </p:sld>
 </file>
 
-<file path=ppt/slides/slide7.xml><?xml version="1.0" encoding="utf-8"?>
+<file path=ppt/slides/slide9.xml><?xml version="1.0" encoding="utf-8"?>
 <p:sld xmlns:a="http://schemas.openxmlformats.org/drawingml/2006/main" xmlns:r="http://schemas.openxmlformats.org/officeDocument/2006/relationships" xmlns:p="http://schemas.openxmlformats.org/presentationml/2006/main">
   <p:cSld>
     <p:spTree>
@@ -13714,7 +15967,13 @@
       </p:grpSpPr>
       <p:sp>
         <p:nvSpPr>
-          <p:cNvPr id="3" name="Title 2"/>
+          <p:cNvPr id="3" name="Title 2">
+            <a:extLst>
+              <a:ext uri="{FF2B5EF4-FFF2-40B4-BE49-F238E27FC236}">
+                <a16:creationId xmlns:a16="http://schemas.microsoft.com/office/drawing/2014/main" id="{B73DFC8A-D39C-4395-A874-03C42AE64146}"/>
+              </a:ext>
+            </a:extLst>
+          </p:cNvPr>
           <p:cNvSpPr>
             <a:spLocks noGrp="1"/>
           </p:cNvSpPr>
@@ -13729,68 +15988,204 @@
           <a:p>
             <a:r>
               <a:rPr lang="en-US" dirty="0"/>
-              <a:t>Information about containers</a:t>
+              <a:t>Image names &amp; tags</a:t>
             </a:r>
           </a:p>
         </p:txBody>
       </p:sp>
       <p:sp>
         <p:nvSpPr>
-          <p:cNvPr id="6" name="Text Placeholder 10"/>
-          <p:cNvSpPr>
-            <a:spLocks noGrp="1"/>
-          </p:cNvSpPr>
-          <p:nvPr>
-            <p:ph type="body" sz="quarter" idx="10"/>
-          </p:nvPr>
+          <p:cNvPr id="4" name="Rectangle: Rounded Corners 3">
+            <a:extLst>
+              <a:ext uri="{FF2B5EF4-FFF2-40B4-BE49-F238E27FC236}">
+                <a16:creationId xmlns:a16="http://schemas.microsoft.com/office/drawing/2014/main" id="{069317E0-1935-457B-9BE2-13D2F434C611}"/>
+              </a:ext>
+            </a:extLst>
+          </p:cNvPr>
+          <p:cNvSpPr/>
+          <p:nvPr/>
         </p:nvSpPr>
-        <p:spPr>
+        <p:spPr bwMode="gray">
           <a:xfrm>
-            <a:off x="503999" y="1620000"/>
-            <a:ext cx="11186477" cy="4230000"/>
+            <a:off x="1577888" y="1336602"/>
+            <a:ext cx="9077099" cy="1449128"/>
           </a:xfrm>
+          <a:prstGeom prst="roundRect">
+            <a:avLst>
+              <a:gd name="adj" fmla="val 8296"/>
+            </a:avLst>
+          </a:prstGeom>
+          <a:pattFill prst="narHorz">
+            <a:fgClr>
+              <a:schemeClr val="tx1"/>
+            </a:fgClr>
+            <a:bgClr>
+              <a:srgbClr val="112806"/>
+            </a:bgClr>
+          </a:pattFill>
+          <a:ln w="6350" algn="ctr">
+            <a:noFill/>
+            <a:miter lim="800000"/>
+            <a:headEnd/>
+            <a:tailEnd/>
+          </a:ln>
         </p:spPr>
         <p:txBody>
-          <a:bodyPr/>
+          <a:bodyPr lIns="90000" tIns="72000" rIns="90000" bIns="72000" rtlCol="0" anchor="t"/>
           <a:lstStyle/>
           <a:p>
-            <a:pPr lvl="0"/>
-            <a:r>
-              <a:rPr lang="en-US" sz="1800" dirty="0"/>
-              <a:t>Available images</a:t>
-            </a:r>
-          </a:p>
-          <a:p>
-            <a:pPr lvl="1"/>
-            <a:r>
-              <a:rPr lang="en-US" sz="1600" dirty="0"/>
-              <a:t>the command </a:t>
-            </a:r>
-            <a:r>
-              <a:rPr lang="en-US" sz="1600" b="1" dirty="0">
+            <a:pPr defTabSz="914400" fontAlgn="base">
+              <a:spcAft>
+                <a:spcPct val="0"/>
+              </a:spcAft>
+              <a:buClr>
+                <a:srgbClr val="F0AB00"/>
+              </a:buClr>
+              <a:buSzPct val="80000"/>
+            </a:pPr>
+            <a:r>
+              <a:rPr lang="en-US" sz="1400" b="1" kern="0" dirty="0">
+                <a:solidFill>
+                  <a:schemeClr val="bg1"/>
+                </a:solidFill>
                 <a:latin typeface="Courier New" panose="02070309020205020404" pitchFamily="49" charset="0"/>
+                <a:ea typeface="Arial Unicode MS" pitchFamily="34" charset="-128"/>
                 <a:cs typeface="Courier New" panose="02070309020205020404" pitchFamily="49" charset="0"/>
               </a:rPr>
-              <a:t>docker image list</a:t>
-            </a:r>
-            <a:r>
-              <a:rPr lang="en-US" sz="1600" dirty="0"/>
-              <a:t> gives a list of all available images on a host</a:t>
-            </a:r>
+              <a:t>$  docker image list</a:t>
+            </a:r>
+          </a:p>
+          <a:p>
+            <a:pPr defTabSz="914400" fontAlgn="base">
+              <a:spcAft>
+                <a:spcPct val="0"/>
+              </a:spcAft>
+              <a:buClr>
+                <a:srgbClr val="F0AB00"/>
+              </a:buClr>
+              <a:buSzPct val="80000"/>
+            </a:pPr>
+            <a:endParaRPr lang="en-US" sz="1400" b="1" kern="0" dirty="0">
+              <a:solidFill>
+                <a:schemeClr val="bg1"/>
+              </a:solidFill>
+              <a:latin typeface="Courier New" panose="02070309020205020404" pitchFamily="49" charset="0"/>
+              <a:ea typeface="Arial Unicode MS" pitchFamily="34" charset="-128"/>
+              <a:cs typeface="Courier New" panose="02070309020205020404" pitchFamily="49" charset="0"/>
+            </a:endParaRPr>
+          </a:p>
+          <a:p>
+            <a:pPr defTabSz="914400" fontAlgn="base">
+              <a:spcAft>
+                <a:spcPct val="0"/>
+              </a:spcAft>
+              <a:buClr>
+                <a:srgbClr val="F0AB00"/>
+              </a:buClr>
+              <a:buSzPct val="80000"/>
+            </a:pPr>
+            <a:r>
+              <a:rPr lang="en-US" sz="1400" b="1" kern="0" dirty="0">
+                <a:solidFill>
+                  <a:schemeClr val="bg1"/>
+                </a:solidFill>
+                <a:latin typeface="Courier New" panose="02070309020205020404" pitchFamily="49" charset="0"/>
+                <a:ea typeface="Arial Unicode MS" pitchFamily="34" charset="-128"/>
+                <a:cs typeface="Courier New" panose="02070309020205020404" pitchFamily="49" charset="0"/>
+              </a:rPr>
+              <a:t>REPOSITORY                                         		 TAG     IMAGE ID</a:t>
+            </a:r>
+          </a:p>
+          <a:p>
+            <a:pPr defTabSz="914400" fontAlgn="base">
+              <a:spcAft>
+                <a:spcPct val="0"/>
+              </a:spcAft>
+              <a:buClr>
+                <a:srgbClr val="F0AB00"/>
+              </a:buClr>
+              <a:buSzPct val="80000"/>
+            </a:pPr>
+            <a:endParaRPr lang="en-US" sz="1400" b="1" kern="0" dirty="0">
+              <a:solidFill>
+                <a:schemeClr val="bg1"/>
+              </a:solidFill>
+              <a:latin typeface="Courier New" panose="02070309020205020404" pitchFamily="49" charset="0"/>
+              <a:ea typeface="Arial Unicode MS" pitchFamily="34" charset="-128"/>
+              <a:cs typeface="Courier New" panose="02070309020205020404" pitchFamily="49" charset="0"/>
+            </a:endParaRPr>
+          </a:p>
+          <a:p>
+            <a:pPr defTabSz="914400" fontAlgn="base">
+              <a:spcAft>
+                <a:spcPct val="0"/>
+              </a:spcAft>
+              <a:buClr>
+                <a:srgbClr val="F0AB00"/>
+              </a:buClr>
+              <a:buSzPct val="80000"/>
+            </a:pPr>
+            <a:r>
+              <a:rPr lang="en-US" sz="1400" b="1" kern="0" dirty="0">
+                <a:solidFill>
+                  <a:schemeClr val="bg1"/>
+                </a:solidFill>
+                <a:latin typeface="Courier New" panose="02070309020205020404" pitchFamily="49" charset="0"/>
+                <a:ea typeface="Arial Unicode MS" pitchFamily="34" charset="-128"/>
+                <a:cs typeface="Courier New" panose="02070309020205020404" pitchFamily="49" charset="0"/>
+              </a:rPr>
+              <a:t>my-registry.ondemand.com/</a:t>
+            </a:r>
+            <a:r>
+              <a:rPr lang="en-US" sz="1400" b="1" kern="0" dirty="0" err="1">
+                <a:solidFill>
+                  <a:schemeClr val="bg1"/>
+                </a:solidFill>
+                <a:latin typeface="Courier New" panose="02070309020205020404" pitchFamily="49" charset="0"/>
+                <a:ea typeface="Arial Unicode MS" pitchFamily="34" charset="-128"/>
+                <a:cs typeface="Courier New" panose="02070309020205020404" pitchFamily="49" charset="0"/>
+              </a:rPr>
+              <a:t>busybox</a:t>
+            </a:r>
+            <a:r>
+              <a:rPr lang="en-US" sz="1400" b="1" kern="0" dirty="0">
+                <a:solidFill>
+                  <a:schemeClr val="bg1"/>
+                </a:solidFill>
+                <a:latin typeface="Courier New" panose="02070309020205020404" pitchFamily="49" charset="0"/>
+                <a:ea typeface="Arial Unicode MS" pitchFamily="34" charset="-128"/>
+                <a:cs typeface="Courier New" panose="02070309020205020404" pitchFamily="49" charset="0"/>
+              </a:rPr>
+              <a:t>  				 0.1    6ad733544a63</a:t>
+            </a:r>
+            <a:endParaRPr lang="en-US" sz="1400" kern="0" dirty="0">
+              <a:solidFill>
+                <a:schemeClr val="bg1"/>
+              </a:solidFill>
+              <a:latin typeface="Arial monospaced for SAP" panose="020B0609020202030204" pitchFamily="49" charset="0"/>
+              <a:ea typeface="Arial Unicode MS" pitchFamily="34" charset="-128"/>
+              <a:cs typeface="Courier New" panose="02070309020205020404" pitchFamily="49" charset="0"/>
+            </a:endParaRPr>
           </a:p>
         </p:txBody>
       </p:sp>
       <p:cxnSp>
         <p:nvCxnSpPr>
-          <p:cNvPr id="5" name="Straight Arrow Connector 4"/>
+          <p:cNvPr id="5" name="Straight Arrow Connector 4">
+            <a:extLst>
+              <a:ext uri="{FF2B5EF4-FFF2-40B4-BE49-F238E27FC236}">
+                <a16:creationId xmlns:a16="http://schemas.microsoft.com/office/drawing/2014/main" id="{BF922026-9CBD-4AD6-988B-B26ED9E264FA}"/>
+              </a:ext>
+            </a:extLst>
+          </p:cNvPr>
           <p:cNvCxnSpPr>
-            <a:endCxn id="10" idx="0"/>
+            <a:endCxn id="6" idx="0"/>
           </p:cNvCxnSpPr>
           <p:nvPr/>
         </p:nvCxnSpPr>
         <p:spPr>
           <a:xfrm flipH="1">
-            <a:off x="1299337" y="3466006"/>
+            <a:off x="2804594" y="2651449"/>
             <a:ext cx="15658" cy="1512575"/>
           </a:xfrm>
           <a:prstGeom prst="straightConnector1">
@@ -13821,13 +16216,19 @@
       </p:cxnSp>
       <p:sp>
         <p:nvSpPr>
-          <p:cNvPr id="10" name="Rectangle 9"/>
+          <p:cNvPr id="6" name="Rectangle 5">
+            <a:extLst>
+              <a:ext uri="{FF2B5EF4-FFF2-40B4-BE49-F238E27FC236}">
+                <a16:creationId xmlns:a16="http://schemas.microsoft.com/office/drawing/2014/main" id="{12BD95AA-12D5-40DA-9038-E0DAF2E63607}"/>
+              </a:ext>
+            </a:extLst>
+          </p:cNvPr>
           <p:cNvSpPr/>
           <p:nvPr/>
         </p:nvSpPr>
         <p:spPr bwMode="gray">
           <a:xfrm>
-            <a:off x="503999" y="4978581"/>
+            <a:off x="2009256" y="4164024"/>
             <a:ext cx="1590675" cy="457200"/>
           </a:xfrm>
           <a:prstGeom prst="rect">
@@ -13870,7 +16271,7 @@
                 <a:ea typeface="Arial Unicode MS" pitchFamily="34" charset="-128"/>
                 <a:cs typeface="Arial Unicode MS" pitchFamily="34" charset="-128"/>
               </a:rPr>
-              <a:t>image name</a:t>
+              <a:t>Registry URL</a:t>
             </a:r>
             <a:endParaRPr kumimoji="0" lang="en-US" sz="1400" b="0" i="0" u="none" strike="noStrike" kern="0" cap="none" spc="0" normalizeH="0" baseline="0" dirty="0">
               <a:ln>
@@ -13885,123 +16286,25 @@
           </a:p>
         </p:txBody>
       </p:sp>
-      <p:sp>
-        <p:nvSpPr>
-          <p:cNvPr id="18" name="Rectangle 17"/>
-          <p:cNvSpPr/>
-          <p:nvPr/>
-        </p:nvSpPr>
-        <p:spPr bwMode="gray">
-          <a:xfrm>
-            <a:off x="2743200" y="4816657"/>
-            <a:ext cx="1590675" cy="410396"/>
-          </a:xfrm>
-          <a:prstGeom prst="rect">
-            <a:avLst/>
-          </a:prstGeom>
-          <a:solidFill>
-            <a:schemeClr val="accent1"/>
-          </a:solidFill>
-          <a:ln w="6350" algn="ctr">
-            <a:solidFill>
-              <a:schemeClr val="tx1"/>
-            </a:solidFill>
-            <a:miter lim="800000"/>
-            <a:headEnd/>
-            <a:tailEnd/>
-          </a:ln>
-        </p:spPr>
-        <p:txBody>
-          <a:bodyPr lIns="90000" tIns="72000" rIns="90000" bIns="72000" rtlCol="0" anchor="ctr"/>
-          <a:lstStyle/>
-          <a:p>
-            <a:pPr marR="0" algn="ctr" defTabSz="914400" eaLnBrk="1" fontAlgn="base" latinLnBrk="0" hangingPunct="1">
-              <a:lnSpc>
-                <a:spcPct val="100000"/>
-              </a:lnSpc>
-              <a:spcBef>
-                <a:spcPct val="50000"/>
-              </a:spcBef>
-              <a:spcAft>
-                <a:spcPct val="0"/>
-              </a:spcAft>
-              <a:buClr>
-                <a:srgbClr val="F0AB00"/>
-              </a:buClr>
-              <a:buSzPct val="80000"/>
-              <a:tabLst/>
-            </a:pPr>
-            <a:r>
-              <a:rPr lang="en-US" sz="1400" kern="0" dirty="0">
-                <a:ea typeface="Arial Unicode MS" pitchFamily="34" charset="-128"/>
-                <a:cs typeface="Arial Unicode MS" pitchFamily="34" charset="-128"/>
-              </a:rPr>
-              <a:t>useful description</a:t>
-            </a:r>
-            <a:endParaRPr kumimoji="0" lang="en-US" sz="1400" b="0" i="0" u="none" strike="noStrike" kern="0" cap="none" spc="0" normalizeH="0" baseline="0" dirty="0">
-              <a:ln>
-                <a:noFill/>
-              </a:ln>
-              <a:effectLst/>
-              <a:uLnTx/>
-              <a:uFillTx/>
-              <a:ea typeface="Arial Unicode MS" pitchFamily="34" charset="-128"/>
-              <a:cs typeface="Arial Unicode MS" pitchFamily="34" charset="-128"/>
-            </a:endParaRPr>
-          </a:p>
-        </p:txBody>
-      </p:sp>
       <p:cxnSp>
         <p:nvCxnSpPr>
-          <p:cNvPr id="19" name="Straight Arrow Connector 18"/>
+          <p:cNvPr id="7" name="Straight Arrow Connector 6">
+            <a:extLst>
+              <a:ext uri="{FF2B5EF4-FFF2-40B4-BE49-F238E27FC236}">
+                <a16:creationId xmlns:a16="http://schemas.microsoft.com/office/drawing/2014/main" id="{8C8EEE4C-AA55-4A12-B5A1-4CDE1FBB2453}"/>
+              </a:ext>
+            </a:extLst>
+          </p:cNvPr>
           <p:cNvCxnSpPr>
-            <a:endCxn id="18" idx="0"/>
+            <a:cxnSpLocks/>
+            <a:endCxn id="8" idx="0"/>
           </p:cNvCxnSpPr>
           <p:nvPr/>
         </p:nvCxnSpPr>
         <p:spPr>
-          <a:xfrm flipH="1">
-            <a:off x="3538538" y="3605886"/>
-            <a:ext cx="10350" cy="1210771"/>
-          </a:xfrm>
-          <a:prstGeom prst="straightConnector1">
-            <a:avLst/>
-          </a:prstGeom>
-          <a:ln w="19050">
-            <a:solidFill>
-              <a:srgbClr val="FF0000"/>
-            </a:solidFill>
-            <a:headEnd type="none" w="med" len="med"/>
-            <a:tailEnd type="triangle" w="lg" len="lg"/>
-          </a:ln>
-        </p:spPr>
-        <p:style>
-          <a:lnRef idx="1">
-            <a:schemeClr val="accent1"/>
-          </a:lnRef>
-          <a:fillRef idx="0">
-            <a:schemeClr val="accent1"/>
-          </a:fillRef>
-          <a:effectRef idx="0">
-            <a:schemeClr val="accent1"/>
-          </a:effectRef>
-          <a:fontRef idx="minor">
-            <a:schemeClr val="tx1"/>
-          </a:fontRef>
-        </p:style>
-      </p:cxnSp>
-      <p:cxnSp>
-        <p:nvCxnSpPr>
-          <p:cNvPr id="25" name="Straight Arrow Connector 24"/>
-          <p:cNvCxnSpPr>
-            <a:endCxn id="26" idx="0"/>
-          </p:cNvCxnSpPr>
-          <p:nvPr/>
-        </p:nvCxnSpPr>
-        <p:spPr>
-          <a:xfrm flipH="1">
-            <a:off x="5423602" y="3814898"/>
-            <a:ext cx="402104" cy="1399453"/>
+          <a:xfrm>
+            <a:off x="4726851" y="2559696"/>
+            <a:ext cx="0" cy="785127"/>
           </a:xfrm>
           <a:prstGeom prst="straightConnector1">
             <a:avLst/>
@@ -14031,14 +16334,20 @@
       </p:cxnSp>
       <p:sp>
         <p:nvSpPr>
-          <p:cNvPr id="26" name="Rectangle 25"/>
+          <p:cNvPr id="8" name="Rectangle 7">
+            <a:extLst>
+              <a:ext uri="{FF2B5EF4-FFF2-40B4-BE49-F238E27FC236}">
+                <a16:creationId xmlns:a16="http://schemas.microsoft.com/office/drawing/2014/main" id="{50B9421B-07C4-46F0-A064-FEDE9DC42898}"/>
+              </a:ext>
+            </a:extLst>
+          </p:cNvPr>
           <p:cNvSpPr/>
           <p:nvPr/>
         </p:nvSpPr>
         <p:spPr bwMode="gray">
           <a:xfrm>
-            <a:off x="4628264" y="5214351"/>
-            <a:ext cx="1590675" cy="442859"/>
+            <a:off x="3931513" y="3344823"/>
+            <a:ext cx="1590675" cy="457200"/>
           </a:xfrm>
           <a:prstGeom prst="rect">
             <a:avLst/>
@@ -14076,103 +16385,40 @@
               <a:tabLst/>
             </a:pPr>
             <a:r>
-              <a:rPr lang="en-US" sz="1400" kern="0" dirty="0">
+              <a:rPr kumimoji="0" lang="en-US" sz="1400" b="0" i="0" u="none" strike="noStrike" kern="0" cap="none" spc="0" normalizeH="0" baseline="0" dirty="0">
+                <a:ln>
+                  <a:noFill/>
+                </a:ln>
+                <a:effectLst/>
+                <a:uLnTx/>
+                <a:uFillTx/>
                 <a:ea typeface="Arial Unicode MS" pitchFamily="34" charset="-128"/>
                 <a:cs typeface="Arial Unicode MS" pitchFamily="34" charset="-128"/>
               </a:rPr>
-              <a:t>LIKES!</a:t>
-            </a:r>
-            <a:endParaRPr kumimoji="0" lang="en-US" sz="1400" b="0" i="0" u="none" strike="noStrike" kern="0" cap="none" spc="0" normalizeH="0" baseline="0" dirty="0">
-              <a:ln>
-                <a:noFill/>
-              </a:ln>
-              <a:effectLst/>
-              <a:uLnTx/>
-              <a:uFillTx/>
-              <a:ea typeface="Arial Unicode MS" pitchFamily="34" charset="-128"/>
-              <a:cs typeface="Arial Unicode MS" pitchFamily="34" charset="-128"/>
-            </a:endParaRPr>
-          </a:p>
-        </p:txBody>
-      </p:sp>
-      <p:sp>
-        <p:nvSpPr>
-          <p:cNvPr id="28" name="Rectangle 27"/>
-          <p:cNvSpPr/>
-          <p:nvPr/>
-        </p:nvSpPr>
-        <p:spPr bwMode="gray">
-          <a:xfrm>
-            <a:off x="6513185" y="4476144"/>
-            <a:ext cx="1495014" cy="518290"/>
-          </a:xfrm>
-          <a:prstGeom prst="rect">
-            <a:avLst/>
-          </a:prstGeom>
-          <a:solidFill>
-            <a:schemeClr val="accent1"/>
-          </a:solidFill>
-          <a:ln w="6350" algn="ctr">
-            <a:solidFill>
-              <a:schemeClr val="tx1"/>
-            </a:solidFill>
-            <a:miter lim="800000"/>
-            <a:headEnd/>
-            <a:tailEnd/>
-          </a:ln>
-        </p:spPr>
-        <p:txBody>
-          <a:bodyPr lIns="90000" tIns="72000" rIns="90000" bIns="72000" rtlCol="0" anchor="ctr"/>
-          <a:lstStyle/>
-          <a:p>
-            <a:pPr marR="0" algn="ctr" defTabSz="914400" eaLnBrk="1" fontAlgn="base" latinLnBrk="0" hangingPunct="1">
-              <a:lnSpc>
-                <a:spcPct val="100000"/>
-              </a:lnSpc>
-              <a:spcBef>
-                <a:spcPct val="50000"/>
-              </a:spcBef>
-              <a:spcAft>
-                <a:spcPct val="0"/>
-              </a:spcAft>
-              <a:buClr>
-                <a:srgbClr val="F0AB00"/>
-              </a:buClr>
-              <a:buSzPct val="80000"/>
-              <a:tabLst/>
-            </a:pPr>
-            <a:r>
-              <a:rPr lang="en-US" sz="1400" kern="0" dirty="0">
-                <a:ea typeface="Arial Unicode MS" pitchFamily="34" charset="-128"/>
-                <a:cs typeface="Arial Unicode MS" pitchFamily="34" charset="-128"/>
-              </a:rPr>
-              <a:t>official project maintainer</a:t>
-            </a:r>
-            <a:endParaRPr kumimoji="0" lang="en-US" sz="1400" b="0" i="0" u="none" strike="noStrike" kern="0" cap="none" spc="0" normalizeH="0" baseline="0" dirty="0">
-              <a:ln>
-                <a:noFill/>
-              </a:ln>
-              <a:effectLst/>
-              <a:uLnTx/>
-              <a:uFillTx/>
-              <a:ea typeface="Arial Unicode MS" pitchFamily="34" charset="-128"/>
-              <a:cs typeface="Arial Unicode MS" pitchFamily="34" charset="-128"/>
-            </a:endParaRPr>
+              <a:t>repository</a:t>
+            </a:r>
           </a:p>
         </p:txBody>
       </p:sp>
       <p:cxnSp>
         <p:nvCxnSpPr>
-          <p:cNvPr id="30" name="Straight Arrow Connector 29"/>
+          <p:cNvPr id="9" name="Straight Arrow Connector 8">
+            <a:extLst>
+              <a:ext uri="{FF2B5EF4-FFF2-40B4-BE49-F238E27FC236}">
+                <a16:creationId xmlns:a16="http://schemas.microsoft.com/office/drawing/2014/main" id="{A768E305-F2D2-4F82-907E-7F1D16344FA7}"/>
+              </a:ext>
+            </a:extLst>
+          </p:cNvPr>
           <p:cNvCxnSpPr>
-            <a:endCxn id="28" idx="0"/>
+            <a:cxnSpLocks/>
+            <a:endCxn id="10" idx="0"/>
           </p:cNvCxnSpPr>
           <p:nvPr/>
         </p:nvCxnSpPr>
         <p:spPr>
           <a:xfrm>
-            <a:off x="6792686" y="3814898"/>
-            <a:ext cx="468006" cy="661246"/>
+            <a:off x="8502451" y="2680755"/>
+            <a:ext cx="0" cy="689304"/>
           </a:xfrm>
           <a:prstGeom prst="straightConnector1">
             <a:avLst/>
@@ -14202,14 +16448,20 @@
       </p:cxnSp>
       <p:sp>
         <p:nvSpPr>
-          <p:cNvPr id="33" name="Rectangle 32"/>
+          <p:cNvPr id="10" name="Rectangle 9">
+            <a:extLst>
+              <a:ext uri="{FF2B5EF4-FFF2-40B4-BE49-F238E27FC236}">
+                <a16:creationId xmlns:a16="http://schemas.microsoft.com/office/drawing/2014/main" id="{4EC326E3-CD25-4113-A42A-1D155E57B0E9}"/>
+              </a:ext>
+            </a:extLst>
+          </p:cNvPr>
           <p:cNvSpPr/>
           <p:nvPr/>
         </p:nvSpPr>
         <p:spPr bwMode="gray">
           <a:xfrm>
-            <a:off x="8866216" y="5092928"/>
-            <a:ext cx="1891166" cy="600095"/>
+            <a:off x="7707113" y="3370059"/>
+            <a:ext cx="1590675" cy="457200"/>
           </a:xfrm>
           <a:prstGeom prst="rect">
             <a:avLst/>
@@ -14251,7 +16503,7 @@
                 <a:ea typeface="Arial Unicode MS" pitchFamily="34" charset="-128"/>
                 <a:cs typeface="Arial Unicode MS" pitchFamily="34" charset="-128"/>
               </a:rPr>
-              <a:t>automatically built on Docker Hub</a:t>
+              <a:t>Version tag</a:t>
             </a:r>
             <a:endParaRPr kumimoji="0" lang="en-US" sz="1400" b="0" i="0" u="none" strike="noStrike" kern="0" cap="none" spc="0" normalizeH="0" baseline="0" dirty="0">
               <a:ln>
@@ -14268,16 +16520,22 @@
       </p:sp>
       <p:cxnSp>
         <p:nvCxnSpPr>
-          <p:cNvPr id="34" name="Straight Arrow Connector 33"/>
+          <p:cNvPr id="12" name="Straight Arrow Connector 11">
+            <a:extLst>
+              <a:ext uri="{FF2B5EF4-FFF2-40B4-BE49-F238E27FC236}">
+                <a16:creationId xmlns:a16="http://schemas.microsoft.com/office/drawing/2014/main" id="{B9E23989-8ADD-417E-A235-1726D1D37DD3}"/>
+              </a:ext>
+            </a:extLst>
+          </p:cNvPr>
           <p:cNvCxnSpPr>
-            <a:endCxn id="33" idx="0"/>
+            <a:endCxn id="13" idx="0"/>
           </p:cNvCxnSpPr>
           <p:nvPr/>
         </p:nvCxnSpPr>
         <p:spPr>
-          <a:xfrm>
-            <a:off x="7576457" y="3814898"/>
-            <a:ext cx="2235342" cy="1278030"/>
+          <a:xfrm flipH="1">
+            <a:off x="9667737" y="2604290"/>
+            <a:ext cx="15658" cy="1512575"/>
           </a:xfrm>
           <a:prstGeom prst="straightConnector1">
             <a:avLst/>
@@ -14307,14 +16565,92 @@
       </p:cxnSp>
       <p:sp>
         <p:nvSpPr>
-          <p:cNvPr id="9" name="Rectangle: Rounded Corners 8"/>
+          <p:cNvPr id="13" name="Rectangle 12">
+            <a:extLst>
+              <a:ext uri="{FF2B5EF4-FFF2-40B4-BE49-F238E27FC236}">
+                <a16:creationId xmlns:a16="http://schemas.microsoft.com/office/drawing/2014/main" id="{6ED85F87-FB16-4A37-A012-3D63E385FF30}"/>
+              </a:ext>
+            </a:extLst>
+          </p:cNvPr>
           <p:cNvSpPr/>
           <p:nvPr/>
         </p:nvSpPr>
         <p:spPr bwMode="gray">
           <a:xfrm>
-            <a:off x="503999" y="2495550"/>
-            <a:ext cx="11186477" cy="1319348"/>
+            <a:off x="8872399" y="4116865"/>
+            <a:ext cx="1590675" cy="457200"/>
+          </a:xfrm>
+          <a:prstGeom prst="rect">
+            <a:avLst/>
+          </a:prstGeom>
+          <a:solidFill>
+            <a:schemeClr val="accent1"/>
+          </a:solidFill>
+          <a:ln w="6350" algn="ctr">
+            <a:solidFill>
+              <a:schemeClr val="tx1"/>
+            </a:solidFill>
+            <a:miter lim="800000"/>
+            <a:headEnd/>
+            <a:tailEnd/>
+          </a:ln>
+        </p:spPr>
+        <p:txBody>
+          <a:bodyPr lIns="90000" tIns="72000" rIns="90000" bIns="72000" rtlCol="0" anchor="ctr"/>
+          <a:lstStyle/>
+          <a:p>
+            <a:pPr marR="0" algn="ctr" defTabSz="914400" eaLnBrk="1" fontAlgn="base" latinLnBrk="0" hangingPunct="1">
+              <a:lnSpc>
+                <a:spcPct val="100000"/>
+              </a:lnSpc>
+              <a:spcBef>
+                <a:spcPct val="50000"/>
+              </a:spcBef>
+              <a:spcAft>
+                <a:spcPct val="0"/>
+              </a:spcAft>
+              <a:buClr>
+                <a:srgbClr val="F0AB00"/>
+              </a:buClr>
+              <a:buSzPct val="80000"/>
+              <a:tabLst/>
+            </a:pPr>
+            <a:r>
+              <a:rPr lang="en-US" sz="1400" kern="0" dirty="0">
+                <a:ea typeface="Arial Unicode MS" pitchFamily="34" charset="-128"/>
+                <a:cs typeface="Arial Unicode MS" pitchFamily="34" charset="-128"/>
+              </a:rPr>
+              <a:t>image hash</a:t>
+            </a:r>
+            <a:endParaRPr kumimoji="0" lang="en-US" sz="1400" b="0" i="0" u="none" strike="noStrike" kern="0" cap="none" spc="0" normalizeH="0" baseline="0" dirty="0">
+              <a:ln>
+                <a:noFill/>
+              </a:ln>
+              <a:effectLst/>
+              <a:uLnTx/>
+              <a:uFillTx/>
+              <a:ea typeface="Arial Unicode MS" pitchFamily="34" charset="-128"/>
+              <a:cs typeface="Arial Unicode MS" pitchFamily="34" charset="-128"/>
+            </a:endParaRPr>
+          </a:p>
+        </p:txBody>
+      </p:sp>
+      <p:sp>
+        <p:nvSpPr>
+          <p:cNvPr id="14" name="Rectangle: Rounded Corners 13">
+            <a:extLst>
+              <a:ext uri="{FF2B5EF4-FFF2-40B4-BE49-F238E27FC236}">
+                <a16:creationId xmlns:a16="http://schemas.microsoft.com/office/drawing/2014/main" id="{7D4A3C35-550C-449A-BCFD-EF0D36982CB4}"/>
+              </a:ext>
+            </a:extLst>
+          </p:cNvPr>
+          <p:cNvSpPr/>
+          <p:nvPr/>
+        </p:nvSpPr>
+        <p:spPr bwMode="gray">
+          <a:xfrm>
+            <a:off x="1577888" y="4951717"/>
+            <a:ext cx="9077099" cy="864295"/>
           </a:xfrm>
           <a:prstGeom prst="roundRect">
             <a:avLst>
@@ -14350,7 +16686,7 @@
               <a:buSzPct val="80000"/>
             </a:pPr>
             <a:r>
-              <a:rPr lang="en-US" sz="900" b="1" kern="0" dirty="0">
+              <a:rPr lang="en-US" sz="1400" b="1" kern="0" dirty="0">
                 <a:solidFill>
                   <a:schemeClr val="bg1"/>
                 </a:solidFill>
@@ -14358,49 +16694,8 @@
                 <a:ea typeface="Arial Unicode MS" pitchFamily="34" charset="-128"/>
                 <a:cs typeface="Courier New" panose="02070309020205020404" pitchFamily="49" charset="0"/>
               </a:rPr>
-              <a:t>$ </a:t>
-            </a:r>
-            <a:r>
-              <a:rPr lang="en-US" sz="900" b="1" kern="0" dirty="0" err="1">
-                <a:solidFill>
-                  <a:schemeClr val="bg1"/>
-                </a:solidFill>
-                <a:latin typeface="Courier New" panose="02070309020205020404" pitchFamily="49" charset="0"/>
-                <a:ea typeface="Arial Unicode MS" pitchFamily="34" charset="-128"/>
-                <a:cs typeface="Courier New" panose="02070309020205020404" pitchFamily="49" charset="0"/>
-              </a:rPr>
-              <a:t>docker</a:t>
-            </a:r>
-            <a:r>
-              <a:rPr lang="en-US" sz="900" b="1" kern="0" dirty="0">
-                <a:solidFill>
-                  <a:schemeClr val="bg1"/>
-                </a:solidFill>
-                <a:latin typeface="Courier New" panose="02070309020205020404" pitchFamily="49" charset="0"/>
-                <a:ea typeface="Arial Unicode MS" pitchFamily="34" charset="-128"/>
-                <a:cs typeface="Courier New" panose="02070309020205020404" pitchFamily="49" charset="0"/>
-              </a:rPr>
-              <a:t> search </a:t>
-            </a:r>
-            <a:r>
-              <a:rPr lang="en-US" sz="900" b="1" kern="0" dirty="0" err="1">
-                <a:solidFill>
-                  <a:schemeClr val="bg1"/>
-                </a:solidFill>
-                <a:latin typeface="Courier New" panose="02070309020205020404" pitchFamily="49" charset="0"/>
-                <a:ea typeface="Arial Unicode MS" pitchFamily="34" charset="-128"/>
-                <a:cs typeface="Courier New" panose="02070309020205020404" pitchFamily="49" charset="0"/>
-              </a:rPr>
-              <a:t>busybox</a:t>
-            </a:r>
-            <a:endParaRPr lang="en-US" sz="900" b="1" kern="0" dirty="0">
-              <a:solidFill>
-                <a:schemeClr val="bg1"/>
-              </a:solidFill>
-              <a:latin typeface="Courier New" panose="02070309020205020404" pitchFamily="49" charset="0"/>
-              <a:ea typeface="Arial Unicode MS" pitchFamily="34" charset="-128"/>
-              <a:cs typeface="Courier New" panose="02070309020205020404" pitchFamily="49" charset="0"/>
-            </a:endParaRPr>
+              <a:t>$  docker tag 6ad733544a63 my-registry.ondemand.com/busybox:0.1</a:t>
+            </a:r>
           </a:p>
           <a:p>
             <a:pPr defTabSz="914400" fontAlgn="base">
@@ -14413,15 +16708,15 @@
               <a:buSzPct val="80000"/>
             </a:pPr>
             <a:r>
-              <a:rPr lang="en-US" sz="900" kern="0" dirty="0">
+              <a:rPr lang="en-US" sz="1400" b="1" kern="0" dirty="0">
                 <a:solidFill>
                   <a:schemeClr val="bg1"/>
                 </a:solidFill>
-                <a:latin typeface="Arial monospaced for SAP" panose="020B0609020202030204" pitchFamily="49" charset="0"/>
+                <a:latin typeface="Courier New" panose="02070309020205020404" pitchFamily="49" charset="0"/>
                 <a:ea typeface="Arial Unicode MS" pitchFamily="34" charset="-128"/>
                 <a:cs typeface="Courier New" panose="02070309020205020404" pitchFamily="49" charset="0"/>
               </a:rPr>
-              <a:t>NAME                        DESCRIPTION                                     STARS     OFFICIAL   AUTOMATED</a:t>
+              <a:t>   </a:t>
             </a:r>
           </a:p>
           <a:p>
@@ -14435,397 +16730,172 @@
               <a:buSzPct val="80000"/>
             </a:pPr>
             <a:r>
-              <a:rPr lang="en-US" sz="900" kern="0" dirty="0" err="1">
+              <a:rPr lang="en-US" sz="1400" b="1" kern="0" dirty="0">
                 <a:solidFill>
                   <a:schemeClr val="bg1"/>
                 </a:solidFill>
-                <a:latin typeface="Arial monospaced for SAP" panose="020B0609020202030204" pitchFamily="49" charset="0"/>
+                <a:latin typeface="Courier New" panose="02070309020205020404" pitchFamily="49" charset="0"/>
                 <a:ea typeface="Arial Unicode MS" pitchFamily="34" charset="-128"/>
                 <a:cs typeface="Courier New" panose="02070309020205020404" pitchFamily="49" charset="0"/>
               </a:rPr>
-              <a:t>busybox</a:t>
-            </a:r>
-            <a:r>
-              <a:rPr lang="en-US" sz="900" kern="0" dirty="0">
-                <a:solidFill>
-                  <a:schemeClr val="bg1"/>
-                </a:solidFill>
-                <a:latin typeface="Arial monospaced for SAP" panose="020B0609020202030204" pitchFamily="49" charset="0"/>
-                <a:ea typeface="Arial Unicode MS" pitchFamily="34" charset="-128"/>
-                <a:cs typeface="Courier New" panose="02070309020205020404" pitchFamily="49" charset="0"/>
-              </a:rPr>
-              <a:t>                     </a:t>
-            </a:r>
-            <a:r>
-              <a:rPr lang="en-US" sz="900" kern="0" dirty="0" err="1">
-                <a:solidFill>
-                  <a:schemeClr val="bg1"/>
-                </a:solidFill>
-                <a:latin typeface="Arial monospaced for SAP" panose="020B0609020202030204" pitchFamily="49" charset="0"/>
-                <a:ea typeface="Arial Unicode MS" pitchFamily="34" charset="-128"/>
-                <a:cs typeface="Courier New" panose="02070309020205020404" pitchFamily="49" charset="0"/>
-              </a:rPr>
-              <a:t>Busybox</a:t>
-            </a:r>
-            <a:r>
-              <a:rPr lang="en-US" sz="900" kern="0" dirty="0">
-                <a:solidFill>
-                  <a:schemeClr val="bg1"/>
-                </a:solidFill>
-                <a:latin typeface="Arial monospaced for SAP" panose="020B0609020202030204" pitchFamily="49" charset="0"/>
-                <a:ea typeface="Arial Unicode MS" pitchFamily="34" charset="-128"/>
-                <a:cs typeface="Courier New" panose="02070309020205020404" pitchFamily="49" charset="0"/>
-              </a:rPr>
-              <a:t> base image.                             1160      [OK]       </a:t>
-            </a:r>
-          </a:p>
-          <a:p>
-            <a:pPr defTabSz="914400" fontAlgn="base">
-              <a:spcAft>
-                <a:spcPct val="0"/>
-              </a:spcAft>
-              <a:buClr>
-                <a:srgbClr val="F0AB00"/>
-              </a:buClr>
-              <a:buSzPct val="80000"/>
-            </a:pPr>
-            <a:r>
-              <a:rPr lang="en-US" sz="900" kern="0" dirty="0" err="1">
-                <a:solidFill>
-                  <a:schemeClr val="bg1"/>
-                </a:solidFill>
-                <a:latin typeface="Arial monospaced for SAP" panose="020B0609020202030204" pitchFamily="49" charset="0"/>
-                <a:ea typeface="Arial Unicode MS" pitchFamily="34" charset="-128"/>
-                <a:cs typeface="Courier New" panose="02070309020205020404" pitchFamily="49" charset="0"/>
-              </a:rPr>
-              <a:t>progrium</a:t>
-            </a:r>
-            <a:r>
-              <a:rPr lang="en-US" sz="900" kern="0" dirty="0">
-                <a:solidFill>
-                  <a:schemeClr val="bg1"/>
-                </a:solidFill>
-                <a:latin typeface="Arial monospaced for SAP" panose="020B0609020202030204" pitchFamily="49" charset="0"/>
-                <a:ea typeface="Arial Unicode MS" pitchFamily="34" charset="-128"/>
-                <a:cs typeface="Courier New" panose="02070309020205020404" pitchFamily="49" charset="0"/>
-              </a:rPr>
-              <a:t>/</a:t>
-            </a:r>
-            <a:r>
-              <a:rPr lang="en-US" sz="900" kern="0" dirty="0" err="1">
-                <a:solidFill>
-                  <a:schemeClr val="bg1"/>
-                </a:solidFill>
-                <a:latin typeface="Arial monospaced for SAP" panose="020B0609020202030204" pitchFamily="49" charset="0"/>
-                <a:ea typeface="Arial Unicode MS" pitchFamily="34" charset="-128"/>
-                <a:cs typeface="Courier New" panose="02070309020205020404" pitchFamily="49" charset="0"/>
-              </a:rPr>
-              <a:t>busybox</a:t>
-            </a:r>
-            <a:r>
-              <a:rPr lang="en-US" sz="900" kern="0" dirty="0">
-                <a:solidFill>
-                  <a:schemeClr val="bg1"/>
-                </a:solidFill>
-                <a:latin typeface="Arial monospaced for SAP" panose="020B0609020202030204" pitchFamily="49" charset="0"/>
-                <a:ea typeface="Arial Unicode MS" pitchFamily="34" charset="-128"/>
-                <a:cs typeface="Courier New" panose="02070309020205020404" pitchFamily="49" charset="0"/>
-              </a:rPr>
-              <a:t>                                                            66                   [OK]</a:t>
-            </a:r>
-          </a:p>
-          <a:p>
-            <a:pPr defTabSz="914400" fontAlgn="base">
-              <a:spcAft>
-                <a:spcPct val="0"/>
-              </a:spcAft>
-              <a:buClr>
-                <a:srgbClr val="F0AB00"/>
-              </a:buClr>
-              <a:buSzPct val="80000"/>
-            </a:pPr>
-            <a:r>
-              <a:rPr lang="en-US" sz="900" kern="0" dirty="0" err="1">
-                <a:solidFill>
-                  <a:schemeClr val="bg1"/>
-                </a:solidFill>
-                <a:latin typeface="Arial monospaced for SAP" panose="020B0609020202030204" pitchFamily="49" charset="0"/>
-                <a:ea typeface="Arial Unicode MS" pitchFamily="34" charset="-128"/>
-                <a:cs typeface="Courier New" panose="02070309020205020404" pitchFamily="49" charset="0"/>
-              </a:rPr>
-              <a:t>hypriot</a:t>
-            </a:r>
-            <a:r>
-              <a:rPr lang="en-US" sz="900" kern="0" dirty="0">
-                <a:solidFill>
-                  <a:schemeClr val="bg1"/>
-                </a:solidFill>
-                <a:latin typeface="Arial monospaced for SAP" panose="020B0609020202030204" pitchFamily="49" charset="0"/>
-                <a:ea typeface="Arial Unicode MS" pitchFamily="34" charset="-128"/>
-                <a:cs typeface="Courier New" panose="02070309020205020404" pitchFamily="49" charset="0"/>
-              </a:rPr>
-              <a:t>/</a:t>
-            </a:r>
-            <a:r>
-              <a:rPr lang="en-US" sz="900" kern="0" dirty="0" err="1">
-                <a:solidFill>
-                  <a:schemeClr val="bg1"/>
-                </a:solidFill>
-                <a:latin typeface="Arial monospaced for SAP" panose="020B0609020202030204" pitchFamily="49" charset="0"/>
-                <a:ea typeface="Arial Unicode MS" pitchFamily="34" charset="-128"/>
-                <a:cs typeface="Courier New" panose="02070309020205020404" pitchFamily="49" charset="0"/>
-              </a:rPr>
-              <a:t>rpi-busybox-httpd</a:t>
-            </a:r>
-            <a:r>
-              <a:rPr lang="en-US" sz="900" kern="0" dirty="0">
-                <a:solidFill>
-                  <a:schemeClr val="bg1"/>
-                </a:solidFill>
-                <a:latin typeface="Arial monospaced for SAP" panose="020B0609020202030204" pitchFamily="49" charset="0"/>
-                <a:ea typeface="Arial Unicode MS" pitchFamily="34" charset="-128"/>
-                <a:cs typeface="Courier New" panose="02070309020205020404" pitchFamily="49" charset="0"/>
-              </a:rPr>
-              <a:t>   Raspberry Pi compatible Docker Image with ...   39                   </a:t>
-            </a:r>
-          </a:p>
-          <a:p>
-            <a:pPr defTabSz="914400" fontAlgn="base">
-              <a:spcAft>
-                <a:spcPct val="0"/>
-              </a:spcAft>
-              <a:buClr>
-                <a:srgbClr val="F0AB00"/>
-              </a:buClr>
-              <a:buSzPct val="80000"/>
-            </a:pPr>
-            <a:r>
-              <a:rPr lang="en-US" sz="900" kern="0" dirty="0">
-                <a:solidFill>
-                  <a:schemeClr val="bg1"/>
-                </a:solidFill>
-                <a:latin typeface="Arial monospaced for SAP" panose="020B0609020202030204" pitchFamily="49" charset="0"/>
-                <a:ea typeface="Arial Unicode MS" pitchFamily="34" charset="-128"/>
-                <a:cs typeface="Courier New" panose="02070309020205020404" pitchFamily="49" charset="0"/>
-              </a:rPr>
-              <a:t>radial/</a:t>
-            </a:r>
-            <a:r>
-              <a:rPr lang="en-US" sz="900" kern="0" dirty="0" err="1">
-                <a:solidFill>
-                  <a:schemeClr val="bg1"/>
-                </a:solidFill>
-                <a:latin typeface="Arial monospaced for SAP" panose="020B0609020202030204" pitchFamily="49" charset="0"/>
-                <a:ea typeface="Arial Unicode MS" pitchFamily="34" charset="-128"/>
-                <a:cs typeface="Courier New" panose="02070309020205020404" pitchFamily="49" charset="0"/>
-              </a:rPr>
-              <a:t>busyboxplus</a:t>
-            </a:r>
-            <a:r>
-              <a:rPr lang="en-US" sz="900" kern="0" dirty="0">
-                <a:solidFill>
-                  <a:schemeClr val="bg1"/>
-                </a:solidFill>
-                <a:latin typeface="Arial monospaced for SAP" panose="020B0609020202030204" pitchFamily="49" charset="0"/>
-                <a:ea typeface="Arial Unicode MS" pitchFamily="34" charset="-128"/>
-                <a:cs typeface="Courier New" panose="02070309020205020404" pitchFamily="49" charset="0"/>
-              </a:rPr>
-              <a:t>          Full-chain, Internet enabled, </a:t>
-            </a:r>
-            <a:r>
-              <a:rPr lang="en-US" sz="900" kern="0" dirty="0" err="1">
-                <a:solidFill>
-                  <a:schemeClr val="bg1"/>
-                </a:solidFill>
-                <a:latin typeface="Arial monospaced for SAP" panose="020B0609020202030204" pitchFamily="49" charset="0"/>
-                <a:ea typeface="Arial Unicode MS" pitchFamily="34" charset="-128"/>
-                <a:cs typeface="Courier New" panose="02070309020205020404" pitchFamily="49" charset="0"/>
-              </a:rPr>
-              <a:t>busybox</a:t>
-            </a:r>
-            <a:r>
-              <a:rPr lang="en-US" sz="900" kern="0" dirty="0">
-                <a:solidFill>
-                  <a:schemeClr val="bg1"/>
-                </a:solidFill>
-                <a:latin typeface="Arial monospaced for SAP" panose="020B0609020202030204" pitchFamily="49" charset="0"/>
-                <a:ea typeface="Arial Unicode MS" pitchFamily="34" charset="-128"/>
-                <a:cs typeface="Courier New" panose="02070309020205020404" pitchFamily="49" charset="0"/>
-              </a:rPr>
-              <a:t> made...   17                   [OK]</a:t>
-            </a:r>
-          </a:p>
-          <a:p>
-            <a:pPr defTabSz="914400" fontAlgn="base">
-              <a:spcAft>
-                <a:spcPct val="0"/>
-              </a:spcAft>
-              <a:buClr>
-                <a:srgbClr val="F0AB00"/>
-              </a:buClr>
-              <a:buSzPct val="80000"/>
-            </a:pPr>
-            <a:r>
-              <a:rPr lang="en-US" sz="900" kern="0" dirty="0" err="1">
-                <a:solidFill>
-                  <a:schemeClr val="bg1"/>
-                </a:solidFill>
-                <a:latin typeface="Arial monospaced for SAP" panose="020B0609020202030204" pitchFamily="49" charset="0"/>
-                <a:ea typeface="Arial Unicode MS" pitchFamily="34" charset="-128"/>
-                <a:cs typeface="Courier New" panose="02070309020205020404" pitchFamily="49" charset="0"/>
-              </a:rPr>
-              <a:t>hypriot</a:t>
-            </a:r>
-            <a:r>
-              <a:rPr lang="en-US" sz="900" kern="0" dirty="0">
-                <a:solidFill>
-                  <a:schemeClr val="bg1"/>
-                </a:solidFill>
-                <a:latin typeface="Arial monospaced for SAP" panose="020B0609020202030204" pitchFamily="49" charset="0"/>
-                <a:ea typeface="Arial Unicode MS" pitchFamily="34" charset="-128"/>
-                <a:cs typeface="Courier New" panose="02070309020205020404" pitchFamily="49" charset="0"/>
-              </a:rPr>
-              <a:t>/</a:t>
-            </a:r>
-            <a:r>
-              <a:rPr lang="en-US" sz="900" kern="0" dirty="0" err="1">
-                <a:solidFill>
-                  <a:schemeClr val="bg1"/>
-                </a:solidFill>
-                <a:latin typeface="Arial monospaced for SAP" panose="020B0609020202030204" pitchFamily="49" charset="0"/>
-                <a:ea typeface="Arial Unicode MS" pitchFamily="34" charset="-128"/>
-                <a:cs typeface="Courier New" panose="02070309020205020404" pitchFamily="49" charset="0"/>
-              </a:rPr>
-              <a:t>armhf-busybox</a:t>
-            </a:r>
-            <a:r>
-              <a:rPr lang="en-US" sz="900" kern="0" dirty="0">
-                <a:solidFill>
-                  <a:schemeClr val="bg1"/>
-                </a:solidFill>
-                <a:latin typeface="Arial monospaced for SAP" panose="020B0609020202030204" pitchFamily="49" charset="0"/>
-                <a:ea typeface="Arial Unicode MS" pitchFamily="34" charset="-128"/>
-                <a:cs typeface="Courier New" panose="02070309020205020404" pitchFamily="49" charset="0"/>
-              </a:rPr>
-              <a:t>       </a:t>
-            </a:r>
-            <a:r>
-              <a:rPr lang="en-US" sz="900" kern="0" dirty="0" err="1">
-                <a:solidFill>
-                  <a:schemeClr val="bg1"/>
-                </a:solidFill>
-                <a:latin typeface="Arial monospaced for SAP" panose="020B0609020202030204" pitchFamily="49" charset="0"/>
-                <a:ea typeface="Arial Unicode MS" pitchFamily="34" charset="-128"/>
-                <a:cs typeface="Courier New" panose="02070309020205020404" pitchFamily="49" charset="0"/>
-              </a:rPr>
-              <a:t>Busybox</a:t>
-            </a:r>
-            <a:r>
-              <a:rPr lang="en-US" sz="900" kern="0" dirty="0">
-                <a:solidFill>
-                  <a:schemeClr val="bg1"/>
-                </a:solidFill>
-                <a:latin typeface="Arial monospaced for SAP" panose="020B0609020202030204" pitchFamily="49" charset="0"/>
-                <a:ea typeface="Arial Unicode MS" pitchFamily="34" charset="-128"/>
-                <a:cs typeface="Courier New" panose="02070309020205020404" pitchFamily="49" charset="0"/>
-              </a:rPr>
-              <a:t> base image for ARM.                     8                    </a:t>
-            </a:r>
-          </a:p>
-          <a:p>
-            <a:pPr defTabSz="914400" fontAlgn="base">
-              <a:spcAft>
-                <a:spcPct val="0"/>
-              </a:spcAft>
-              <a:buClr>
-                <a:srgbClr val="F0AB00"/>
-              </a:buClr>
-              <a:buSzPct val="80000"/>
-            </a:pPr>
-            <a:r>
-              <a:rPr lang="en-US" sz="900" kern="0" dirty="0">
-                <a:solidFill>
-                  <a:schemeClr val="bg1"/>
-                </a:solidFill>
-                <a:latin typeface="Arial monospaced for SAP" panose="020B0609020202030204" pitchFamily="49" charset="0"/>
-                <a:ea typeface="Arial Unicode MS" pitchFamily="34" charset="-128"/>
-                <a:cs typeface="Courier New" panose="02070309020205020404" pitchFamily="49" charset="0"/>
-              </a:rPr>
-              <a:t>...</a:t>
+              <a:t>   docker push my-registry.com/busybox:0.1 </a:t>
             </a:r>
           </a:p>
         </p:txBody>
       </p:sp>
-      <p:sp>
-        <p:nvSpPr>
-          <p:cNvPr id="2" name="Rectangle 1">
+      <p:cxnSp>
+        <p:nvCxnSpPr>
+          <p:cNvPr id="19" name="Connector: Elbow 18">
             <a:extLst>
               <a:ext uri="{FF2B5EF4-FFF2-40B4-BE49-F238E27FC236}">
-                <a16:creationId xmlns:a16="http://schemas.microsoft.com/office/drawing/2014/main" id="{AE5DF3FF-9C48-4E71-B3A2-F3988FAA9716}"/>
+                <a16:creationId xmlns:a16="http://schemas.microsoft.com/office/drawing/2014/main" id="{BB441E8B-238D-4D38-A3D6-CC9B8E6912F9}"/>
               </a:ext>
             </a:extLst>
           </p:cNvPr>
-          <p:cNvSpPr/>
+          <p:cNvCxnSpPr>
+            <a:cxnSpLocks/>
+            <a:stCxn id="6" idx="3"/>
+            <a:endCxn id="14" idx="0"/>
+          </p:cNvCxnSpPr>
           <p:nvPr/>
-        </p:nvSpPr>
+        </p:nvCxnSpPr>
         <p:spPr>
           <a:xfrm>
-            <a:off x="5702451" y="5211263"/>
-            <a:ext cx="516488" cy="415498"/>
+            <a:off x="3599931" y="4392624"/>
+            <a:ext cx="2516507" cy="559093"/>
           </a:xfrm>
-          <a:prstGeom prst="rect">
+          <a:prstGeom prst="bentConnector2">
             <a:avLst/>
           </a:prstGeom>
+          <a:ln w="19050">
+            <a:solidFill>
+              <a:srgbClr val="FF0000"/>
+            </a:solidFill>
+            <a:headEnd type="none" w="med" len="med"/>
+            <a:tailEnd type="triangle" w="lg" len="lg"/>
+          </a:ln>
         </p:spPr>
-        <p:txBody>
-          <a:bodyPr wrap="none">
-            <a:spAutoFit/>
-          </a:bodyPr>
-          <a:lstStyle/>
-          <a:p>
-            <a:r>
-              <a:rPr lang="en-US" dirty="0"/>
-              <a:t>👍</a:t>
-            </a:r>
-          </a:p>
-        </p:txBody>
-      </p:sp>
+        <p:style>
+          <a:lnRef idx="1">
+            <a:schemeClr val="accent1"/>
+          </a:lnRef>
+          <a:fillRef idx="0">
+            <a:schemeClr val="accent1"/>
+          </a:fillRef>
+          <a:effectRef idx="0">
+            <a:schemeClr val="accent1"/>
+          </a:effectRef>
+          <a:fontRef idx="minor">
+            <a:schemeClr val="tx1"/>
+          </a:fontRef>
+        </p:style>
+      </p:cxnSp>
+      <p:cxnSp>
+        <p:nvCxnSpPr>
+          <p:cNvPr id="21" name="Connector: Elbow 20">
+            <a:extLst>
+              <a:ext uri="{FF2B5EF4-FFF2-40B4-BE49-F238E27FC236}">
+                <a16:creationId xmlns:a16="http://schemas.microsoft.com/office/drawing/2014/main" id="{E2D0B026-20B9-4D2E-84A0-E36E66E0579F}"/>
+              </a:ext>
+            </a:extLst>
+          </p:cNvPr>
+          <p:cNvCxnSpPr>
+            <a:cxnSpLocks/>
+            <a:stCxn id="8" idx="3"/>
+          </p:cNvCxnSpPr>
+          <p:nvPr/>
+        </p:nvCxnSpPr>
+        <p:spPr>
+          <a:xfrm>
+            <a:off x="5522188" y="3573423"/>
+            <a:ext cx="2067547" cy="1378294"/>
+          </a:xfrm>
+          <a:prstGeom prst="bentConnector3">
+            <a:avLst>
+              <a:gd name="adj1" fmla="val 100397"/>
+            </a:avLst>
+          </a:prstGeom>
+          <a:ln w="19050">
+            <a:solidFill>
+              <a:srgbClr val="FF0000"/>
+            </a:solidFill>
+            <a:headEnd type="none" w="med" len="med"/>
+            <a:tailEnd type="triangle" w="lg" len="lg"/>
+          </a:ln>
+        </p:spPr>
+        <p:style>
+          <a:lnRef idx="1">
+            <a:schemeClr val="accent1"/>
+          </a:lnRef>
+          <a:fillRef idx="0">
+            <a:schemeClr val="accent1"/>
+          </a:fillRef>
+          <a:effectRef idx="0">
+            <a:schemeClr val="accent1"/>
+          </a:effectRef>
+          <a:fontRef idx="minor">
+            <a:schemeClr val="tx1"/>
+          </a:fontRef>
+        </p:style>
+      </p:cxnSp>
+      <p:cxnSp>
+        <p:nvCxnSpPr>
+          <p:cNvPr id="24" name="Connector: Elbow 23">
+            <a:extLst>
+              <a:ext uri="{FF2B5EF4-FFF2-40B4-BE49-F238E27FC236}">
+                <a16:creationId xmlns:a16="http://schemas.microsoft.com/office/drawing/2014/main" id="{A491D17F-8AF5-4062-BD9A-5F48D24231CB}"/>
+              </a:ext>
+            </a:extLst>
+          </p:cNvPr>
+          <p:cNvCxnSpPr>
+            <a:cxnSpLocks/>
+            <a:stCxn id="10" idx="2"/>
+          </p:cNvCxnSpPr>
+          <p:nvPr/>
+        </p:nvCxnSpPr>
+        <p:spPr>
+          <a:xfrm rot="5400000">
+            <a:off x="7887899" y="4133801"/>
+            <a:ext cx="921094" cy="308011"/>
+          </a:xfrm>
+          <a:prstGeom prst="bentConnector3">
+            <a:avLst>
+              <a:gd name="adj1" fmla="val 50000"/>
+            </a:avLst>
+          </a:prstGeom>
+          <a:ln w="19050">
+            <a:solidFill>
+              <a:srgbClr val="FF0000"/>
+            </a:solidFill>
+            <a:headEnd type="none" w="med" len="med"/>
+            <a:tailEnd type="triangle" w="lg" len="lg"/>
+          </a:ln>
+        </p:spPr>
+        <p:style>
+          <a:lnRef idx="1">
+            <a:schemeClr val="accent1"/>
+          </a:lnRef>
+          <a:fillRef idx="0">
+            <a:schemeClr val="accent1"/>
+          </a:fillRef>
+          <a:effectRef idx="0">
+            <a:schemeClr val="accent1"/>
+          </a:effectRef>
+          <a:fontRef idx="minor">
+            <a:schemeClr val="tx1"/>
+          </a:fontRef>
+        </p:style>
+      </p:cxnSp>
     </p:spTree>
     <p:extLst>
       <p:ext uri="{BB962C8B-B14F-4D97-AF65-F5344CB8AC3E}">
-        <p14:creationId xmlns:p14="http://schemas.microsoft.com/office/powerpoint/2010/main" val="2960905310"/>
+        <p14:creationId xmlns:p14="http://schemas.microsoft.com/office/powerpoint/2010/main" val="3770947068"/>
       </p:ext>
     </p:extLst>
   </p:cSld>
   <p:clrMapOvr>
     <a:masterClrMapping/>
   </p:clrMapOvr>
-</p:sld>
-</file>
-
-<file path=ppt/slides/slide8.xml><?xml version="1.0" encoding="utf-8"?>
-<p:sld xmlns:a="http://schemas.openxmlformats.org/drawingml/2006/main" xmlns:r="http://schemas.openxmlformats.org/officeDocument/2006/relationships" xmlns:p="http://schemas.openxmlformats.org/presentationml/2006/main" show="0">
-  <p:cSld>
-    <p:spTree>
-      <p:nvGrpSpPr>
-        <p:cNvPr id="1" name=""/>
-        <p:cNvGrpSpPr/>
-        <p:nvPr/>
-      </p:nvGrpSpPr>
-      <p:grpSpPr>
-        <a:xfrm>
-          <a:off x="0" y="0"/>
-          <a:ext cx="0" cy="0"/>
-          <a:chOff x="0" y="0"/>
-          <a:chExt cx="0" cy="0"/>
-        </a:xfrm>
-      </p:grpSpPr>
-    </p:spTree>
-  </p:cSld>
-  <p:clrMapOvr>
-    <a:masterClrMapping/>
-  </p:clrMapOvr>
-  <p:transition spd="med"/>
 </p:sld>
 </file>
 

</xml_diff>

<commit_message>
state what tag "latest" really means.
</commit_message>
<xml_diff>
--- a/docker/04_Images.pptx
+++ b/docker/04_Images.pptx
@@ -198,6 +198,43 @@
 </p:presentation>
 </file>
 
+<file path=ppt/commentAuthors.xml><?xml version="1.0" encoding="utf-8"?>
+<p:cmAuthorLst xmlns:a="http://schemas.openxmlformats.org/drawingml/2006/main" xmlns:r="http://schemas.openxmlformats.org/officeDocument/2006/relationships" xmlns:p="http://schemas.openxmlformats.org/presentationml/2006/main">
+  <p:cmAuthor id="1" name="Partsch, Holger" initials="PH" lastIdx="2" clrIdx="0">
+    <p:extLst>
+      <p:ext uri="{19B8F6BF-5375-455C-9EA6-DF929625EA0E}">
+        <p15:presenceInfo xmlns:p15="http://schemas.microsoft.com/office/powerpoint/2012/main" userId="S-1-5-21-74642-3284969411-2123768488-120253" providerId="AD"/>
+      </p:ext>
+    </p:extLst>
+  </p:cmAuthor>
+</p:cmAuthorLst>
+</file>
+
+<file path=ppt/comments/comment1.xml><?xml version="1.0" encoding="utf-8"?>
+<p:cmLst xmlns:a="http://schemas.openxmlformats.org/drawingml/2006/main" xmlns:r="http://schemas.openxmlformats.org/officeDocument/2006/relationships" xmlns:p="http://schemas.openxmlformats.org/presentationml/2006/main">
+  <p:cm authorId="1" dt="2018-08-06T14:19:57.629" idx="1">
+    <p:pos x="6654" y="1268"/>
+    <p:text>Busybox is a base image. Why do you have two base images here?</p:text>
+    <p:extLst>
+      <p:ext uri="{C676402C-5697-4E1C-873F-D02D1690AC5C}">
+        <p15:threadingInfo xmlns:p15="http://schemas.microsoft.com/office/powerpoint/2012/main" timeZoneBias="-120"/>
+      </p:ext>
+    </p:extLst>
+  </p:cm>
+  <p:cm authorId="1" dt="2018-08-06T14:20:27.552" idx="2">
+    <p:pos x="6654" y="1404"/>
+    <p:text>Removing busybox</p:text>
+    <p:extLst>
+      <p:ext uri="{C676402C-5697-4E1C-873F-D02D1690AC5C}">
+        <p15:threadingInfo xmlns:p15="http://schemas.microsoft.com/office/powerpoint/2012/main" timeZoneBias="-120">
+          <p15:parentCm authorId="1" idx="1"/>
+        </p15:threadingInfo>
+      </p:ext>
+    </p:extLst>
+  </p:cm>
+</p:cmLst>
+</file>
+
 <file path=ppt/handoutMasters/handoutMaster1.xml><?xml version="1.0" encoding="utf-8"?>
 <p:handoutMaster xmlns:a="http://schemas.openxmlformats.org/drawingml/2006/main" xmlns:r="http://schemas.openxmlformats.org/officeDocument/2006/relationships" xmlns:p="http://schemas.openxmlformats.org/presentationml/2006/main">
   <p:cSld>
@@ -570,22 +607,7 @@
           <a:bodyPr/>
           <a:lstStyle/>
           <a:p>
-            <a:r>
-              <a:rPr lang="en-US" dirty="0"/>
-              <a:t>Images were discussed earlier in the context of layered file system.</a:t>
-            </a:r>
-          </a:p>
-          <a:p>
-            <a:endParaRPr lang="en-US" dirty="0"/>
-          </a:p>
-          <a:p>
-            <a:r>
-              <a:rPr lang="en-US" dirty="0"/>
-              <a:t>You can create a new image by starting from another image (or empty 'scratch') and adding 'things'. These 'things' are usually files – which add another layer in the file system hierarchy – or environment settings. Installing software means adding another layer.</a:t>
-            </a:r>
-          </a:p>
-          <a:p>
-            <a:endParaRPr lang="en-US" dirty="0"/>
+            <a:endParaRPr lang="de-DE" dirty="0"/>
           </a:p>
         </p:txBody>
       </p:sp>
@@ -607,7 +629,7 @@
             <a:fld id="{7D8C2C35-2B8A-446E-BEC0-FD36716C29AC}" type="slidenum">
               <a:rPr lang="de-DE" smtClean="0"/>
               <a:pPr/>
-              <a:t>3</a:t>
+              <a:t>2</a:t>
             </a:fld>
             <a:endParaRPr lang="de-DE" dirty="0"/>
           </a:p>
@@ -616,7 +638,7 @@
     </p:spTree>
     <p:extLst>
       <p:ext uri="{BB962C8B-B14F-4D97-AF65-F5344CB8AC3E}">
-        <p14:creationId xmlns:p14="http://schemas.microsoft.com/office/powerpoint/2010/main" val="4105859550"/>
+        <p14:creationId xmlns:p14="http://schemas.microsoft.com/office/powerpoint/2010/main" val="1331785394"/>
       </p:ext>
     </p:extLst>
   </p:cSld>
@@ -627,6 +649,91 @@
 </file>
 
 <file path=ppt/notesSlides/notesSlide10.xml><?xml version="1.0" encoding="utf-8"?>
+<p:notes xmlns:a="http://schemas.openxmlformats.org/drawingml/2006/main" xmlns:r="http://schemas.openxmlformats.org/officeDocument/2006/relationships" xmlns:p="http://schemas.openxmlformats.org/presentationml/2006/main">
+  <p:cSld>
+    <p:spTree>
+      <p:nvGrpSpPr>
+        <p:cNvPr id="1" name=""/>
+        <p:cNvGrpSpPr/>
+        <p:nvPr/>
+      </p:nvGrpSpPr>
+      <p:grpSpPr>
+        <a:xfrm>
+          <a:off x="0" y="0"/>
+          <a:ext cx="0" cy="0"/>
+          <a:chOff x="0" y="0"/>
+          <a:chExt cx="0" cy="0"/>
+        </a:xfrm>
+      </p:grpSpPr>
+      <p:sp>
+        <p:nvSpPr>
+          <p:cNvPr id="2" name="Slide Image Placeholder 1"/>
+          <p:cNvSpPr>
+            <a:spLocks noGrp="1" noRot="1" noChangeAspect="1"/>
+          </p:cNvSpPr>
+          <p:nvPr>
+            <p:ph type="sldImg"/>
+          </p:nvPr>
+        </p:nvSpPr>
+        <p:spPr/>
+      </p:sp>
+      <p:sp>
+        <p:nvSpPr>
+          <p:cNvPr id="3" name="Notes Placeholder 2"/>
+          <p:cNvSpPr>
+            <a:spLocks noGrp="1"/>
+          </p:cNvSpPr>
+          <p:nvPr>
+            <p:ph type="body" idx="1"/>
+          </p:nvPr>
+        </p:nvSpPr>
+        <p:spPr/>
+        <p:txBody>
+          <a:bodyPr/>
+          <a:lstStyle/>
+          <a:p>
+            <a:endParaRPr lang="en-US" dirty="0"/>
+          </a:p>
+        </p:txBody>
+      </p:sp>
+      <p:sp>
+        <p:nvSpPr>
+          <p:cNvPr id="4" name="Slide Number Placeholder 3"/>
+          <p:cNvSpPr>
+            <a:spLocks noGrp="1"/>
+          </p:cNvSpPr>
+          <p:nvPr>
+            <p:ph type="sldNum" sz="quarter" idx="10"/>
+          </p:nvPr>
+        </p:nvSpPr>
+        <p:spPr/>
+        <p:txBody>
+          <a:bodyPr/>
+          <a:lstStyle/>
+          <a:p>
+            <a:fld id="{7D8C2C35-2B8A-446E-BEC0-FD36716C29AC}" type="slidenum">
+              <a:rPr lang="de-DE" smtClean="0"/>
+              <a:pPr/>
+              <a:t>11</a:t>
+            </a:fld>
+            <a:endParaRPr lang="de-DE" dirty="0"/>
+          </a:p>
+        </p:txBody>
+      </p:sp>
+    </p:spTree>
+    <p:extLst>
+      <p:ext uri="{BB962C8B-B14F-4D97-AF65-F5344CB8AC3E}">
+        <p14:creationId xmlns:p14="http://schemas.microsoft.com/office/powerpoint/2010/main" val="80764537"/>
+      </p:ext>
+    </p:extLst>
+  </p:cSld>
+  <p:clrMapOvr>
+    <a:masterClrMapping/>
+  </p:clrMapOvr>
+</p:notes>
+</file>
+
+<file path=ppt/notesSlides/notesSlide11.xml><?xml version="1.0" encoding="utf-8"?>
 <p:notes xmlns:a="http://schemas.openxmlformats.org/drawingml/2006/main" xmlns:r="http://schemas.openxmlformats.org/officeDocument/2006/relationships" xmlns:p="http://schemas.openxmlformats.org/presentationml/2006/main">
   <p:cSld>
     <p:spTree>
@@ -764,50 +871,20 @@
           <a:p>
             <a:r>
               <a:rPr lang="en-US" dirty="0"/>
-              <a:t>You can also make manual changes to images by:</a:t>
-            </a:r>
-          </a:p>
-          <a:p>
-            <a:pPr marL="342900" indent="-342900">
-              <a:buAutoNum type="arabicPeriod"/>
-            </a:pPr>
+              <a:t>Images were discussed earlier in the context of layered file system.</a:t>
+            </a:r>
+          </a:p>
+          <a:p>
+            <a:endParaRPr lang="en-US" dirty="0"/>
+          </a:p>
+          <a:p>
             <a:r>
               <a:rPr lang="en-US" dirty="0"/>
-              <a:t>Start a container from an image</a:t>
-            </a:r>
-          </a:p>
-          <a:p>
-            <a:pPr marL="342900" indent="-342900">
-              <a:buAutoNum type="arabicPeriod"/>
-            </a:pPr>
-            <a:r>
-              <a:rPr lang="en-US" dirty="0"/>
-              <a:t>Make manual changes, e.g. install software, change config / settings (in files), … that manifest in the file system (persisted).</a:t>
-            </a:r>
-          </a:p>
-          <a:p>
-            <a:pPr marL="342900" indent="-342900">
-              <a:buAutoNum type="arabicPeriod"/>
-            </a:pPr>
-            <a:r>
-              <a:rPr lang="en-US" dirty="0"/>
-              <a:t>'Commit' the changes by writing a new image that contains the current state, i.e. the changes relative to the starting image.</a:t>
-            </a:r>
-          </a:p>
-          <a:p>
-            <a:pPr marL="342900" indent="-342900">
-              <a:buAutoNum type="arabicPeriod"/>
-            </a:pPr>
+              <a:t>You can create a new image by starting from another image (or empty 'scratch') and adding 'things'. These 'things' are usually files – which add another layer in the file system hierarchy – or environment settings. Installing software means adding another layer.</a:t>
+            </a:r>
+          </a:p>
+          <a:p>
             <a:endParaRPr lang="en-US" dirty="0"/>
-          </a:p>
-          <a:p>
-            <a:pPr marL="0" indent="0">
-              <a:buNone/>
-            </a:pPr>
-            <a:r>
-              <a:rPr lang="en-US" dirty="0"/>
-              <a:t>Drawback: Manual changes leave no trace / history / version control. Not repeatable.</a:t>
-            </a:r>
           </a:p>
         </p:txBody>
       </p:sp>
@@ -829,7 +906,7 @@
             <a:fld id="{7D8C2C35-2B8A-446E-BEC0-FD36716C29AC}" type="slidenum">
               <a:rPr lang="de-DE" smtClean="0"/>
               <a:pPr/>
-              <a:t>4</a:t>
+              <a:t>3</a:t>
             </a:fld>
             <a:endParaRPr lang="de-DE" dirty="0"/>
           </a:p>
@@ -838,7 +915,7 @@
     </p:spTree>
     <p:extLst>
       <p:ext uri="{BB962C8B-B14F-4D97-AF65-F5344CB8AC3E}">
-        <p14:creationId xmlns:p14="http://schemas.microsoft.com/office/powerpoint/2010/main" val="2553530107"/>
+        <p14:creationId xmlns:p14="http://schemas.microsoft.com/office/powerpoint/2010/main" val="4105859550"/>
       </p:ext>
     </p:extLst>
   </p:cSld>
@@ -892,7 +969,52 @@
           <a:bodyPr/>
           <a:lstStyle/>
           <a:p>
-            <a:endParaRPr lang="de-DE" dirty="0"/>
+            <a:r>
+              <a:rPr lang="en-US" dirty="0"/>
+              <a:t>You can also make manual changes to images by:</a:t>
+            </a:r>
+          </a:p>
+          <a:p>
+            <a:pPr marL="342900" indent="-342900">
+              <a:buAutoNum type="arabicPeriod"/>
+            </a:pPr>
+            <a:r>
+              <a:rPr lang="en-US" dirty="0"/>
+              <a:t>Start a container from an image</a:t>
+            </a:r>
+          </a:p>
+          <a:p>
+            <a:pPr marL="342900" indent="-342900">
+              <a:buAutoNum type="arabicPeriod"/>
+            </a:pPr>
+            <a:r>
+              <a:rPr lang="en-US" dirty="0"/>
+              <a:t>Make manual changes, e.g. install software, change config / settings (in files), … that manifest in the file system (persisted).</a:t>
+            </a:r>
+          </a:p>
+          <a:p>
+            <a:pPr marL="342900" indent="-342900">
+              <a:buAutoNum type="arabicPeriod"/>
+            </a:pPr>
+            <a:r>
+              <a:rPr lang="en-US" dirty="0"/>
+              <a:t>'Commit' the changes by writing a new image that contains the current state, i.e. the changes relative to the starting image.</a:t>
+            </a:r>
+          </a:p>
+          <a:p>
+            <a:pPr marL="342900" indent="-342900">
+              <a:buAutoNum type="arabicPeriod"/>
+            </a:pPr>
+            <a:endParaRPr lang="en-US" dirty="0"/>
+          </a:p>
+          <a:p>
+            <a:pPr marL="0" indent="0">
+              <a:buNone/>
+            </a:pPr>
+            <a:r>
+              <a:rPr lang="en-US" dirty="0"/>
+              <a:t>Drawback: Manual changes leave no trace / history / version control. Not repeatable. Also: Since the container is in running state, it is not guaranteed that you commit a consistent state.</a:t>
+            </a:r>
           </a:p>
         </p:txBody>
       </p:sp>
@@ -914,7 +1036,7 @@
             <a:fld id="{7D8C2C35-2B8A-446E-BEC0-FD36716C29AC}" type="slidenum">
               <a:rPr lang="de-DE" smtClean="0"/>
               <a:pPr/>
-              <a:t>5</a:t>
+              <a:t>4</a:t>
             </a:fld>
             <a:endParaRPr lang="de-DE" dirty="0"/>
           </a:p>
@@ -923,7 +1045,7 @@
     </p:spTree>
     <p:extLst>
       <p:ext uri="{BB962C8B-B14F-4D97-AF65-F5344CB8AC3E}">
-        <p14:creationId xmlns:p14="http://schemas.microsoft.com/office/powerpoint/2010/main" val="1555985175"/>
+        <p14:creationId xmlns:p14="http://schemas.microsoft.com/office/powerpoint/2010/main" val="2553530107"/>
       </p:ext>
     </p:extLst>
   </p:cSld>
@@ -974,236 +1096,10 @@
         </p:nvSpPr>
         <p:spPr/>
         <p:txBody>
-          <a:bodyPr>
-            <a:normAutofit/>
-          </a:bodyPr>
+          <a:bodyPr/>
           <a:lstStyle/>
           <a:p>
-            <a:pPr marL="0" indent="0">
-              <a:buFontTx/>
-              <a:buNone/>
-            </a:pPr>
-            <a:r>
-              <a:rPr lang="en-US" b="0" dirty="0"/>
-              <a:t>Let’s take a closer look at the images.</a:t>
-            </a:r>
-          </a:p>
-          <a:p>
-            <a:pPr marL="0" indent="0">
-              <a:buFontTx/>
-              <a:buNone/>
-            </a:pPr>
-            <a:endParaRPr lang="en-US" b="0" dirty="0"/>
-          </a:p>
-          <a:p>
-            <a:pPr marL="0" indent="0">
-              <a:buFontTx/>
-              <a:buNone/>
-            </a:pPr>
-            <a:r>
-              <a:rPr lang="en-US" b="0" dirty="0"/>
-              <a:t>From the docker cli, you have several ways of accessing them:</a:t>
-            </a:r>
-          </a:p>
-          <a:p>
-            <a:pPr marL="285750" indent="-285750">
-              <a:buFontTx/>
-              <a:buChar char="-"/>
-            </a:pPr>
-            <a:r>
-              <a:rPr lang="en-US" b="0" dirty="0"/>
-              <a:t>docker image list </a:t>
-            </a:r>
-            <a:r>
-              <a:rPr lang="en-US" b="0" dirty="0">
-                <a:sym typeface="Wingdings" panose="05000000000000000000" pitchFamily="2" charset="2"/>
-              </a:rPr>
-              <a:t> gives you all downloaded images</a:t>
-            </a:r>
-          </a:p>
-          <a:p>
-            <a:pPr marL="285750" indent="-285750">
-              <a:buFontTx/>
-              <a:buChar char="-"/>
-            </a:pPr>
-            <a:r>
-              <a:rPr lang="en-US" b="0" dirty="0">
-                <a:sym typeface="Wingdings" panose="05000000000000000000" pitchFamily="2" charset="2"/>
-              </a:rPr>
-              <a:t>docker inspect &lt;image&gt;:&lt;tag&gt;  gives you meta info on the image incl. CMD/</a:t>
-            </a:r>
-            <a:r>
-              <a:rPr lang="en-US" b="0" dirty="0" err="1">
-                <a:sym typeface="Wingdings" panose="05000000000000000000" pitchFamily="2" charset="2"/>
-              </a:rPr>
-              <a:t>Entrypoint</a:t>
-            </a:r>
-            <a:r>
-              <a:rPr lang="en-US" b="0" dirty="0">
-                <a:sym typeface="Wingdings" panose="05000000000000000000" pitchFamily="2" charset="2"/>
-              </a:rPr>
-              <a:t>, ports </a:t>
-            </a:r>
-            <a:r>
-              <a:rPr lang="en-US" b="0" dirty="0" err="1">
-                <a:sym typeface="Wingdings" panose="05000000000000000000" pitchFamily="2" charset="2"/>
-              </a:rPr>
-              <a:t>etc</a:t>
-            </a:r>
-            <a:endParaRPr lang="en-US" b="0" dirty="0">
-              <a:sym typeface="Wingdings" panose="05000000000000000000" pitchFamily="2" charset="2"/>
-            </a:endParaRPr>
-          </a:p>
-          <a:p>
-            <a:pPr marL="285750" indent="-285750">
-              <a:buFontTx/>
-              <a:buChar char="-"/>
-            </a:pPr>
-            <a:r>
-              <a:rPr lang="en-US" b="0" dirty="0">
-                <a:sym typeface="Wingdings" panose="05000000000000000000" pitchFamily="2" charset="2"/>
-              </a:rPr>
-              <a:t>docker history &lt;image&gt;:&lt;tag&gt;  gives you the image’s history</a:t>
-            </a:r>
-          </a:p>
-          <a:p>
-            <a:pPr marL="285750" indent="-285750">
-              <a:buFontTx/>
-              <a:buChar char="-"/>
-            </a:pPr>
-            <a:endParaRPr lang="en-US" b="0" dirty="0">
-              <a:sym typeface="Wingdings" panose="05000000000000000000" pitchFamily="2" charset="2"/>
-            </a:endParaRPr>
-          </a:p>
-          <a:p>
-            <a:pPr marL="0" indent="0">
-              <a:buFontTx/>
-              <a:buNone/>
-            </a:pPr>
-            <a:r>
-              <a:rPr lang="en-US" b="0" dirty="0">
-                <a:sym typeface="Wingdings" panose="05000000000000000000" pitchFamily="2" charset="2"/>
-              </a:rPr>
-              <a:t>Show these commands for any available image like </a:t>
-            </a:r>
-            <a:r>
-              <a:rPr lang="en-US" b="0" dirty="0" err="1">
-                <a:sym typeface="Wingdings" panose="05000000000000000000" pitchFamily="2" charset="2"/>
-              </a:rPr>
-              <a:t>nginx</a:t>
-            </a:r>
-            <a:endParaRPr lang="en-US" b="0" dirty="0">
-              <a:sym typeface="Wingdings" panose="05000000000000000000" pitchFamily="2" charset="2"/>
-            </a:endParaRPr>
-          </a:p>
-          <a:p>
-            <a:pPr marL="0" indent="0">
-              <a:buFontTx/>
-              <a:buNone/>
-            </a:pPr>
-            <a:endParaRPr lang="en-US" b="0" dirty="0">
-              <a:sym typeface="Wingdings" panose="05000000000000000000" pitchFamily="2" charset="2"/>
-            </a:endParaRPr>
-          </a:p>
-          <a:p>
-            <a:pPr marL="0" indent="0">
-              <a:buFontTx/>
-              <a:buNone/>
-            </a:pPr>
-            <a:r>
-              <a:rPr lang="en-US" b="0" dirty="0">
-                <a:sym typeface="Wingdings" panose="05000000000000000000" pitchFamily="2" charset="2"/>
-              </a:rPr>
-              <a:t>Next, demo the commit command:</a:t>
-            </a:r>
-          </a:p>
-          <a:p>
-            <a:pPr marL="285750" indent="-285750">
-              <a:buFontTx/>
-              <a:buChar char="-"/>
-            </a:pPr>
-            <a:r>
-              <a:rPr lang="en-US" b="0" dirty="0">
-                <a:sym typeface="Wingdings" panose="05000000000000000000" pitchFamily="2" charset="2"/>
-              </a:rPr>
-              <a:t>docker run -it </a:t>
-            </a:r>
-            <a:r>
-              <a:rPr lang="en-US" b="0" dirty="0" err="1">
-                <a:sym typeface="Wingdings" panose="05000000000000000000" pitchFamily="2" charset="2"/>
-              </a:rPr>
-              <a:t>nginx:mainline</a:t>
-            </a:r>
-            <a:r>
-              <a:rPr lang="en-US" b="0" dirty="0">
-                <a:sym typeface="Wingdings" panose="05000000000000000000" pitchFamily="2" charset="2"/>
-              </a:rPr>
-              <a:t> /bin/bash</a:t>
-            </a:r>
-          </a:p>
-          <a:p>
-            <a:pPr marL="285750" indent="-285750">
-              <a:buFontTx/>
-              <a:buChar char="-"/>
-            </a:pPr>
-            <a:r>
-              <a:rPr lang="en-US" b="0" dirty="0">
-                <a:sym typeface="Wingdings" panose="05000000000000000000" pitchFamily="2" charset="2"/>
-              </a:rPr>
-              <a:t>Create a file &amp; exit</a:t>
-            </a:r>
-          </a:p>
-          <a:p>
-            <a:pPr marL="285750" indent="-285750">
-              <a:buFontTx/>
-              <a:buChar char="-"/>
-            </a:pPr>
-            <a:r>
-              <a:rPr lang="en-US" b="0" dirty="0">
-                <a:sym typeface="Wingdings" panose="05000000000000000000" pitchFamily="2" charset="2"/>
-              </a:rPr>
-              <a:t>run “docker commit &lt;container&gt; &lt;repo-name&gt;:&lt;tag&gt;</a:t>
-            </a:r>
-          </a:p>
-          <a:p>
-            <a:pPr marL="285750" indent="-285750">
-              <a:buFontTx/>
-              <a:buChar char="-"/>
-            </a:pPr>
-            <a:endParaRPr lang="en-US" b="0" dirty="0">
-              <a:sym typeface="Wingdings" panose="05000000000000000000" pitchFamily="2" charset="2"/>
-            </a:endParaRPr>
-          </a:p>
-          <a:p>
-            <a:pPr marL="0" indent="0">
-              <a:buFontTx/>
-              <a:buNone/>
-            </a:pPr>
-            <a:r>
-              <a:rPr lang="en-US" b="0" dirty="0">
-                <a:sym typeface="Wingdings" panose="05000000000000000000" pitchFamily="2" charset="2"/>
-              </a:rPr>
-              <a:t>Now re-run the history </a:t>
-            </a:r>
-            <a:r>
-              <a:rPr lang="en-US" b="0" dirty="0" err="1">
-                <a:sym typeface="Wingdings" panose="05000000000000000000" pitchFamily="2" charset="2"/>
-              </a:rPr>
-              <a:t>cmd</a:t>
-            </a:r>
-            <a:r>
-              <a:rPr lang="en-US" b="0" dirty="0">
-                <a:sym typeface="Wingdings" panose="05000000000000000000" pitchFamily="2" charset="2"/>
-              </a:rPr>
-              <a:t> on your newly created image. Discuss the added layer and the visible information vs. what you did.</a:t>
-            </a:r>
-          </a:p>
-          <a:p>
-            <a:pPr marL="285750" indent="-285750">
-              <a:buFontTx/>
-              <a:buChar char="-"/>
-            </a:pPr>
-            <a:endParaRPr lang="en-US" b="0" dirty="0"/>
+            <a:endParaRPr lang="de-DE" dirty="0"/>
           </a:p>
         </p:txBody>
       </p:sp>
@@ -1225,7 +1121,7 @@
             <a:fld id="{7D8C2C35-2B8A-446E-BEC0-FD36716C29AC}" type="slidenum">
               <a:rPr lang="de-DE" smtClean="0"/>
               <a:pPr/>
-              <a:t>6</a:t>
+              <a:t>5</a:t>
             </a:fld>
             <a:endParaRPr lang="de-DE" dirty="0"/>
           </a:p>
@@ -1234,7 +1130,7 @@
     </p:spTree>
     <p:extLst>
       <p:ext uri="{BB962C8B-B14F-4D97-AF65-F5344CB8AC3E}">
-        <p14:creationId xmlns:p14="http://schemas.microsoft.com/office/powerpoint/2010/main" val="2468237856"/>
+        <p14:creationId xmlns:p14="http://schemas.microsoft.com/office/powerpoint/2010/main" val="1555985175"/>
       </p:ext>
     </p:extLst>
   </p:cSld>
@@ -1285,39 +1181,236 @@
         </p:nvSpPr>
         <p:spPr/>
         <p:txBody>
-          <a:bodyPr/>
+          <a:bodyPr>
+            <a:normAutofit/>
+          </a:bodyPr>
           <a:lstStyle/>
           <a:p>
-            <a:r>
-              <a:rPr lang="en-US" dirty="0"/>
-              <a:t>Images are kept in 'docker registries'. The docker runtime will look in the configured registry when it needs to load an image (e.g. for a 'docker run'). When it doesn't have the image already in its local cache, it will load it from the registry. </a:t>
-            </a:r>
-          </a:p>
-          <a:p>
-            <a:endParaRPr lang="en-US" dirty="0"/>
-          </a:p>
-          <a:p>
-            <a:r>
-              <a:rPr lang="en-US" dirty="0"/>
-              <a:t>The default registry is the docker hub: hub.docker.com. You can also have local registries, e.g. to have tight control of what goes in. </a:t>
-            </a:r>
-          </a:p>
-          <a:p>
-            <a:endParaRPr lang="en-US" dirty="0"/>
-          </a:p>
-          <a:p>
-            <a:r>
-              <a:rPr lang="en-US" dirty="0"/>
-              <a:t>Registries can have a private section which requires a login. With “docker login” you can store your credentials locally (~/.docker/</a:t>
-            </a:r>
-            <a:r>
-              <a:rPr lang="en-US" dirty="0" err="1"/>
-              <a:t>config.json</a:t>
-            </a:r>
-            <a:r>
-              <a:rPr lang="en-US" dirty="0"/>
-              <a:t>) and authorize your requests.</a:t>
-            </a:r>
+            <a:pPr marL="0" indent="0">
+              <a:buFontTx/>
+              <a:buNone/>
+            </a:pPr>
+            <a:r>
+              <a:rPr lang="en-US" b="0" dirty="0"/>
+              <a:t>Let’s take a closer look at the images.</a:t>
+            </a:r>
+          </a:p>
+          <a:p>
+            <a:pPr marL="0" indent="0">
+              <a:buFontTx/>
+              <a:buNone/>
+            </a:pPr>
+            <a:endParaRPr lang="en-US" b="0" dirty="0"/>
+          </a:p>
+          <a:p>
+            <a:pPr marL="0" indent="0">
+              <a:buFontTx/>
+              <a:buNone/>
+            </a:pPr>
+            <a:r>
+              <a:rPr lang="en-US" b="0" dirty="0"/>
+              <a:t>From the docker cli, you have several ways of accessing them:</a:t>
+            </a:r>
+          </a:p>
+          <a:p>
+            <a:pPr marL="285750" indent="-285750">
+              <a:buFontTx/>
+              <a:buChar char="-"/>
+            </a:pPr>
+            <a:r>
+              <a:rPr lang="en-US" b="0" dirty="0"/>
+              <a:t>docker image list </a:t>
+            </a:r>
+            <a:r>
+              <a:rPr lang="en-US" b="0" dirty="0">
+                <a:sym typeface="Wingdings" panose="05000000000000000000" pitchFamily="2" charset="2"/>
+              </a:rPr>
+              <a:t> gives you all downloaded images</a:t>
+            </a:r>
+          </a:p>
+          <a:p>
+            <a:pPr marL="285750" indent="-285750">
+              <a:buFontTx/>
+              <a:buChar char="-"/>
+            </a:pPr>
+            <a:r>
+              <a:rPr lang="en-US" b="0" dirty="0">
+                <a:sym typeface="Wingdings" panose="05000000000000000000" pitchFamily="2" charset="2"/>
+              </a:rPr>
+              <a:t>docker inspect &lt;image&gt;:&lt;tag&gt;  gives you meta info on the image incl. CMD/</a:t>
+            </a:r>
+            <a:r>
+              <a:rPr lang="en-US" b="0" dirty="0" err="1">
+                <a:sym typeface="Wingdings" panose="05000000000000000000" pitchFamily="2" charset="2"/>
+              </a:rPr>
+              <a:t>Entrypoint</a:t>
+            </a:r>
+            <a:r>
+              <a:rPr lang="en-US" b="0" dirty="0">
+                <a:sym typeface="Wingdings" panose="05000000000000000000" pitchFamily="2" charset="2"/>
+              </a:rPr>
+              <a:t>, ports </a:t>
+            </a:r>
+            <a:r>
+              <a:rPr lang="en-US" b="0" dirty="0" err="1">
+                <a:sym typeface="Wingdings" panose="05000000000000000000" pitchFamily="2" charset="2"/>
+              </a:rPr>
+              <a:t>etc</a:t>
+            </a:r>
+            <a:endParaRPr lang="en-US" b="0" dirty="0">
+              <a:sym typeface="Wingdings" panose="05000000000000000000" pitchFamily="2" charset="2"/>
+            </a:endParaRPr>
+          </a:p>
+          <a:p>
+            <a:pPr marL="285750" indent="-285750">
+              <a:buFontTx/>
+              <a:buChar char="-"/>
+            </a:pPr>
+            <a:r>
+              <a:rPr lang="en-US" b="0" dirty="0">
+                <a:sym typeface="Wingdings" panose="05000000000000000000" pitchFamily="2" charset="2"/>
+              </a:rPr>
+              <a:t>docker history &lt;image&gt;:&lt;tag&gt;  gives you the image’s history</a:t>
+            </a:r>
+          </a:p>
+          <a:p>
+            <a:pPr marL="285750" indent="-285750">
+              <a:buFontTx/>
+              <a:buChar char="-"/>
+            </a:pPr>
+            <a:endParaRPr lang="en-US" b="0" dirty="0">
+              <a:sym typeface="Wingdings" panose="05000000000000000000" pitchFamily="2" charset="2"/>
+            </a:endParaRPr>
+          </a:p>
+          <a:p>
+            <a:pPr marL="0" indent="0">
+              <a:buFontTx/>
+              <a:buNone/>
+            </a:pPr>
+            <a:r>
+              <a:rPr lang="en-US" b="0" dirty="0">
+                <a:sym typeface="Wingdings" panose="05000000000000000000" pitchFamily="2" charset="2"/>
+              </a:rPr>
+              <a:t>Show these commands for any available image like </a:t>
+            </a:r>
+            <a:r>
+              <a:rPr lang="en-US" b="0" dirty="0" err="1">
+                <a:sym typeface="Wingdings" panose="05000000000000000000" pitchFamily="2" charset="2"/>
+              </a:rPr>
+              <a:t>nginx</a:t>
+            </a:r>
+            <a:endParaRPr lang="en-US" b="0" dirty="0">
+              <a:sym typeface="Wingdings" panose="05000000000000000000" pitchFamily="2" charset="2"/>
+            </a:endParaRPr>
+          </a:p>
+          <a:p>
+            <a:pPr marL="0" indent="0">
+              <a:buFontTx/>
+              <a:buNone/>
+            </a:pPr>
+            <a:endParaRPr lang="en-US" b="0" dirty="0">
+              <a:sym typeface="Wingdings" panose="05000000000000000000" pitchFamily="2" charset="2"/>
+            </a:endParaRPr>
+          </a:p>
+          <a:p>
+            <a:pPr marL="0" indent="0">
+              <a:buFontTx/>
+              <a:buNone/>
+            </a:pPr>
+            <a:r>
+              <a:rPr lang="en-US" b="0" dirty="0">
+                <a:sym typeface="Wingdings" panose="05000000000000000000" pitchFamily="2" charset="2"/>
+              </a:rPr>
+              <a:t>Next, demo the commit command:</a:t>
+            </a:r>
+          </a:p>
+          <a:p>
+            <a:pPr marL="285750" indent="-285750">
+              <a:buFontTx/>
+              <a:buChar char="-"/>
+            </a:pPr>
+            <a:r>
+              <a:rPr lang="en-US" b="0" dirty="0">
+                <a:sym typeface="Wingdings" panose="05000000000000000000" pitchFamily="2" charset="2"/>
+              </a:rPr>
+              <a:t>docker run -it </a:t>
+            </a:r>
+            <a:r>
+              <a:rPr lang="en-US" b="0" dirty="0" err="1">
+                <a:sym typeface="Wingdings" panose="05000000000000000000" pitchFamily="2" charset="2"/>
+              </a:rPr>
+              <a:t>nginx:mainline</a:t>
+            </a:r>
+            <a:r>
+              <a:rPr lang="en-US" b="0" dirty="0">
+                <a:sym typeface="Wingdings" panose="05000000000000000000" pitchFamily="2" charset="2"/>
+              </a:rPr>
+              <a:t> /bin/bash</a:t>
+            </a:r>
+          </a:p>
+          <a:p>
+            <a:pPr marL="285750" indent="-285750">
+              <a:buFontTx/>
+              <a:buChar char="-"/>
+            </a:pPr>
+            <a:r>
+              <a:rPr lang="en-US" b="0" dirty="0">
+                <a:sym typeface="Wingdings" panose="05000000000000000000" pitchFamily="2" charset="2"/>
+              </a:rPr>
+              <a:t>Create a file &amp; exit</a:t>
+            </a:r>
+          </a:p>
+          <a:p>
+            <a:pPr marL="285750" indent="-285750">
+              <a:buFontTx/>
+              <a:buChar char="-"/>
+            </a:pPr>
+            <a:r>
+              <a:rPr lang="en-US" b="0" dirty="0">
+                <a:sym typeface="Wingdings" panose="05000000000000000000" pitchFamily="2" charset="2"/>
+              </a:rPr>
+              <a:t>run “docker commit &lt;container&gt; &lt;repo-name&gt;:&lt;tag&gt;</a:t>
+            </a:r>
+          </a:p>
+          <a:p>
+            <a:pPr marL="285750" indent="-285750">
+              <a:buFontTx/>
+              <a:buChar char="-"/>
+            </a:pPr>
+            <a:endParaRPr lang="en-US" b="0" dirty="0">
+              <a:sym typeface="Wingdings" panose="05000000000000000000" pitchFamily="2" charset="2"/>
+            </a:endParaRPr>
+          </a:p>
+          <a:p>
+            <a:pPr marL="0" indent="0">
+              <a:buFontTx/>
+              <a:buNone/>
+            </a:pPr>
+            <a:r>
+              <a:rPr lang="en-US" b="0" dirty="0">
+                <a:sym typeface="Wingdings" panose="05000000000000000000" pitchFamily="2" charset="2"/>
+              </a:rPr>
+              <a:t>Now re-run the history </a:t>
+            </a:r>
+            <a:r>
+              <a:rPr lang="en-US" b="0" dirty="0" err="1">
+                <a:sym typeface="Wingdings" panose="05000000000000000000" pitchFamily="2" charset="2"/>
+              </a:rPr>
+              <a:t>cmd</a:t>
+            </a:r>
+            <a:r>
+              <a:rPr lang="en-US" b="0" dirty="0">
+                <a:sym typeface="Wingdings" panose="05000000000000000000" pitchFamily="2" charset="2"/>
+              </a:rPr>
+              <a:t> on your newly created image. Discuss the added layer and the visible information vs. what you did.</a:t>
+            </a:r>
+          </a:p>
+          <a:p>
+            <a:pPr marL="285750" indent="-285750">
+              <a:buFontTx/>
+              <a:buChar char="-"/>
+            </a:pPr>
+            <a:endParaRPr lang="en-US" b="0" dirty="0"/>
           </a:p>
         </p:txBody>
       </p:sp>
@@ -1339,7 +1432,7 @@
             <a:fld id="{7D8C2C35-2B8A-446E-BEC0-FD36716C29AC}" type="slidenum">
               <a:rPr lang="de-DE" smtClean="0"/>
               <a:pPr/>
-              <a:t>7</a:t>
+              <a:t>6</a:t>
             </a:fld>
             <a:endParaRPr lang="de-DE" dirty="0"/>
           </a:p>
@@ -1348,7 +1441,7 @@
     </p:spTree>
     <p:extLst>
       <p:ext uri="{BB962C8B-B14F-4D97-AF65-F5344CB8AC3E}">
-        <p14:creationId xmlns:p14="http://schemas.microsoft.com/office/powerpoint/2010/main" val="3472124184"/>
+        <p14:creationId xmlns:p14="http://schemas.microsoft.com/office/powerpoint/2010/main" val="2468237856"/>
       </p:ext>
     </p:extLst>
   </p:cSld>
@@ -1404,28 +1497,33 @@
           <a:p>
             <a:r>
               <a:rPr lang="en-US" dirty="0"/>
-              <a:t>The docker hub offers (provides storage and the push/pull protocol for) docker images. </a:t>
-            </a:r>
+              <a:t>Images are kept in 'docker registries'. The docker runtime will look in the configured registry when it needs to load an image (e.g. for a 'docker run'). When it doesn't have the image already in its local cache, it will load it from the registry. </a:t>
+            </a:r>
+          </a:p>
+          <a:p>
+            <a:endParaRPr lang="en-US" dirty="0"/>
           </a:p>
           <a:p>
             <a:r>
               <a:rPr lang="en-US" dirty="0"/>
-              <a:t>Each docker image has a clearly specified version. There can be multiple version tags. </a:t>
-            </a:r>
+              <a:t>The default registry is the docker hub: hub.docker.com. You can also have local registries, e.g. to have tight control of what goes in. </a:t>
+            </a:r>
+          </a:p>
+          <a:p>
+            <a:endParaRPr lang="en-US" dirty="0"/>
           </a:p>
           <a:p>
             <a:r>
               <a:rPr lang="en-US" dirty="0"/>
-              <a:t>The 'Dockerfile' defines the automated build instructions and show what is in the image. (see Dockerfile chapter). Dockerfiles are also included in images and document the contents.</a:t>
-            </a:r>
-          </a:p>
-          <a:p>
-            <a:endParaRPr lang="en-US" dirty="0"/>
-          </a:p>
-          <a:p>
+              <a:t>Registries can have a private section which requires a login. With “docker login” you can store your credentials locally (~/.docker/</a:t>
+            </a:r>
+            <a:r>
+              <a:rPr lang="en-US" dirty="0" err="1"/>
+              <a:t>config.json</a:t>
+            </a:r>
             <a:r>
               <a:rPr lang="en-US" dirty="0"/>
-              <a:t>At SAP, Artifactory is the preferred solution to host and distribute your Docker images.</a:t>
+              <a:t>) and authorize your requests.</a:t>
             </a:r>
           </a:p>
         </p:txBody>
@@ -1448,7 +1546,7 @@
             <a:fld id="{7D8C2C35-2B8A-446E-BEC0-FD36716C29AC}" type="slidenum">
               <a:rPr lang="de-DE" smtClean="0"/>
               <a:pPr/>
-              <a:t>8</a:t>
+              <a:t>7</a:t>
             </a:fld>
             <a:endParaRPr lang="de-DE" dirty="0"/>
           </a:p>
@@ -1457,7 +1555,7 @@
     </p:spTree>
     <p:extLst>
       <p:ext uri="{BB962C8B-B14F-4D97-AF65-F5344CB8AC3E}">
-        <p14:creationId xmlns:p14="http://schemas.microsoft.com/office/powerpoint/2010/main" val="2563895036"/>
+        <p14:creationId xmlns:p14="http://schemas.microsoft.com/office/powerpoint/2010/main" val="3472124184"/>
       </p:ext>
     </p:extLst>
   </p:cSld>
@@ -1508,128 +1606,34 @@
         </p:nvSpPr>
         <p:spPr/>
         <p:txBody>
-          <a:bodyPr>
-            <a:normAutofit lnSpcReduction="10000"/>
-          </a:bodyPr>
+          <a:bodyPr/>
           <a:lstStyle/>
           <a:p>
             <a:r>
               <a:rPr lang="en-US" dirty="0"/>
-              <a:t>Let’s talk about image names and tags. Docker has a system of creating URIs for any image, where the URI includes the registry as well as the image name &amp; tag.</a:t>
+              <a:t>The docker hub offers (provides storage and the push/pull protocol for) docker images. </a:t>
+            </a:r>
+          </a:p>
+          <a:p>
+            <a:r>
+              <a:rPr lang="en-US" dirty="0"/>
+              <a:t>Each docker image has a clearly specified version. There can be multiple version tags. </a:t>
+            </a:r>
+          </a:p>
+          <a:p>
+            <a:r>
+              <a:rPr lang="en-US" dirty="0"/>
+              <a:t>The 'Dockerfile' defines the automated build instructions and show what is in the image. (see Dockerfile chapter). Dockerfiles are also included in images and document the contents.</a:t>
             </a:r>
           </a:p>
           <a:p>
             <a:endParaRPr lang="en-US" dirty="0"/>
           </a:p>
           <a:p>
-            <a:pPr marL="285750" indent="-285750">
-              <a:buFontTx/>
-              <a:buChar char="-"/>
-            </a:pPr>
             <a:r>
               <a:rPr lang="en-US" dirty="0"/>
-              <a:t>Registry URL: the registry this image has been downloaded from or where it should be uploaded to. Docker is also configured with a default registry (run “docker info” to get the info). For most installations this will be hub.docker.com (translates to https://index.docker.io/v1/). So or any image related to the docker hub, the registry URL string is omitted. </a:t>
-            </a:r>
-          </a:p>
-          <a:p>
-            <a:pPr marL="285750" indent="-285750">
-              <a:buFontTx/>
-              <a:buChar char="-"/>
-            </a:pPr>
-            <a:r>
-              <a:rPr lang="en-US" dirty="0"/>
-              <a:t>Repository: you could also call it the image’s name. Can contain subfolders. When you download images from docker hub you will only see the repo name here, no registry URL.</a:t>
-            </a:r>
-          </a:p>
-          <a:p>
-            <a:pPr marL="285750" indent="-285750">
-              <a:buFontTx/>
-              <a:buChar char="-"/>
-            </a:pPr>
-            <a:r>
-              <a:rPr lang="en-US" dirty="0"/>
-              <a:t>Tag: alpha-numeric string, free text. Anybody with write permissions on the repo can re-upload a different image with the same tag. Last write wins ;) however usually version tags are quite stable. The tag “latest” however is a moving target and you can never be sure about it’s content. If “latest” is not updated, there might be even a newer version available without noticing. But be careful, when downloading an image without specifying a tag, “latest” will be used implicitly. </a:t>
-            </a:r>
-          </a:p>
-          <a:p>
-            <a:pPr marL="285750" indent="-285750">
-              <a:buFontTx/>
-              <a:buChar char="-"/>
-            </a:pPr>
-            <a:endParaRPr lang="en-US" dirty="0"/>
-          </a:p>
-          <a:p>
-            <a:pPr marL="0" indent="0">
-              <a:buFontTx/>
-              <a:buNone/>
-            </a:pPr>
-            <a:r>
-              <a:rPr lang="en-US" dirty="0"/>
-              <a:t>How to use tagging? Docker knows a “tag” command, so let’s have look:</a:t>
-            </a:r>
-          </a:p>
-          <a:p>
-            <a:pPr marL="285750" indent="-285750">
-              <a:buFontTx/>
-              <a:buChar char="-"/>
-            </a:pPr>
-            <a:r>
-              <a:rPr lang="en-US" dirty="0"/>
-              <a:t>Tagging works like creating a </a:t>
-            </a:r>
-            <a:r>
-              <a:rPr lang="en-US" dirty="0" err="1"/>
-              <a:t>sym</a:t>
-            </a:r>
-            <a:r>
-              <a:rPr lang="en-US" dirty="0"/>
-              <a:t>-link on Linux. You can have as many different references to an images as you want.</a:t>
-            </a:r>
-          </a:p>
-          <a:p>
-            <a:pPr marL="285750" indent="-285750">
-              <a:buFontTx/>
-              <a:buChar char="-"/>
-            </a:pPr>
-            <a:r>
-              <a:rPr lang="en-US" dirty="0"/>
-              <a:t>To tag an image, you can reference it either by its ID or its </a:t>
-            </a:r>
-            <a:r>
-              <a:rPr lang="en-US" dirty="0" err="1"/>
-              <a:t>repository:tag</a:t>
-            </a:r>
-            <a:r>
-              <a:rPr lang="en-US" dirty="0"/>
-              <a:t> link.</a:t>
-            </a:r>
-          </a:p>
-          <a:p>
-            <a:pPr marL="285750" indent="-285750">
-              <a:buFontTx/>
-              <a:buChar char="-"/>
-            </a:pPr>
-            <a:r>
-              <a:rPr lang="en-US" dirty="0"/>
-              <a:t>Docker tag: assign the full string of registry URL + repo + version tag to an image</a:t>
-            </a:r>
-          </a:p>
-          <a:p>
-            <a:pPr marL="285750" indent="-285750">
-              <a:buFontTx/>
-              <a:buChar char="-"/>
-            </a:pPr>
-            <a:r>
-              <a:rPr lang="en-US" dirty="0"/>
-              <a:t>Docker push: send the image to the remote location, that is encoded in the image name</a:t>
-            </a:r>
-          </a:p>
-          <a:p>
-            <a:pPr marL="0" indent="0">
-              <a:buFontTx/>
-              <a:buNone/>
-            </a:pPr>
-            <a:endParaRPr lang="en-US" dirty="0"/>
+              <a:t>At SAP, Artifactory is the preferred solution to host and distribute your Docker images.</a:t>
+            </a:r>
           </a:p>
         </p:txBody>
       </p:sp>
@@ -1651,7 +1655,7 @@
             <a:fld id="{7D8C2C35-2B8A-446E-BEC0-FD36716C29AC}" type="slidenum">
               <a:rPr lang="de-DE" smtClean="0"/>
               <a:pPr/>
-              <a:t>9</a:t>
+              <a:t>8</a:t>
             </a:fld>
             <a:endParaRPr lang="de-DE" dirty="0"/>
           </a:p>
@@ -1660,7 +1664,7 @@
     </p:spTree>
     <p:extLst>
       <p:ext uri="{BB962C8B-B14F-4D97-AF65-F5344CB8AC3E}">
-        <p14:creationId xmlns:p14="http://schemas.microsoft.com/office/powerpoint/2010/main" val="1328423813"/>
+        <p14:creationId xmlns:p14="http://schemas.microsoft.com/office/powerpoint/2010/main" val="2563895036"/>
       </p:ext>
     </p:extLst>
   </p:cSld>
@@ -1712,17 +1716,145 @@
         <p:spPr/>
         <p:txBody>
           <a:bodyPr>
-            <a:normAutofit fontScale="62500" lnSpcReduction="20000"/>
+            <a:normAutofit fontScale="85000" lnSpcReduction="10000"/>
           </a:bodyPr>
           <a:lstStyle/>
+          <a:p>
+            <a:r>
+              <a:rPr lang="en-US" dirty="0"/>
+              <a:t>Let’s talk about image names and tags. Docker has a system of creating URIs for any image, where the URI includes the registry as well as the image name &amp; tag.</a:t>
+            </a:r>
+          </a:p>
+          <a:p>
+            <a:endParaRPr lang="en-US" dirty="0"/>
+          </a:p>
+          <a:p>
+            <a:pPr marL="285750" indent="-285750">
+              <a:buFontTx/>
+              <a:buChar char="-"/>
+            </a:pPr>
+            <a:r>
+              <a:rPr lang="en-US" dirty="0"/>
+              <a:t>Registry URL: the registry this image has been downloaded from or where it should be uploaded to. Docker is also configured with a default registry (run “docker info” to get the info). For most installations this will be hub.docker.com (translates to https://index.docker.io/v1/). So or any image related to the docker hub, the registry URL string is omitted. </a:t>
+            </a:r>
+          </a:p>
+          <a:p>
+            <a:pPr marL="285750" indent="-285750">
+              <a:buFontTx/>
+              <a:buChar char="-"/>
+            </a:pPr>
+            <a:r>
+              <a:rPr lang="en-US" dirty="0"/>
+              <a:t>Repository: you could also call it the image’s name. Can contain subfolders. When you download images from docker hub you will only see the repo name here, no registry URL.</a:t>
+            </a:r>
+          </a:p>
+          <a:p>
+            <a:pPr marL="285750" indent="-285750">
+              <a:buFontTx/>
+              <a:buChar char="-"/>
+            </a:pPr>
+            <a:r>
+              <a:rPr lang="en-US" dirty="0"/>
+              <a:t>Tag: alpha-numeric string, free text. Anybody with write permissions on the repo can re-upload a different image with the same tag. Last write wins ;) however usually version tags are quite stable. There is one special tag, called “latest”.  It is just a placeholder for “no tag”. So “my-registry.com/</a:t>
+            </a:r>
+            <a:r>
+              <a:rPr lang="en-US" dirty="0" err="1"/>
+              <a:t>busybox</a:t>
+            </a:r>
+            <a:r>
+              <a:rPr lang="en-US" dirty="0"/>
+              <a:t>” and “my-registry.com/</a:t>
+            </a:r>
+            <a:r>
+              <a:rPr lang="en-US" dirty="0" err="1"/>
+              <a:t>busybox:latest</a:t>
+            </a:r>
+            <a:r>
+              <a:rPr lang="en-US" dirty="0"/>
+              <a:t>” are the same thing.</a:t>
+            </a:r>
+          </a:p>
+          <a:p>
+            <a:pPr marL="285750" indent="-285750">
+              <a:buFontTx/>
+              <a:buChar char="-"/>
+            </a:pPr>
+            <a:r>
+              <a:rPr lang="en-US" dirty="0"/>
+              <a:t>It is best practice to always use an explicit tag and not to override existing tags.</a:t>
+            </a:r>
+          </a:p>
+          <a:p>
+            <a:pPr marL="285750" indent="-285750">
+              <a:buFontTx/>
+              <a:buChar char="-"/>
+            </a:pPr>
+            <a:endParaRPr lang="en-US" dirty="0"/>
+          </a:p>
           <a:p>
             <a:pPr marL="0" indent="0">
               <a:buFontTx/>
               <a:buNone/>
             </a:pPr>
             <a:r>
-              <a:rPr lang="en-US" b="0" dirty="0"/>
-              <a:t>Prerequisites: you have trusted the certificate of the registry for this training (the one deployed into the cluster)</a:t>
+              <a:rPr lang="en-US" dirty="0"/>
+              <a:t>How to use tagging? Docker knows a “tag” command, so let’s have look:</a:t>
+            </a:r>
+          </a:p>
+          <a:p>
+            <a:pPr marL="285750" indent="-285750">
+              <a:buFontTx/>
+              <a:buChar char="-"/>
+            </a:pPr>
+            <a:r>
+              <a:rPr lang="en-US" dirty="0"/>
+              <a:t>Tagging works like creating a </a:t>
+            </a:r>
+            <a:r>
+              <a:rPr lang="en-US" dirty="0" err="1"/>
+              <a:t>sym</a:t>
+            </a:r>
+            <a:r>
+              <a:rPr lang="en-US" dirty="0"/>
+              <a:t>-link on Linux. You can have as many different references to an images as you want.</a:t>
+            </a:r>
+          </a:p>
+          <a:p>
+            <a:pPr marL="285750" indent="-285750">
+              <a:buFontTx/>
+              <a:buChar char="-"/>
+            </a:pPr>
+            <a:r>
+              <a:rPr lang="en-US" dirty="0"/>
+              <a:t>To tag an image, you can reference it either by its ID or its </a:t>
+            </a:r>
+            <a:r>
+              <a:rPr lang="en-US" dirty="0" err="1"/>
+              <a:t>repository:tag</a:t>
+            </a:r>
+            <a:r>
+              <a:rPr lang="en-US" dirty="0"/>
+              <a:t> link.</a:t>
+            </a:r>
+          </a:p>
+          <a:p>
+            <a:pPr marL="285750" indent="-285750">
+              <a:buFontTx/>
+              <a:buChar char="-"/>
+            </a:pPr>
+            <a:r>
+              <a:rPr lang="en-US" dirty="0"/>
+              <a:t>Docker tag: assign the full string of registry URL + repo + version tag to an image</a:t>
+            </a:r>
+          </a:p>
+          <a:p>
+            <a:pPr marL="285750" indent="-285750">
+              <a:buFontTx/>
+              <a:buChar char="-"/>
+            </a:pPr>
+            <a:r>
+              <a:rPr lang="en-US" dirty="0"/>
+              <a:t>Docker push: send the image to the remote location, that is encoded in the image name</a:t>
             </a:r>
           </a:p>
           <a:p>
@@ -1730,145 +1862,7 @@
               <a:buFontTx/>
               <a:buNone/>
             </a:pPr>
-            <a:endParaRPr lang="en-US" b="0" dirty="0"/>
-          </a:p>
-          <a:p>
-            <a:pPr marL="0" indent="0">
-              <a:buFontTx/>
-              <a:buNone/>
-            </a:pPr>
-            <a:r>
-              <a:rPr lang="en-US" b="0" dirty="0"/>
-              <a:t>Explain how to work with (remote) registries:</a:t>
-            </a:r>
-          </a:p>
-          <a:p>
-            <a:pPr marL="0" indent="0">
-              <a:buFontTx/>
-              <a:buNone/>
-            </a:pPr>
-            <a:endParaRPr lang="en-US" b="0" dirty="0"/>
-          </a:p>
-          <a:p>
-            <a:pPr marL="285750" indent="-285750">
-              <a:buFontTx/>
-              <a:buChar char="-"/>
-            </a:pPr>
-            <a:r>
-              <a:rPr lang="en-US" b="0" dirty="0"/>
-              <a:t>Docker image list</a:t>
-            </a:r>
-          </a:p>
-          <a:p>
-            <a:pPr marL="285750" indent="-285750">
-              <a:buFontTx/>
-              <a:buChar char="-"/>
-            </a:pPr>
-            <a:r>
-              <a:rPr lang="en-US" b="0" dirty="0"/>
-              <a:t>Next, tag one of the existing images with a different repo/tag combination like “docker tag </a:t>
-            </a:r>
-            <a:r>
-              <a:rPr lang="en-US" b="0" dirty="0" err="1"/>
-              <a:t>nginx:mainline</a:t>
-            </a:r>
-            <a:r>
-              <a:rPr lang="en-US" b="0" dirty="0"/>
-              <a:t> my-nginx:v0.1”</a:t>
-            </a:r>
-          </a:p>
-          <a:p>
-            <a:pPr marL="285750" indent="-285750">
-              <a:buFontTx/>
-              <a:buChar char="-"/>
-            </a:pPr>
-            <a:r>
-              <a:rPr lang="en-US" b="0" dirty="0"/>
-              <a:t>List the images again and outline that both </a:t>
-            </a:r>
-            <a:r>
-              <a:rPr lang="en-US" b="0" dirty="0" err="1"/>
-              <a:t>nginx:mainline</a:t>
-            </a:r>
-            <a:r>
-              <a:rPr lang="en-US" b="0" dirty="0"/>
-              <a:t> as well as my-nginx:v0.1 have the same image ID. The image is not stored twice but simply referenced by different names</a:t>
-            </a:r>
-          </a:p>
-          <a:p>
-            <a:pPr marL="285750" indent="-285750">
-              <a:buFontTx/>
-              <a:buChar char="-"/>
-            </a:pPr>
-            <a:r>
-              <a:rPr lang="en-US" b="0" dirty="0"/>
-              <a:t>Now you can tag the </a:t>
-            </a:r>
-            <a:r>
-              <a:rPr lang="en-US" b="0" dirty="0" err="1"/>
-              <a:t>niginx</a:t>
-            </a:r>
-            <a:r>
-              <a:rPr lang="en-US" b="0" dirty="0"/>
-              <a:t> with the URL of your remote registry as well </a:t>
-            </a:r>
-            <a:r>
-              <a:rPr lang="en-US" b="0" dirty="0" err="1"/>
-              <a:t>registry.ingress</a:t>
-            </a:r>
-            <a:r>
-              <a:rPr lang="en-US" b="0" dirty="0"/>
-              <a:t>.&lt;</a:t>
-            </a:r>
-            <a:r>
-              <a:rPr lang="en-US" b="0" dirty="0" err="1"/>
-              <a:t>clustername</a:t>
-            </a:r>
-            <a:r>
-              <a:rPr lang="en-US" b="0" dirty="0"/>
-              <a:t>&gt;.k8s-train.shoot.canary.k8s-hana.ondemand.com/nginx:v0.1</a:t>
-            </a:r>
-          </a:p>
-          <a:p>
-            <a:pPr marL="285750" indent="-285750">
-              <a:buFontTx/>
-              <a:buChar char="-"/>
-            </a:pPr>
-            <a:r>
-              <a:rPr lang="en-US" b="0" dirty="0"/>
-              <a:t>Push the image to the remote location (use the full string again): docker push </a:t>
-            </a:r>
-            <a:r>
-              <a:rPr lang="en-US" b="0" dirty="0" err="1"/>
-              <a:t>registry.ingress</a:t>
-            </a:r>
-            <a:r>
-              <a:rPr lang="en-US" b="0" dirty="0"/>
-              <a:t>.&lt;</a:t>
-            </a:r>
-            <a:r>
-              <a:rPr lang="en-US" b="0" dirty="0" err="1"/>
-              <a:t>clustername</a:t>
-            </a:r>
-            <a:r>
-              <a:rPr lang="en-US" b="0" dirty="0"/>
-              <a:t>&gt;.k8s-train.shoot.canary.k8s-hana.ondemand.com/nginx:v0.1</a:t>
-            </a:r>
-          </a:p>
-          <a:p>
-            <a:pPr marL="285750" indent="-285750">
-              <a:buFontTx/>
-              <a:buChar char="-"/>
-            </a:pPr>
-            <a:r>
-              <a:rPr lang="en-US" b="0" dirty="0"/>
-              <a:t>If you get a certificate error, you haven’t trusted the CA that signed the registries certificates. If anyone of the participants face this issue, they should re-run the get_kube_config.sh script and restart their docker </a:t>
-            </a:r>
-            <a:r>
-              <a:rPr lang="en-US" b="0"/>
-              <a:t>daemon.</a:t>
-            </a:r>
-            <a:endParaRPr lang="en-US" b="0" dirty="0"/>
+            <a:endParaRPr lang="en-US" dirty="0"/>
           </a:p>
         </p:txBody>
       </p:sp>
@@ -1890,7 +1884,7 @@
             <a:fld id="{7D8C2C35-2B8A-446E-BEC0-FD36716C29AC}" type="slidenum">
               <a:rPr lang="de-DE" smtClean="0"/>
               <a:pPr/>
-              <a:t>10</a:t>
+              <a:t>9</a:t>
             </a:fld>
             <a:endParaRPr lang="de-DE" dirty="0"/>
           </a:p>
@@ -1899,7 +1893,7 @@
     </p:spTree>
     <p:extLst>
       <p:ext uri="{BB962C8B-B14F-4D97-AF65-F5344CB8AC3E}">
-        <p14:creationId xmlns:p14="http://schemas.microsoft.com/office/powerpoint/2010/main" val="15345096"/>
+        <p14:creationId xmlns:p14="http://schemas.microsoft.com/office/powerpoint/2010/main" val="1328423813"/>
       </p:ext>
     </p:extLst>
   </p:cSld>
@@ -1950,10 +1944,164 @@
         </p:nvSpPr>
         <p:spPr/>
         <p:txBody>
-          <a:bodyPr/>
+          <a:bodyPr>
+            <a:normAutofit/>
+          </a:bodyPr>
           <a:lstStyle/>
           <a:p>
-            <a:endParaRPr lang="en-US" dirty="0"/>
+            <a:pPr marL="0" indent="0">
+              <a:buFontTx/>
+              <a:buNone/>
+            </a:pPr>
+            <a:r>
+              <a:rPr lang="en-US" b="0" dirty="0"/>
+              <a:t>Prerequisites: you have trusted the certificate of the registry for this training (the one deployed into the cluster)</a:t>
+            </a:r>
+          </a:p>
+          <a:p>
+            <a:pPr marL="0" indent="0">
+              <a:buFontTx/>
+              <a:buNone/>
+            </a:pPr>
+            <a:endParaRPr lang="en-US" b="0" dirty="0"/>
+          </a:p>
+          <a:p>
+            <a:pPr marL="0" indent="0">
+              <a:buFontTx/>
+              <a:buNone/>
+            </a:pPr>
+            <a:r>
+              <a:rPr lang="en-US" b="0" dirty="0"/>
+              <a:t>Explain how to work with (remote) registries:</a:t>
+            </a:r>
+          </a:p>
+          <a:p>
+            <a:pPr marL="0" indent="0">
+              <a:buFontTx/>
+              <a:buNone/>
+            </a:pPr>
+            <a:endParaRPr lang="en-US" b="0" dirty="0"/>
+          </a:p>
+          <a:p>
+            <a:pPr marL="285750" indent="-285750">
+              <a:buFontTx/>
+              <a:buChar char="-"/>
+            </a:pPr>
+            <a:r>
+              <a:rPr lang="en-US" b="0" dirty="0"/>
+              <a:t>Docker image list</a:t>
+            </a:r>
+          </a:p>
+          <a:p>
+            <a:pPr marL="285750" indent="-285750">
+              <a:buFontTx/>
+              <a:buChar char="-"/>
+            </a:pPr>
+            <a:r>
+              <a:rPr lang="en-US" b="0" dirty="0"/>
+              <a:t>Next, tag one of the existing images with a different repo/tag combination like “docker tag </a:t>
+            </a:r>
+            <a:r>
+              <a:rPr lang="en-US" b="0" dirty="0" err="1"/>
+              <a:t>nginx:mainline</a:t>
+            </a:r>
+            <a:r>
+              <a:rPr lang="en-US" b="0" dirty="0"/>
+              <a:t> my-nginx:v0.1”</a:t>
+            </a:r>
+          </a:p>
+          <a:p>
+            <a:pPr marL="285750" indent="-285750">
+              <a:buFontTx/>
+              <a:buChar char="-"/>
+            </a:pPr>
+            <a:r>
+              <a:rPr lang="en-US" b="0" dirty="0"/>
+              <a:t>List the images again and outline that both </a:t>
+            </a:r>
+            <a:r>
+              <a:rPr lang="en-US" b="0" dirty="0" err="1"/>
+              <a:t>nginx:mainline</a:t>
+            </a:r>
+            <a:r>
+              <a:rPr lang="en-US" b="0" dirty="0"/>
+              <a:t> as well as my-nginx:v0.1 have the same image ID. The image is not stored twice but simply referenced by different names</a:t>
+            </a:r>
+          </a:p>
+          <a:p>
+            <a:pPr marL="285750" indent="-285750">
+              <a:buFontTx/>
+              <a:buChar char="-"/>
+            </a:pPr>
+            <a:r>
+              <a:rPr lang="en-US" b="0" dirty="0"/>
+              <a:t>Now you can tag the </a:t>
+            </a:r>
+            <a:r>
+              <a:rPr lang="en-US" b="0" dirty="0" err="1"/>
+              <a:t>niginx</a:t>
+            </a:r>
+            <a:r>
+              <a:rPr lang="en-US" b="0" dirty="0"/>
+              <a:t> with the URL of your remote registry as well </a:t>
+            </a:r>
+            <a:r>
+              <a:rPr lang="en-US" b="0" dirty="0" err="1"/>
+              <a:t>registry.ingress</a:t>
+            </a:r>
+            <a:r>
+              <a:rPr lang="en-US" b="0" dirty="0"/>
+              <a:t>.&lt;</a:t>
+            </a:r>
+            <a:r>
+              <a:rPr lang="en-US" b="0" dirty="0" err="1"/>
+              <a:t>clustername</a:t>
+            </a:r>
+            <a:r>
+              <a:rPr lang="en-US" b="0" dirty="0"/>
+              <a:t>&gt;.k8s-train.shoot.canary.k8s-hana.ondemand.com/nginx:v0.1</a:t>
+            </a:r>
+          </a:p>
+          <a:p>
+            <a:pPr marL="285750" indent="-285750">
+              <a:buFontTx/>
+              <a:buChar char="-"/>
+            </a:pPr>
+            <a:r>
+              <a:rPr lang="en-US" b="0" dirty="0"/>
+              <a:t>Push the image to the remote location (use the full string again): docker push </a:t>
+            </a:r>
+            <a:r>
+              <a:rPr lang="en-US" b="0" dirty="0" err="1"/>
+              <a:t>registry.ingress</a:t>
+            </a:r>
+            <a:r>
+              <a:rPr lang="en-US" b="0" dirty="0"/>
+              <a:t>.&lt;</a:t>
+            </a:r>
+            <a:r>
+              <a:rPr lang="en-US" b="0" dirty="0" err="1"/>
+              <a:t>clustername</a:t>
+            </a:r>
+            <a:r>
+              <a:rPr lang="en-US" b="0" dirty="0"/>
+              <a:t>&gt;.k8s-train.shoot.canary.k8s-hana.ondemand.com/nginx:v0.1</a:t>
+            </a:r>
+          </a:p>
+          <a:p>
+            <a:pPr marL="285750" indent="-285750">
+              <a:buFontTx/>
+              <a:buChar char="-"/>
+            </a:pPr>
+            <a:r>
+              <a:rPr lang="en-US" b="0" dirty="0"/>
+              <a:t>If you get a certificate error, you haven’t trusted the CA that signed the registries certificates. If anyone of the participants face this issue, they should re-run the get_kube_config.sh script and restart their docker </a:t>
+            </a:r>
+            <a:r>
+              <a:rPr lang="en-US" b="0"/>
+              <a:t>daemon.</a:t>
+            </a:r>
+            <a:endParaRPr lang="en-US" b="0" dirty="0"/>
           </a:p>
         </p:txBody>
       </p:sp>
@@ -1975,7 +2123,7 @@
             <a:fld id="{7D8C2C35-2B8A-446E-BEC0-FD36716C29AC}" type="slidenum">
               <a:rPr lang="de-DE" smtClean="0"/>
               <a:pPr/>
-              <a:t>11</a:t>
+              <a:t>10</a:t>
             </a:fld>
             <a:endParaRPr lang="de-DE" dirty="0"/>
           </a:p>
@@ -1984,7 +2132,7 @@
     </p:spTree>
     <p:extLst>
       <p:ext uri="{BB962C8B-B14F-4D97-AF65-F5344CB8AC3E}">
-        <p14:creationId xmlns:p14="http://schemas.microsoft.com/office/powerpoint/2010/main" val="80764537"/>
+        <p14:creationId xmlns:p14="http://schemas.microsoft.com/office/powerpoint/2010/main" val="15345096"/>
       </p:ext>
     </p:extLst>
   </p:cSld>
@@ -9784,10 +9932,10 @@
         </p:nvGrpSpPr>
         <p:grpSpPr>
           <a:xfrm>
-            <a:off x="4841966" y="1615987"/>
-            <a:ext cx="5947954" cy="3896539"/>
-            <a:chOff x="4693920" y="1694364"/>
-            <a:chExt cx="5947954" cy="3896539"/>
+            <a:off x="4921134" y="1599362"/>
+            <a:ext cx="5868785" cy="3321774"/>
+            <a:chOff x="4773088" y="1694365"/>
+            <a:chExt cx="5868785" cy="3406197"/>
           </a:xfrm>
         </p:grpSpPr>
         <p:sp>
@@ -9798,8 +9946,8 @@
           </p:nvSpPr>
           <p:spPr bwMode="gray">
             <a:xfrm>
-              <a:off x="4693920" y="1694364"/>
-              <a:ext cx="5947954" cy="3896539"/>
+              <a:off x="4773088" y="1694365"/>
+              <a:ext cx="5868785" cy="3406197"/>
             </a:xfrm>
             <a:prstGeom prst="rect">
               <a:avLst/>
@@ -9878,8 +10026,8 @@
           </p:nvSpPr>
           <p:spPr bwMode="gray">
             <a:xfrm>
-              <a:off x="4920343" y="2718929"/>
-              <a:ext cx="5495108" cy="2645551"/>
+              <a:off x="4920343" y="2718930"/>
+              <a:ext cx="5495108" cy="2121689"/>
             </a:xfrm>
             <a:prstGeom prst="rect">
               <a:avLst/>
@@ -9953,7 +10101,7 @@
           </p:nvSpPr>
           <p:spPr bwMode="gray">
             <a:xfrm>
-              <a:off x="5329646" y="4730608"/>
+              <a:off x="5329646" y="4165342"/>
               <a:ext cx="4972594" cy="496389"/>
             </a:xfrm>
             <a:prstGeom prst="rect">
@@ -10024,86 +10172,6 @@
                   <a:cs typeface="Arial Unicode MS" pitchFamily="34" charset="-128"/>
                 </a:rPr>
                 <a:t> (e.g. Debian)</a:t>
-              </a:r>
-              <a:endParaRPr kumimoji="0" lang="en-US" sz="1800" b="0" i="0" u="none" strike="noStrike" kern="0" cap="none" spc="0" normalizeH="0" baseline="0" dirty="0">
-                <a:ln>
-                  <a:noFill/>
-                </a:ln>
-                <a:solidFill>
-                  <a:schemeClr val="bg1"/>
-                </a:solidFill>
-                <a:effectLst/>
-                <a:uLnTx/>
-                <a:uFillTx/>
-                <a:ea typeface="Arial Unicode MS" pitchFamily="34" charset="-128"/>
-                <a:cs typeface="Arial Unicode MS" pitchFamily="34" charset="-128"/>
-              </a:endParaRPr>
-            </a:p>
-          </p:txBody>
-        </p:sp>
-        <p:sp>
-          <p:nvSpPr>
-            <p:cNvPr id="9" name="Rectangle 8"/>
-            <p:cNvSpPr/>
-            <p:nvPr/>
-          </p:nvSpPr>
-          <p:spPr bwMode="gray">
-            <a:xfrm>
-              <a:off x="5329646" y="4103591"/>
-              <a:ext cx="4972594" cy="496389"/>
-            </a:xfrm>
-            <a:prstGeom prst="rect">
-              <a:avLst/>
-            </a:prstGeom>
-            <a:solidFill>
-              <a:schemeClr val="accent6">
-                <a:lumMod val="75000"/>
-              </a:schemeClr>
-            </a:solidFill>
-            <a:ln w="6350" algn="ctr">
-              <a:solidFill>
-                <a:schemeClr val="tx1"/>
-              </a:solidFill>
-              <a:miter lim="800000"/>
-              <a:headEnd/>
-              <a:tailEnd/>
-            </a:ln>
-          </p:spPr>
-          <p:txBody>
-            <a:bodyPr lIns="90000" tIns="72000" rIns="90000" bIns="72000" rtlCol="0" anchor="ctr"/>
-            <a:lstStyle/>
-            <a:p>
-              <a:pPr marR="0" algn="ctr" defTabSz="914400" eaLnBrk="1" fontAlgn="base" latinLnBrk="0" hangingPunct="1">
-                <a:lnSpc>
-                  <a:spcPct val="100000"/>
-                </a:lnSpc>
-                <a:spcBef>
-                  <a:spcPct val="50000"/>
-                </a:spcBef>
-                <a:spcAft>
-                  <a:spcPct val="0"/>
-                </a:spcAft>
-                <a:buClr>
-                  <a:srgbClr val="F0AB00"/>
-                </a:buClr>
-                <a:buSzPct val="80000"/>
-                <a:tabLst/>
-              </a:pPr>
-              <a:r>
-                <a:rPr kumimoji="0" lang="en-US" sz="1800" b="0" i="0" u="none" strike="noStrike" kern="0" cap="none" spc="0" normalizeH="0" baseline="0" dirty="0" err="1">
-                  <a:ln>
-                    <a:noFill/>
-                  </a:ln>
-                  <a:solidFill>
-                    <a:schemeClr val="bg1"/>
-                  </a:solidFill>
-                  <a:effectLst/>
-                  <a:uLnTx/>
-                  <a:uFillTx/>
-                  <a:ea typeface="Arial Unicode MS" pitchFamily="34" charset="-128"/>
-                  <a:cs typeface="Arial Unicode MS" pitchFamily="34" charset="-128"/>
-                </a:rPr>
-                <a:t>Busybox</a:t>
               </a:r>
               <a:endParaRPr kumimoji="0" lang="en-US" sz="1800" b="0" i="0" u="none" strike="noStrike" kern="0" cap="none" spc="0" normalizeH="0" baseline="0" dirty="0">
                 <a:ln>
@@ -10347,7 +10415,7 @@
           <p:nvPr/>
         </p:nvPicPr>
         <p:blipFill>
-          <a:blip r:embed="rId2"/>
+          <a:blip r:embed="rId3"/>
           <a:stretch>
             <a:fillRect/>
           </a:stretch>

</xml_diff>